<commit_message>
Dashboard updated UI and realiability search by requests engine added
</commit_message>
<xml_diff>
--- a/Presentation.pptx
+++ b/Presentation.pptx
@@ -9,9 +9,9 @@
     <p:sldId id="258" r:id="rId3"/>
     <p:sldId id="259" r:id="rId4"/>
     <p:sldId id="260" r:id="rId5"/>
-    <p:sldId id="261" r:id="rId6"/>
-    <p:sldId id="263" r:id="rId7"/>
-    <p:sldId id="265" r:id="rId8"/>
+    <p:sldId id="265" r:id="rId6"/>
+    <p:sldId id="270" r:id="rId7"/>
+    <p:sldId id="263" r:id="rId8"/>
     <p:sldId id="267" r:id="rId9"/>
     <p:sldId id="269" r:id="rId10"/>
   </p:sldIdLst>
@@ -1332,7 +1332,7 @@
             <a:fld id="{9334D819-9F07-4261-B09B-9E467E5D9002}" type="datetimeFigureOut">
               <a:rPr lang="en-US" dirty="0"/>
               <a:pPr/>
-              <a:t>12/2/2016</a:t>
+              <a:t>3/7/2017</a:t>
             </a:fld>
             <a:endParaRPr lang="en-US" dirty="0"/>
           </a:p>
@@ -1578,7 +1578,7 @@
           <a:p>
             <a:fld id="{9334D819-9F07-4261-B09B-9E467E5D9002}" type="datetimeFigureOut">
               <a:rPr lang="en-US" dirty="0"/>
-              <a:t>12/2/2016</a:t>
+              <a:t>3/7/2017</a:t>
             </a:fld>
             <a:endParaRPr lang="en-US" dirty="0"/>
           </a:p>
@@ -1765,7 +1765,7 @@
           <a:p>
             <a:fld id="{9334D819-9F07-4261-B09B-9E467E5D9002}" type="datetimeFigureOut">
               <a:rPr lang="en-US" dirty="0"/>
-              <a:t>12/2/2016</a:t>
+              <a:t>3/7/2017</a:t>
             </a:fld>
             <a:endParaRPr lang="en-US" dirty="0"/>
           </a:p>
@@ -1942,7 +1942,7 @@
           <a:p>
             <a:fld id="{9334D819-9F07-4261-B09B-9E467E5D9002}" type="datetimeFigureOut">
               <a:rPr lang="en-US" dirty="0"/>
-              <a:t>12/2/2016</a:t>
+              <a:t>3/7/2017</a:t>
             </a:fld>
             <a:endParaRPr lang="en-US" dirty="0"/>
           </a:p>
@@ -2226,7 +2226,7 @@
             <a:fld id="{9334D819-9F07-4261-B09B-9E467E5D9002}" type="datetimeFigureOut">
               <a:rPr lang="en-US" dirty="0"/>
               <a:pPr/>
-              <a:t>12/2/2016</a:t>
+              <a:t>3/7/2017</a:t>
             </a:fld>
             <a:endParaRPr lang="en-US" dirty="0"/>
           </a:p>
@@ -3435,7 +3435,7 @@
           <a:p>
             <a:fld id="{9334D819-9F07-4261-B09B-9E467E5D9002}" type="datetimeFigureOut">
               <a:rPr lang="en-US" dirty="0"/>
-              <a:t>12/2/2016</a:t>
+              <a:t>3/7/2017</a:t>
             </a:fld>
             <a:endParaRPr lang="en-US" dirty="0"/>
           </a:p>
@@ -3832,7 +3832,7 @@
           <a:p>
             <a:fld id="{9334D819-9F07-4261-B09B-9E467E5D9002}" type="datetimeFigureOut">
               <a:rPr lang="en-US" dirty="0"/>
-              <a:t>12/2/2016</a:t>
+              <a:t>3/7/2017</a:t>
             </a:fld>
             <a:endParaRPr lang="en-US" dirty="0"/>
           </a:p>
@@ -3962,7 +3962,7 @@
           <a:p>
             <a:fld id="{9334D819-9F07-4261-B09B-9E467E5D9002}" type="datetimeFigureOut">
               <a:rPr lang="en-US" dirty="0"/>
-              <a:t>12/2/2016</a:t>
+              <a:t>3/7/2017</a:t>
             </a:fld>
             <a:endParaRPr lang="en-US" dirty="0"/>
           </a:p>
@@ -4064,7 +4064,7 @@
           <a:p>
             <a:fld id="{9334D819-9F07-4261-B09B-9E467E5D9002}" type="datetimeFigureOut">
               <a:rPr lang="en-US" dirty="0"/>
-              <a:t>12/2/2016</a:t>
+              <a:t>3/7/2017</a:t>
             </a:fld>
             <a:endParaRPr lang="en-US" dirty="0"/>
           </a:p>
@@ -4834,7 +4834,7 @@
           <a:p>
             <a:fld id="{9334D819-9F07-4261-B09B-9E467E5D9002}" type="datetimeFigureOut">
               <a:rPr lang="en-US" dirty="0"/>
-              <a:t>12/2/2016</a:t>
+              <a:t>3/7/2017</a:t>
             </a:fld>
             <a:endParaRPr lang="en-US" dirty="0"/>
           </a:p>
@@ -5681,7 +5681,7 @@
           <a:p>
             <a:fld id="{9334D819-9F07-4261-B09B-9E467E5D9002}" type="datetimeFigureOut">
               <a:rPr lang="en-US" dirty="0"/>
-              <a:t>12/2/2016</a:t>
+              <a:t>3/7/2017</a:t>
             </a:fld>
             <a:endParaRPr lang="en-US" dirty="0"/>
           </a:p>
@@ -5916,7 +5916,7 @@
             <a:fld id="{9334D819-9F07-4261-B09B-9E467E5D9002}" type="datetimeFigureOut">
               <a:rPr lang="en-US" dirty="0"/>
               <a:pPr/>
-              <a:t>12/2/2016</a:t>
+              <a:t>3/7/2017</a:t>
             </a:fld>
             <a:endParaRPr lang="en-US" dirty="0"/>
           </a:p>
@@ -6978,8 +6978,8 @@
         </p:nvSpPr>
         <p:spPr>
           <a:xfrm>
-            <a:off x="4063042" y="5952560"/>
-            <a:ext cx="3605843" cy="1164226"/>
+            <a:off x="3746896" y="6052455"/>
+            <a:ext cx="4981668" cy="1164226"/>
           </a:xfrm>
         </p:spPr>
         <p:txBody>
@@ -6989,8 +6989,12 @@
           <a:lstStyle/>
           <a:p>
             <a:r>
-              <a:rPr lang="bg-BG" dirty="0" smtClean="0"/>
-              <a:t>ПОРЪЧАЙ ТАКСИ ЗА СЕКУНДИ</a:t>
+              <a:rPr lang="ru-RU" dirty="0" smtClean="0"/>
+              <a:t>управление </a:t>
+            </a:r>
+            <a:r>
+              <a:rPr lang="ru-RU" dirty="0"/>
+              <a:t>на таксиметрови компании</a:t>
             </a:r>
             <a:endParaRPr lang="bg-BG" dirty="0"/>
           </a:p>
@@ -7857,36 +7861,27 @@
             <p:ph idx="1"/>
           </p:nvPr>
         </p:nvSpPr>
-        <p:spPr/>
+        <p:spPr>
+          <a:xfrm>
+            <a:off x="1344984" y="1506274"/>
+            <a:ext cx="10178322" cy="3593591"/>
+          </a:xfrm>
+        </p:spPr>
         <p:txBody>
           <a:bodyPr/>
           <a:lstStyle/>
           <a:p>
             <a:r>
               <a:rPr lang="bg-BG" dirty="0" smtClean="0"/>
-              <a:t>Бърз и лесен начин да поръчаш такси без </a:t>
+              <a:t>По-сигурно </a:t>
+            </a:r>
+            <a:r>
+              <a:rPr lang="bg-BG" dirty="0"/>
+              <a:t>и лесно управление на таксиметрови </a:t>
             </a:r>
             <a:r>
               <a:rPr lang="bg-BG" dirty="0" smtClean="0"/>
-              <a:t>дисп</a:t>
-            </a:r>
-            <a:r>
-              <a:rPr lang="en-US" dirty="0" smtClean="0"/>
-              <a:t>e</a:t>
-            </a:r>
-            <a:r>
-              <a:rPr lang="bg-BG" dirty="0" smtClean="0"/>
-              <a:t>чер</a:t>
-            </a:r>
-            <a:r>
-              <a:rPr lang="bg-BG" dirty="0" smtClean="0"/>
-              <a:t>.</a:t>
-            </a:r>
-          </a:p>
-          <a:p>
-            <a:r>
-              <a:rPr lang="bg-BG" dirty="0" smtClean="0"/>
-              <a:t>Не е необходимо да знаете къде се намирате, за да повикате на такси.</a:t>
+              <a:t>компании</a:t>
             </a:r>
           </a:p>
           <a:p>
@@ -7898,18 +7893,14 @@
           <a:p>
             <a:r>
               <a:rPr lang="bg-BG" dirty="0" smtClean="0"/>
-              <a:t>Шофьорите получават винаги най-близките заявки.</a:t>
+              <a:t>Диспечерите винаги са информирани са местоположенията и статусите на шофьорите</a:t>
             </a:r>
           </a:p>
           <a:p>
             <a:r>
               <a:rPr lang="bg-BG" dirty="0" smtClean="0"/>
-              <a:t>По-сигурно и лесно управление на таксиметрови компании</a:t>
+              <a:t>Заявките се пращат автоматично винаги на най-близките шофьори.</a:t>
             </a:r>
-            <a:endParaRPr lang="bg-BG" dirty="0"/>
-          </a:p>
-          <a:p>
-            <a:endParaRPr lang="bg-BG" dirty="0" smtClean="0"/>
           </a:p>
         </p:txBody>
       </p:sp>
@@ -7935,7 +7926,7 @@
         </p:blipFill>
         <p:spPr>
           <a:xfrm>
-            <a:off x="5785611" y="5060146"/>
+            <a:off x="4542047" y="4874217"/>
             <a:ext cx="1453402" cy="1453402"/>
           </a:xfrm>
           <a:prstGeom prst="rect">
@@ -7951,7 +7942,7 @@
         </p:nvSpPr>
         <p:spPr>
           <a:xfrm rot="21140817">
-            <a:off x="5339579" y="4789515"/>
+            <a:off x="4105346" y="4584920"/>
             <a:ext cx="2136446" cy="2029499"/>
           </a:xfrm>
           <a:prstGeom prst="mathMultiply">
@@ -8013,7 +8004,7 @@
         </p:blipFill>
         <p:spPr>
           <a:xfrm>
-            <a:off x="7842367" y="5034019"/>
+            <a:off x="2175660" y="4749750"/>
             <a:ext cx="1551682" cy="1551682"/>
           </a:xfrm>
           <a:prstGeom prst="rect">
@@ -8043,7 +8034,7 @@
         </p:blipFill>
         <p:spPr>
           <a:xfrm>
-            <a:off x="3366530" y="5064501"/>
+            <a:off x="6835364" y="4874217"/>
             <a:ext cx="1449047" cy="1449047"/>
           </a:xfrm>
           <a:prstGeom prst="rect">
@@ -8229,40 +8220,27 @@
                             </p:childTnLst>
                           </p:cTn>
                         </p:par>
-                      </p:childTnLst>
-                    </p:cTn>
-                  </p:par>
-                  <p:par>
-                    <p:cTn id="15" fill="hold">
-                      <p:stCondLst>
-                        <p:cond delay="indefinite"/>
-                      </p:stCondLst>
-                      <p:childTnLst>
                         <p:par>
-                          <p:cTn id="16" fill="hold">
+                          <p:cTn id="15" fill="hold">
                             <p:stCondLst>
-                              <p:cond delay="0"/>
+                              <p:cond delay="500"/>
                             </p:stCondLst>
                             <p:childTnLst>
                               <p:par>
-                                <p:cTn id="17" presetID="10" presetClass="entr" presetSubtype="0" fill="hold" grpId="0" nodeType="clickEffect">
+                                <p:cTn id="16" presetID="10" presetClass="entr" presetSubtype="0" fill="hold" nodeType="afterEffect">
                                   <p:stCondLst>
                                     <p:cond delay="0"/>
                                   </p:stCondLst>
                                   <p:childTnLst>
                                     <p:set>
                                       <p:cBhvr>
-                                        <p:cTn id="18" dur="1" fill="hold">
+                                        <p:cTn id="17" dur="1" fill="hold">
                                           <p:stCondLst>
                                             <p:cond delay="0"/>
                                           </p:stCondLst>
                                         </p:cTn>
                                         <p:tgtEl>
-                                          <p:spTgt spid="3">
-                                            <p:txEl>
-                                              <p:pRg st="1" end="1"/>
-                                            </p:txEl>
-                                          </p:spTgt>
+                                          <p:spTgt spid="14"/>
                                         </p:tgtEl>
                                         <p:attrNameLst>
                                           <p:attrName>style.visibility</p:attrName>
@@ -8274,57 +8252,9 @@
                                     </p:set>
                                     <p:animEffect transition="in" filter="fade">
                                       <p:cBhvr>
-                                        <p:cTn id="19" dur="500"/>
-                                        <p:tgtEl>
-                                          <p:spTgt spid="3">
-                                            <p:txEl>
-                                              <p:pRg st="1" end="1"/>
-                                            </p:txEl>
-                                          </p:spTgt>
-                                        </p:tgtEl>
-                                      </p:cBhvr>
-                                    </p:animEffect>
-                                  </p:childTnLst>
-                                </p:cTn>
-                              </p:par>
-                            </p:childTnLst>
-                          </p:cTn>
-                        </p:par>
-                        <p:par>
-                          <p:cTn id="20" fill="hold">
-                            <p:stCondLst>
-                              <p:cond delay="500"/>
-                            </p:stCondLst>
-                            <p:childTnLst>
-                              <p:par>
-                                <p:cTn id="21" presetID="10" presetClass="entr" presetSubtype="0" fill="hold" nodeType="afterEffect">
-                                  <p:stCondLst>
-                                    <p:cond delay="250"/>
-                                  </p:stCondLst>
-                                  <p:childTnLst>
-                                    <p:set>
-                                      <p:cBhvr>
-                                        <p:cTn id="22" dur="1" fill="hold">
-                                          <p:stCondLst>
-                                            <p:cond delay="0"/>
-                                          </p:stCondLst>
-                                        </p:cTn>
-                                        <p:tgtEl>
-                                          <p:spTgt spid="15"/>
-                                        </p:tgtEl>
-                                        <p:attrNameLst>
-                                          <p:attrName>style.visibility</p:attrName>
-                                        </p:attrNameLst>
-                                      </p:cBhvr>
-                                      <p:to>
-                                        <p:strVal val="visible"/>
-                                      </p:to>
-                                    </p:set>
-                                    <p:animEffect transition="in" filter="fade">
-                                      <p:cBhvr>
-                                        <p:cTn id="23" dur="1000"/>
-                                        <p:tgtEl>
-                                          <p:spTgt spid="15"/>
+                                        <p:cTn id="18" dur="1250"/>
+                                        <p:tgtEl>
+                                          <p:spTgt spid="14"/>
                                         </p:tgtEl>
                                       </p:cBhvr>
                                     </p:animEffect>
@@ -8338,26 +8268,26 @@
                     </p:cTn>
                   </p:par>
                   <p:par>
-                    <p:cTn id="24" fill="hold">
+                    <p:cTn id="19" fill="hold">
                       <p:stCondLst>
                         <p:cond delay="indefinite"/>
                       </p:stCondLst>
                       <p:childTnLst>
                         <p:par>
-                          <p:cTn id="25" fill="hold">
+                          <p:cTn id="20" fill="hold">
                             <p:stCondLst>
                               <p:cond delay="0"/>
                             </p:stCondLst>
                             <p:childTnLst>
                               <p:par>
-                                <p:cTn id="26" presetID="10" presetClass="entr" presetSubtype="0" fill="hold" grpId="0" nodeType="clickEffect">
+                                <p:cTn id="21" presetID="10" presetClass="entr" presetSubtype="0" fill="hold" grpId="0" nodeType="clickEffect">
                                   <p:stCondLst>
                                     <p:cond delay="0"/>
                                   </p:stCondLst>
                                   <p:childTnLst>
                                     <p:set>
                                       <p:cBhvr>
-                                        <p:cTn id="27" dur="1" fill="hold">
+                                        <p:cTn id="22" dur="1" fill="hold">
                                           <p:stCondLst>
                                             <p:cond delay="0"/>
                                           </p:stCondLst>
@@ -8365,7 +8295,7 @@
                                         <p:tgtEl>
                                           <p:spTgt spid="3">
                                             <p:txEl>
-                                              <p:pRg st="2" end="2"/>
+                                              <p:pRg st="1" end="1"/>
                                             </p:txEl>
                                           </p:spTgt>
                                         </p:tgtEl>
@@ -8379,11 +8309,11 @@
                                     </p:set>
                                     <p:animEffect transition="in" filter="fade">
                                       <p:cBhvr>
-                                        <p:cTn id="28" dur="500"/>
+                                        <p:cTn id="23" dur="500"/>
                                         <p:tgtEl>
                                           <p:spTgt spid="3">
                                             <p:txEl>
-                                              <p:pRg st="2" end="2"/>
+                                              <p:pRg st="1" end="1"/>
                                             </p:txEl>
                                           </p:spTgt>
                                         </p:tgtEl>
@@ -8396,20 +8326,20 @@
                           </p:cTn>
                         </p:par>
                         <p:par>
-                          <p:cTn id="29" fill="hold">
+                          <p:cTn id="24" fill="hold">
                             <p:stCondLst>
                               <p:cond delay="500"/>
                             </p:stCondLst>
                             <p:childTnLst>
                               <p:par>
-                                <p:cTn id="30" presetID="10" presetClass="entr" presetSubtype="0" fill="hold" nodeType="afterEffect">
+                                <p:cTn id="25" presetID="10" presetClass="entr" presetSubtype="0" fill="hold" nodeType="afterEffect">
                                   <p:stCondLst>
-                                    <p:cond delay="250"/>
+                                    <p:cond delay="0"/>
                                   </p:stCondLst>
                                   <p:childTnLst>
                                     <p:set>
                                       <p:cBhvr>
-                                        <p:cTn id="31" dur="1" fill="hold">
+                                        <p:cTn id="26" dur="1" fill="hold">
                                           <p:stCondLst>
                                             <p:cond delay="0"/>
                                           </p:stCondLst>
@@ -8427,7 +8357,7 @@
                                     </p:set>
                                     <p:animEffect transition="in" filter="fade">
                                       <p:cBhvr>
-                                        <p:cTn id="32" dur="750"/>
+                                        <p:cTn id="27" dur="750"/>
                                         <p:tgtEl>
                                           <p:spTgt spid="4"/>
                                         </p:tgtEl>
@@ -8440,20 +8370,20 @@
                           </p:cTn>
                         </p:par>
                         <p:par>
-                          <p:cTn id="33" fill="hold">
+                          <p:cTn id="28" fill="hold">
                             <p:stCondLst>
-                              <p:cond delay="1500"/>
+                              <p:cond delay="1250"/>
                             </p:stCondLst>
                             <p:childTnLst>
                               <p:par>
-                                <p:cTn id="34" presetID="31" presetClass="entr" presetSubtype="0" fill="hold" grpId="0" nodeType="afterEffect">
+                                <p:cTn id="29" presetID="31" presetClass="entr" presetSubtype="0" fill="hold" grpId="0" nodeType="afterEffect">
                                   <p:stCondLst>
                                     <p:cond delay="0"/>
                                   </p:stCondLst>
                                   <p:childTnLst>
                                     <p:set>
                                       <p:cBhvr>
-                                        <p:cTn id="35" dur="1" fill="hold">
+                                        <p:cTn id="30" dur="1" fill="hold">
                                           <p:stCondLst>
                                             <p:cond delay="0"/>
                                           </p:stCondLst>
@@ -8471,7 +8401,7 @@
                                     </p:set>
                                     <p:anim calcmode="lin" valueType="num">
                                       <p:cBhvr>
-                                        <p:cTn id="36" dur="500" fill="hold"/>
+                                        <p:cTn id="31" dur="500" fill="hold"/>
                                         <p:tgtEl>
                                           <p:spTgt spid="13"/>
                                         </p:tgtEl>
@@ -8494,7 +8424,7 @@
                                     </p:anim>
                                     <p:anim calcmode="lin" valueType="num">
                                       <p:cBhvr>
-                                        <p:cTn id="37" dur="500" fill="hold"/>
+                                        <p:cTn id="32" dur="500" fill="hold"/>
                                         <p:tgtEl>
                                           <p:spTgt spid="13"/>
                                         </p:tgtEl>
@@ -8517,7 +8447,7 @@
                                     </p:anim>
                                     <p:anim calcmode="lin" valueType="num">
                                       <p:cBhvr>
-                                        <p:cTn id="38" dur="500" fill="hold"/>
+                                        <p:cTn id="33" dur="500" fill="hold"/>
                                         <p:tgtEl>
                                           <p:spTgt spid="13"/>
                                         </p:tgtEl>
@@ -8540,7 +8470,7 @@
                                     </p:anim>
                                     <p:animEffect transition="in" filter="fade">
                                       <p:cBhvr>
-                                        <p:cTn id="39" dur="500"/>
+                                        <p:cTn id="34" dur="500"/>
                                         <p:tgtEl>
                                           <p:spTgt spid="13"/>
                                         </p:tgtEl>
@@ -8556,26 +8486,26 @@
                     </p:cTn>
                   </p:par>
                   <p:par>
-                    <p:cTn id="40" fill="hold">
+                    <p:cTn id="35" fill="hold">
                       <p:stCondLst>
                         <p:cond delay="indefinite"/>
                       </p:stCondLst>
                       <p:childTnLst>
                         <p:par>
-                          <p:cTn id="41" fill="hold">
+                          <p:cTn id="36" fill="hold">
                             <p:stCondLst>
                               <p:cond delay="0"/>
                             </p:stCondLst>
                             <p:childTnLst>
                               <p:par>
-                                <p:cTn id="42" presetID="10" presetClass="entr" presetSubtype="0" fill="hold" grpId="0" nodeType="clickEffect">
+                                <p:cTn id="37" presetID="10" presetClass="entr" presetSubtype="0" fill="hold" grpId="0" nodeType="clickEffect">
                                   <p:stCondLst>
                                     <p:cond delay="0"/>
                                   </p:stCondLst>
                                   <p:childTnLst>
                                     <p:set>
                                       <p:cBhvr>
-                                        <p:cTn id="43" dur="1" fill="hold">
+                                        <p:cTn id="38" dur="1" fill="hold">
                                           <p:stCondLst>
                                             <p:cond delay="0"/>
                                           </p:stCondLst>
@@ -8583,7 +8513,7 @@
                                         <p:tgtEl>
                                           <p:spTgt spid="3">
                                             <p:txEl>
-                                              <p:pRg st="3" end="3"/>
+                                              <p:pRg st="2" end="2"/>
                                             </p:txEl>
                                           </p:spTgt>
                                         </p:tgtEl>
@@ -8597,13 +8527,57 @@
                                     </p:set>
                                     <p:animEffect transition="in" filter="fade">
                                       <p:cBhvr>
-                                        <p:cTn id="44" dur="500"/>
+                                        <p:cTn id="39" dur="500"/>
                                         <p:tgtEl>
                                           <p:spTgt spid="3">
                                             <p:txEl>
-                                              <p:pRg st="3" end="3"/>
+                                              <p:pRg st="2" end="2"/>
                                             </p:txEl>
                                           </p:spTgt>
+                                        </p:tgtEl>
+                                      </p:cBhvr>
+                                    </p:animEffect>
+                                  </p:childTnLst>
+                                </p:cTn>
+                              </p:par>
+                            </p:childTnLst>
+                          </p:cTn>
+                        </p:par>
+                        <p:par>
+                          <p:cTn id="40" fill="hold">
+                            <p:stCondLst>
+                              <p:cond delay="500"/>
+                            </p:stCondLst>
+                            <p:childTnLst>
+                              <p:par>
+                                <p:cTn id="41" presetID="10" presetClass="entr" presetSubtype="0" fill="hold" nodeType="afterEffect">
+                                  <p:stCondLst>
+                                    <p:cond delay="250"/>
+                                  </p:stCondLst>
+                                  <p:childTnLst>
+                                    <p:set>
+                                      <p:cBhvr>
+                                        <p:cTn id="42" dur="1" fill="hold">
+                                          <p:stCondLst>
+                                            <p:cond delay="0"/>
+                                          </p:stCondLst>
+                                        </p:cTn>
+                                        <p:tgtEl>
+                                          <p:spTgt spid="15"/>
+                                        </p:tgtEl>
+                                        <p:attrNameLst>
+                                          <p:attrName>style.visibility</p:attrName>
+                                        </p:attrNameLst>
+                                      </p:cBhvr>
+                                      <p:to>
+                                        <p:strVal val="visible"/>
+                                      </p:to>
+                                    </p:set>
+                                    <p:animEffect transition="in" filter="fade">
+                                      <p:cBhvr>
+                                        <p:cTn id="43" dur="1000"/>
+                                        <p:tgtEl>
+                                          <p:spTgt spid="15"/>
                                         </p:tgtEl>
                                       </p:cBhvr>
                                     </p:animEffect>
@@ -8617,26 +8591,26 @@
                     </p:cTn>
                   </p:par>
                   <p:par>
-                    <p:cTn id="45" fill="hold">
+                    <p:cTn id="44" fill="hold">
                       <p:stCondLst>
                         <p:cond delay="indefinite"/>
                       </p:stCondLst>
                       <p:childTnLst>
                         <p:par>
-                          <p:cTn id="46" fill="hold">
+                          <p:cTn id="45" fill="hold">
                             <p:stCondLst>
                               <p:cond delay="0"/>
                             </p:stCondLst>
                             <p:childTnLst>
                               <p:par>
-                                <p:cTn id="47" presetID="10" presetClass="entr" presetSubtype="0" fill="hold" grpId="0" nodeType="clickEffect">
+                                <p:cTn id="46" presetID="10" presetClass="entr" presetSubtype="0" fill="hold" grpId="0" nodeType="clickEffect">
                                   <p:stCondLst>
                                     <p:cond delay="0"/>
                                   </p:stCondLst>
                                   <p:childTnLst>
                                     <p:set>
                                       <p:cBhvr>
-                                        <p:cTn id="48" dur="1" fill="hold">
+                                        <p:cTn id="47" dur="1" fill="hold">
                                           <p:stCondLst>
                                             <p:cond delay="0"/>
                                           </p:stCondLst>
@@ -8644,7 +8618,7 @@
                                         <p:tgtEl>
                                           <p:spTgt spid="3">
                                             <p:txEl>
-                                              <p:pRg st="4" end="4"/>
+                                              <p:pRg st="3" end="3"/>
                                             </p:txEl>
                                           </p:spTgt>
                                         </p:tgtEl>
@@ -8658,57 +8632,13 @@
                                     </p:set>
                                     <p:animEffect transition="in" filter="fade">
                                       <p:cBhvr>
-                                        <p:cTn id="49" dur="500"/>
+                                        <p:cTn id="48" dur="500"/>
                                         <p:tgtEl>
                                           <p:spTgt spid="3">
                                             <p:txEl>
-                                              <p:pRg st="4" end="4"/>
+                                              <p:pRg st="3" end="3"/>
                                             </p:txEl>
                                           </p:spTgt>
-                                        </p:tgtEl>
-                                      </p:cBhvr>
-                                    </p:animEffect>
-                                  </p:childTnLst>
-                                </p:cTn>
-                              </p:par>
-                            </p:childTnLst>
-                          </p:cTn>
-                        </p:par>
-                        <p:par>
-                          <p:cTn id="50" fill="hold">
-                            <p:stCondLst>
-                              <p:cond delay="500"/>
-                            </p:stCondLst>
-                            <p:childTnLst>
-                              <p:par>
-                                <p:cTn id="51" presetID="10" presetClass="entr" presetSubtype="0" fill="hold" nodeType="afterEffect">
-                                  <p:stCondLst>
-                                    <p:cond delay="0"/>
-                                  </p:stCondLst>
-                                  <p:childTnLst>
-                                    <p:set>
-                                      <p:cBhvr>
-                                        <p:cTn id="52" dur="1" fill="hold">
-                                          <p:stCondLst>
-                                            <p:cond delay="0"/>
-                                          </p:stCondLst>
-                                        </p:cTn>
-                                        <p:tgtEl>
-                                          <p:spTgt spid="14"/>
-                                        </p:tgtEl>
-                                        <p:attrNameLst>
-                                          <p:attrName>style.visibility</p:attrName>
-                                        </p:attrNameLst>
-                                      </p:cBhvr>
-                                      <p:to>
-                                        <p:strVal val="visible"/>
-                                      </p:to>
-                                    </p:set>
-                                    <p:animEffect transition="in" filter="fade">
-                                      <p:cBhvr>
-                                        <p:cTn id="53" dur="1250"/>
-                                        <p:tgtEl>
-                                          <p:spTgt spid="14"/>
                                         </p:tgtEl>
                                       </p:cBhvr>
                                     </p:animEffect>
@@ -8830,14 +8760,32 @@
             </a:r>
           </a:p>
           <a:p>
-            <a:pPr lvl="0"/>
             <a:r>
               <a:rPr lang="bg-BG" dirty="0"/>
-              <a:t>Създаване на двете мобилни </a:t>
+              <a:t>Създаване на </a:t>
             </a:r>
             <a:r>
               <a:rPr lang="bg-BG" dirty="0" smtClean="0"/>
-              <a:t>приложения </a:t>
+              <a:t>мобилното </a:t>
+            </a:r>
+            <a:r>
+              <a:rPr lang="bg-BG" dirty="0" smtClean="0"/>
+              <a:t>приложение</a:t>
+            </a:r>
+            <a:endParaRPr lang="en-US" dirty="0" smtClean="0"/>
+          </a:p>
+          <a:p>
+            <a:r>
+              <a:rPr lang="bg-BG" dirty="0" smtClean="0"/>
+              <a:t>Създаване </a:t>
+            </a:r>
+            <a:r>
+              <a:rPr lang="bg-BG" dirty="0"/>
+              <a:t>на трите основни потребителски роли в </a:t>
+            </a:r>
+            <a:r>
+              <a:rPr lang="bg-BG" dirty="0" smtClean="0"/>
+              <a:t>проекта</a:t>
             </a:r>
             <a:endParaRPr lang="bg-BG" dirty="0"/>
           </a:p>
@@ -8856,30 +8804,11 @@
             <a:pPr lvl="0"/>
             <a:r>
               <a:rPr lang="bg-BG" dirty="0" smtClean="0"/>
-              <a:t>Създаване </a:t>
-            </a:r>
-            <a:r>
-              <a:rPr lang="bg-BG" dirty="0"/>
-              <a:t>на трите </a:t>
+              <a:t>Проверка </a:t>
             </a:r>
             <a:r>
               <a:rPr lang="bg-BG" dirty="0" smtClean="0"/>
-              <a:t>основни потребителски </a:t>
-            </a:r>
-            <a:r>
-              <a:rPr lang="bg-BG" dirty="0"/>
-              <a:t>роли в </a:t>
-            </a:r>
-            <a:r>
-              <a:rPr lang="bg-BG" dirty="0" smtClean="0"/>
-              <a:t>проекта</a:t>
-            </a:r>
-          </a:p>
-          <a:p>
-            <a:pPr lvl="0"/>
-            <a:r>
-              <a:rPr lang="bg-BG" dirty="0" smtClean="0"/>
-              <a:t>Проверка и отстраняване на грешките</a:t>
+              <a:t>и отстраняване на грешките</a:t>
             </a:r>
             <a:endParaRPr lang="bg-BG" dirty="0"/>
           </a:p>
@@ -9320,36 +9249,6 @@
           <a:chExt cx="0" cy="0"/>
         </a:xfrm>
       </p:grpSpPr>
-      <p:pic>
-        <p:nvPicPr>
-          <p:cNvPr id="8" name="Picture 7"/>
-          <p:cNvPicPr>
-            <a:picLocks noChangeAspect="1"/>
-          </p:cNvPicPr>
-          <p:nvPr/>
-        </p:nvPicPr>
-        <p:blipFill>
-          <a:blip r:embed="rId2">
-            <a:extLst>
-              <a:ext uri="{28A0092B-C50C-407E-A947-70E740481C1C}">
-                <a14:useLocalDpi xmlns:a14="http://schemas.microsoft.com/office/drawing/2010/main" val="0"/>
-              </a:ext>
-            </a:extLst>
-          </a:blip>
-          <a:stretch>
-            <a:fillRect/>
-          </a:stretch>
-        </p:blipFill>
-        <p:spPr>
-          <a:xfrm>
-            <a:off x="7251833" y="1869099"/>
-            <a:ext cx="3202709" cy="3202709"/>
-          </a:xfrm>
-          <a:prstGeom prst="rect">
-            <a:avLst/>
-          </a:prstGeom>
-        </p:spPr>
-      </p:pic>
       <p:sp>
         <p:nvSpPr>
           <p:cNvPr id="2" name="Title 1"/>
@@ -9368,1892 +9267,6 @@
             <a:r>
               <a:rPr lang="bg-BG" dirty="0" smtClean="0"/>
               <a:t>Описание на решението (1)</a:t>
-            </a:r>
-            <a:br>
-              <a:rPr lang="bg-BG" dirty="0" smtClean="0"/>
-            </a:br>
-            <a:endParaRPr lang="bg-BG" sz="4800" dirty="0"/>
-          </a:p>
-        </p:txBody>
-      </p:sp>
-      <p:sp>
-        <p:nvSpPr>
-          <p:cNvPr id="3" name="Content Placeholder 2"/>
-          <p:cNvSpPr>
-            <a:spLocks noGrp="1"/>
-          </p:cNvSpPr>
-          <p:nvPr>
-            <p:ph idx="1"/>
-          </p:nvPr>
-        </p:nvSpPr>
-        <p:spPr>
-          <a:xfrm>
-            <a:off x="1249767" y="2142617"/>
-            <a:ext cx="5776139" cy="3593591"/>
-          </a:xfrm>
-        </p:spPr>
-        <p:txBody>
-          <a:bodyPr/>
-          <a:lstStyle/>
-          <a:p>
-            <a:r>
-              <a:rPr lang="bg-BG" dirty="0" smtClean="0"/>
-              <a:t>Клиентите е необходимо да влязът в своя профил или да се регистрират</a:t>
-            </a:r>
-          </a:p>
-          <a:p>
-            <a:r>
-              <a:rPr lang="bg-BG" dirty="0" smtClean="0"/>
-              <a:t>С едно натискане на бутона „Поръчай такси“ се изпраща заявката с текущото местоположение към колите в района</a:t>
-            </a:r>
-          </a:p>
-          <a:p>
-            <a:r>
-              <a:rPr lang="bg-BG" dirty="0" smtClean="0"/>
-              <a:t>Получаване на известие за приета заявка и приблизитеното време на пристигане на таксиметровата кола</a:t>
-            </a:r>
-            <a:endParaRPr lang="bg-BG" dirty="0"/>
-          </a:p>
-        </p:txBody>
-      </p:sp>
-      <p:sp>
-        <p:nvSpPr>
-          <p:cNvPr id="4" name="TextBox 3"/>
-          <p:cNvSpPr txBox="1"/>
-          <p:nvPr/>
-        </p:nvSpPr>
-        <p:spPr>
-          <a:xfrm>
-            <a:off x="1419497" y="1062446"/>
-            <a:ext cx="2792944" cy="400110"/>
-          </a:xfrm>
-          <a:prstGeom prst="rect">
-            <a:avLst/>
-          </a:prstGeom>
-          <a:noFill/>
-        </p:spPr>
-        <p:txBody>
-          <a:bodyPr wrap="none" rtlCol="0">
-            <a:spAutoFit/>
-          </a:bodyPr>
-          <a:lstStyle/>
-          <a:p>
-            <a:r>
-              <a:rPr lang="bg-BG" sz="2000" i="1" dirty="0" smtClean="0"/>
-              <a:t>Клиентско приложение</a:t>
-            </a:r>
-            <a:endParaRPr lang="bg-BG" sz="2000" i="1" dirty="0"/>
-          </a:p>
-        </p:txBody>
-      </p:sp>
-      <p:pic>
-        <p:nvPicPr>
-          <p:cNvPr id="6" name="Picture 5"/>
-          <p:cNvPicPr>
-            <a:picLocks noChangeAspect="1"/>
-          </p:cNvPicPr>
-          <p:nvPr/>
-        </p:nvPicPr>
-        <p:blipFill>
-          <a:blip r:embed="rId3">
-            <a:extLst>
-              <a:ext uri="{28A0092B-C50C-407E-A947-70E740481C1C}">
-                <a14:useLocalDpi xmlns:a14="http://schemas.microsoft.com/office/drawing/2010/main" val="0"/>
-              </a:ext>
-            </a:extLst>
-          </a:blip>
-          <a:stretch>
-            <a:fillRect/>
-          </a:stretch>
-        </p:blipFill>
-        <p:spPr>
-          <a:xfrm rot="887151">
-            <a:off x="7559947" y="1470262"/>
-            <a:ext cx="2746623" cy="4746165"/>
-          </a:xfrm>
-          <a:prstGeom prst="rect">
-            <a:avLst/>
-          </a:prstGeom>
-        </p:spPr>
-      </p:pic>
-      <p:pic>
-        <p:nvPicPr>
-          <p:cNvPr id="7" name="Picture 6"/>
-          <p:cNvPicPr>
-            <a:picLocks noChangeAspect="1"/>
-          </p:cNvPicPr>
-          <p:nvPr/>
-        </p:nvPicPr>
-        <p:blipFill rotWithShape="1">
-          <a:blip r:embed="rId4">
-            <a:extLst>
-              <a:ext uri="{28A0092B-C50C-407E-A947-70E740481C1C}">
-                <a14:useLocalDpi xmlns:a14="http://schemas.microsoft.com/office/drawing/2010/main" val="0"/>
-              </a:ext>
-            </a:extLst>
-          </a:blip>
-          <a:srcRect l="2074"/>
-          <a:stretch/>
-        </p:blipFill>
-        <p:spPr>
-          <a:xfrm rot="21060269">
-            <a:off x="7439583" y="1345137"/>
-            <a:ext cx="2827212" cy="4952616"/>
-          </a:xfrm>
-          <a:prstGeom prst="rect">
-            <a:avLst/>
-          </a:prstGeom>
-        </p:spPr>
-      </p:pic>
-    </p:spTree>
-    <p:extLst>
-      <p:ext uri="{BB962C8B-B14F-4D97-AF65-F5344CB8AC3E}">
-        <p14:creationId xmlns:p14="http://schemas.microsoft.com/office/powerpoint/2010/main" val="997928325"/>
-      </p:ext>
-    </p:extLst>
-  </p:cSld>
-  <p:clrMapOvr>
-    <a:masterClrMapping/>
-  </p:clrMapOvr>
-  <p:transition spd="slow">
-    <p:push dir="u"/>
-  </p:transition>
-  <p:timing>
-    <p:tnLst>
-      <p:par>
-        <p:cTn id="1" dur="indefinite" restart="never" nodeType="tmRoot">
-          <p:childTnLst>
-            <p:seq concurrent="1" nextAc="seek">
-              <p:cTn id="2" dur="indefinite" nodeType="mainSeq">
-                <p:childTnLst>
-                  <p:par>
-                    <p:cTn id="3" fill="hold">
-                      <p:stCondLst>
-                        <p:cond delay="indefinite"/>
-                      </p:stCondLst>
-                      <p:childTnLst>
-                        <p:par>
-                          <p:cTn id="4" fill="hold">
-                            <p:stCondLst>
-                              <p:cond delay="0"/>
-                            </p:stCondLst>
-                            <p:childTnLst>
-                              <p:par>
-                                <p:cTn id="5" presetID="42" presetClass="entr" presetSubtype="0" fill="hold" grpId="0" nodeType="clickEffect">
-                                  <p:stCondLst>
-                                    <p:cond delay="0"/>
-                                  </p:stCondLst>
-                                  <p:childTnLst>
-                                    <p:set>
-                                      <p:cBhvr>
-                                        <p:cTn id="6" dur="1" fill="hold">
-                                          <p:stCondLst>
-                                            <p:cond delay="0"/>
-                                          </p:stCondLst>
-                                        </p:cTn>
-                                        <p:tgtEl>
-                                          <p:spTgt spid="2"/>
-                                        </p:tgtEl>
-                                        <p:attrNameLst>
-                                          <p:attrName>style.visibility</p:attrName>
-                                        </p:attrNameLst>
-                                      </p:cBhvr>
-                                      <p:to>
-                                        <p:strVal val="visible"/>
-                                      </p:to>
-                                    </p:set>
-                                    <p:animEffect transition="in" filter="fade">
-                                      <p:cBhvr>
-                                        <p:cTn id="7" dur="1000"/>
-                                        <p:tgtEl>
-                                          <p:spTgt spid="2"/>
-                                        </p:tgtEl>
-                                      </p:cBhvr>
-                                    </p:animEffect>
-                                    <p:anim calcmode="lin" valueType="num">
-                                      <p:cBhvr>
-                                        <p:cTn id="8" dur="1000" fill="hold"/>
-                                        <p:tgtEl>
-                                          <p:spTgt spid="2"/>
-                                        </p:tgtEl>
-                                        <p:attrNameLst>
-                                          <p:attrName>ppt_x</p:attrName>
-                                        </p:attrNameLst>
-                                      </p:cBhvr>
-                                      <p:tavLst>
-                                        <p:tav tm="0">
-                                          <p:val>
-                                            <p:strVal val="#ppt_x"/>
-                                          </p:val>
-                                        </p:tav>
-                                        <p:tav tm="100000">
-                                          <p:val>
-                                            <p:strVal val="#ppt_x"/>
-                                          </p:val>
-                                        </p:tav>
-                                      </p:tavLst>
-                                    </p:anim>
-                                    <p:anim calcmode="lin" valueType="num">
-                                      <p:cBhvr>
-                                        <p:cTn id="9" dur="1000" fill="hold"/>
-                                        <p:tgtEl>
-                                          <p:spTgt spid="2"/>
-                                        </p:tgtEl>
-                                        <p:attrNameLst>
-                                          <p:attrName>ppt_y</p:attrName>
-                                        </p:attrNameLst>
-                                      </p:cBhvr>
-                                      <p:tavLst>
-                                        <p:tav tm="0">
-                                          <p:val>
-                                            <p:strVal val="#ppt_y+.1"/>
-                                          </p:val>
-                                        </p:tav>
-                                        <p:tav tm="100000">
-                                          <p:val>
-                                            <p:strVal val="#ppt_y"/>
-                                          </p:val>
-                                        </p:tav>
-                                      </p:tavLst>
-                                    </p:anim>
-                                  </p:childTnLst>
-                                </p:cTn>
-                              </p:par>
-                            </p:childTnLst>
-                          </p:cTn>
-                        </p:par>
-                        <p:par>
-                          <p:cTn id="10" fill="hold">
-                            <p:stCondLst>
-                              <p:cond delay="1000"/>
-                            </p:stCondLst>
-                            <p:childTnLst>
-                              <p:par>
-                                <p:cTn id="11" presetID="22" presetClass="entr" presetSubtype="8" fill="hold" grpId="0" nodeType="afterEffect">
-                                  <p:stCondLst>
-                                    <p:cond delay="0"/>
-                                  </p:stCondLst>
-                                  <p:childTnLst>
-                                    <p:set>
-                                      <p:cBhvr>
-                                        <p:cTn id="12" dur="1" fill="hold">
-                                          <p:stCondLst>
-                                            <p:cond delay="0"/>
-                                          </p:stCondLst>
-                                        </p:cTn>
-                                        <p:tgtEl>
-                                          <p:spTgt spid="4"/>
-                                        </p:tgtEl>
-                                        <p:attrNameLst>
-                                          <p:attrName>style.visibility</p:attrName>
-                                        </p:attrNameLst>
-                                      </p:cBhvr>
-                                      <p:to>
-                                        <p:strVal val="visible"/>
-                                      </p:to>
-                                    </p:set>
-                                    <p:animEffect transition="in" filter="wipe(left)">
-                                      <p:cBhvr>
-                                        <p:cTn id="13" dur="500"/>
-                                        <p:tgtEl>
-                                          <p:spTgt spid="4"/>
-                                        </p:tgtEl>
-                                      </p:cBhvr>
-                                    </p:animEffect>
-                                  </p:childTnLst>
-                                </p:cTn>
-                              </p:par>
-                            </p:childTnLst>
-                          </p:cTn>
-                        </p:par>
-                      </p:childTnLst>
-                    </p:cTn>
-                  </p:par>
-                  <p:par>
-                    <p:cTn id="14" fill="hold">
-                      <p:stCondLst>
-                        <p:cond delay="indefinite"/>
-                      </p:stCondLst>
-                      <p:childTnLst>
-                        <p:par>
-                          <p:cTn id="15" fill="hold">
-                            <p:stCondLst>
-                              <p:cond delay="0"/>
-                            </p:stCondLst>
-                            <p:childTnLst>
-                              <p:par>
-                                <p:cTn id="16" presetID="10" presetClass="entr" presetSubtype="0" fill="hold" grpId="0" nodeType="clickEffect">
-                                  <p:stCondLst>
-                                    <p:cond delay="0"/>
-                                  </p:stCondLst>
-                                  <p:childTnLst>
-                                    <p:set>
-                                      <p:cBhvr>
-                                        <p:cTn id="17" dur="1" fill="hold">
-                                          <p:stCondLst>
-                                            <p:cond delay="0"/>
-                                          </p:stCondLst>
-                                        </p:cTn>
-                                        <p:tgtEl>
-                                          <p:spTgt spid="3">
-                                            <p:txEl>
-                                              <p:pRg st="0" end="0"/>
-                                            </p:txEl>
-                                          </p:spTgt>
-                                        </p:tgtEl>
-                                        <p:attrNameLst>
-                                          <p:attrName>style.visibility</p:attrName>
-                                        </p:attrNameLst>
-                                      </p:cBhvr>
-                                      <p:to>
-                                        <p:strVal val="visible"/>
-                                      </p:to>
-                                    </p:set>
-                                    <p:animEffect transition="in" filter="fade">
-                                      <p:cBhvr>
-                                        <p:cTn id="18" dur="500"/>
-                                        <p:tgtEl>
-                                          <p:spTgt spid="3">
-                                            <p:txEl>
-                                              <p:pRg st="0" end="0"/>
-                                            </p:txEl>
-                                          </p:spTgt>
-                                        </p:tgtEl>
-                                      </p:cBhvr>
-                                    </p:animEffect>
-                                  </p:childTnLst>
-                                </p:cTn>
-                              </p:par>
-                            </p:childTnLst>
-                          </p:cTn>
-                        </p:par>
-                        <p:par>
-                          <p:cTn id="19" fill="hold">
-                            <p:stCondLst>
-                              <p:cond delay="500"/>
-                            </p:stCondLst>
-                            <p:childTnLst>
-                              <p:par>
-                                <p:cTn id="20" presetID="31" presetClass="entr" presetSubtype="0" fill="hold" nodeType="afterEffect">
-                                  <p:stCondLst>
-                                    <p:cond delay="0"/>
-                                  </p:stCondLst>
-                                  <p:childTnLst>
-                                    <p:set>
-                                      <p:cBhvr>
-                                        <p:cTn id="21" dur="1" fill="hold">
-                                          <p:stCondLst>
-                                            <p:cond delay="0"/>
-                                          </p:stCondLst>
-                                        </p:cTn>
-                                        <p:tgtEl>
-                                          <p:spTgt spid="8"/>
-                                        </p:tgtEl>
-                                        <p:attrNameLst>
-                                          <p:attrName>style.visibility</p:attrName>
-                                        </p:attrNameLst>
-                                      </p:cBhvr>
-                                      <p:to>
-                                        <p:strVal val="visible"/>
-                                      </p:to>
-                                    </p:set>
-                                    <p:anim calcmode="lin" valueType="num">
-                                      <p:cBhvr>
-                                        <p:cTn id="22" dur="1000" fill="hold"/>
-                                        <p:tgtEl>
-                                          <p:spTgt spid="8"/>
-                                        </p:tgtEl>
-                                        <p:attrNameLst>
-                                          <p:attrName>ppt_w</p:attrName>
-                                        </p:attrNameLst>
-                                      </p:cBhvr>
-                                      <p:tavLst>
-                                        <p:tav tm="0">
-                                          <p:val>
-                                            <p:fltVal val="0"/>
-                                          </p:val>
-                                        </p:tav>
-                                        <p:tav tm="100000">
-                                          <p:val>
-                                            <p:strVal val="#ppt_w"/>
-                                          </p:val>
-                                        </p:tav>
-                                      </p:tavLst>
-                                    </p:anim>
-                                    <p:anim calcmode="lin" valueType="num">
-                                      <p:cBhvr>
-                                        <p:cTn id="23" dur="1000" fill="hold"/>
-                                        <p:tgtEl>
-                                          <p:spTgt spid="8"/>
-                                        </p:tgtEl>
-                                        <p:attrNameLst>
-                                          <p:attrName>ppt_h</p:attrName>
-                                        </p:attrNameLst>
-                                      </p:cBhvr>
-                                      <p:tavLst>
-                                        <p:tav tm="0">
-                                          <p:val>
-                                            <p:fltVal val="0"/>
-                                          </p:val>
-                                        </p:tav>
-                                        <p:tav tm="100000">
-                                          <p:val>
-                                            <p:strVal val="#ppt_h"/>
-                                          </p:val>
-                                        </p:tav>
-                                      </p:tavLst>
-                                    </p:anim>
-                                    <p:anim calcmode="lin" valueType="num">
-                                      <p:cBhvr>
-                                        <p:cTn id="24" dur="1000" fill="hold"/>
-                                        <p:tgtEl>
-                                          <p:spTgt spid="8"/>
-                                        </p:tgtEl>
-                                        <p:attrNameLst>
-                                          <p:attrName>style.rotation</p:attrName>
-                                        </p:attrNameLst>
-                                      </p:cBhvr>
-                                      <p:tavLst>
-                                        <p:tav tm="0">
-                                          <p:val>
-                                            <p:fltVal val="90"/>
-                                          </p:val>
-                                        </p:tav>
-                                        <p:tav tm="100000">
-                                          <p:val>
-                                            <p:fltVal val="0"/>
-                                          </p:val>
-                                        </p:tav>
-                                      </p:tavLst>
-                                    </p:anim>
-                                    <p:animEffect transition="in" filter="fade">
-                                      <p:cBhvr>
-                                        <p:cTn id="25" dur="1000"/>
-                                        <p:tgtEl>
-                                          <p:spTgt spid="8"/>
-                                        </p:tgtEl>
-                                      </p:cBhvr>
-                                    </p:animEffect>
-                                  </p:childTnLst>
-                                </p:cTn>
-                              </p:par>
-                            </p:childTnLst>
-                          </p:cTn>
-                        </p:par>
-                      </p:childTnLst>
-                    </p:cTn>
-                  </p:par>
-                  <p:par>
-                    <p:cTn id="26" fill="hold">
-                      <p:stCondLst>
-                        <p:cond delay="indefinite"/>
-                      </p:stCondLst>
-                      <p:childTnLst>
-                        <p:par>
-                          <p:cTn id="27" fill="hold">
-                            <p:stCondLst>
-                              <p:cond delay="0"/>
-                            </p:stCondLst>
-                            <p:childTnLst>
-                              <p:par>
-                                <p:cTn id="28" presetID="10" presetClass="entr" presetSubtype="0" fill="hold" grpId="0" nodeType="clickEffect">
-                                  <p:stCondLst>
-                                    <p:cond delay="0"/>
-                                  </p:stCondLst>
-                                  <p:childTnLst>
-                                    <p:set>
-                                      <p:cBhvr>
-                                        <p:cTn id="29" dur="1" fill="hold">
-                                          <p:stCondLst>
-                                            <p:cond delay="0"/>
-                                          </p:stCondLst>
-                                        </p:cTn>
-                                        <p:tgtEl>
-                                          <p:spTgt spid="3">
-                                            <p:txEl>
-                                              <p:pRg st="1" end="1"/>
-                                            </p:txEl>
-                                          </p:spTgt>
-                                        </p:tgtEl>
-                                        <p:attrNameLst>
-                                          <p:attrName>style.visibility</p:attrName>
-                                        </p:attrNameLst>
-                                      </p:cBhvr>
-                                      <p:to>
-                                        <p:strVal val="visible"/>
-                                      </p:to>
-                                    </p:set>
-                                    <p:animEffect transition="in" filter="fade">
-                                      <p:cBhvr>
-                                        <p:cTn id="30" dur="500"/>
-                                        <p:tgtEl>
-                                          <p:spTgt spid="3">
-                                            <p:txEl>
-                                              <p:pRg st="1" end="1"/>
-                                            </p:txEl>
-                                          </p:spTgt>
-                                        </p:tgtEl>
-                                      </p:cBhvr>
-                                    </p:animEffect>
-                                  </p:childTnLst>
-                                </p:cTn>
-                              </p:par>
-                            </p:childTnLst>
-                          </p:cTn>
-                        </p:par>
-                        <p:par>
-                          <p:cTn id="31" fill="hold">
-                            <p:stCondLst>
-                              <p:cond delay="500"/>
-                            </p:stCondLst>
-                            <p:childTnLst>
-                              <p:par>
-                                <p:cTn id="32" presetID="10" presetClass="exit" presetSubtype="0" fill="hold" nodeType="afterEffect">
-                                  <p:stCondLst>
-                                    <p:cond delay="0"/>
-                                  </p:stCondLst>
-                                  <p:childTnLst>
-                                    <p:animEffect transition="out" filter="fade">
-                                      <p:cBhvr>
-                                        <p:cTn id="33" dur="500"/>
-                                        <p:tgtEl>
-                                          <p:spTgt spid="8"/>
-                                        </p:tgtEl>
-                                      </p:cBhvr>
-                                    </p:animEffect>
-                                    <p:set>
-                                      <p:cBhvr>
-                                        <p:cTn id="34" dur="1" fill="hold">
-                                          <p:stCondLst>
-                                            <p:cond delay="499"/>
-                                          </p:stCondLst>
-                                        </p:cTn>
-                                        <p:tgtEl>
-                                          <p:spTgt spid="8"/>
-                                        </p:tgtEl>
-                                        <p:attrNameLst>
-                                          <p:attrName>style.visibility</p:attrName>
-                                        </p:attrNameLst>
-                                      </p:cBhvr>
-                                      <p:to>
-                                        <p:strVal val="hidden"/>
-                                      </p:to>
-                                    </p:set>
-                                  </p:childTnLst>
-                                </p:cTn>
-                              </p:par>
-                              <p:par>
-                                <p:cTn id="35" presetID="6" presetClass="entr" presetSubtype="16" fill="hold" nodeType="withEffect">
-                                  <p:stCondLst>
-                                    <p:cond delay="0"/>
-                                  </p:stCondLst>
-                                  <p:childTnLst>
-                                    <p:set>
-                                      <p:cBhvr>
-                                        <p:cTn id="36" dur="1" fill="hold">
-                                          <p:stCondLst>
-                                            <p:cond delay="0"/>
-                                          </p:stCondLst>
-                                        </p:cTn>
-                                        <p:tgtEl>
-                                          <p:spTgt spid="6"/>
-                                        </p:tgtEl>
-                                        <p:attrNameLst>
-                                          <p:attrName>style.visibility</p:attrName>
-                                        </p:attrNameLst>
-                                      </p:cBhvr>
-                                      <p:to>
-                                        <p:strVal val="visible"/>
-                                      </p:to>
-                                    </p:set>
-                                    <p:animEffect transition="in" filter="circle(in)">
-                                      <p:cBhvr>
-                                        <p:cTn id="37" dur="2000"/>
-                                        <p:tgtEl>
-                                          <p:spTgt spid="6"/>
-                                        </p:tgtEl>
-                                      </p:cBhvr>
-                                    </p:animEffect>
-                                  </p:childTnLst>
-                                </p:cTn>
-                              </p:par>
-                            </p:childTnLst>
-                          </p:cTn>
-                        </p:par>
-                      </p:childTnLst>
-                    </p:cTn>
-                  </p:par>
-                  <p:par>
-                    <p:cTn id="38" fill="hold">
-                      <p:stCondLst>
-                        <p:cond delay="indefinite"/>
-                      </p:stCondLst>
-                      <p:childTnLst>
-                        <p:par>
-                          <p:cTn id="39" fill="hold">
-                            <p:stCondLst>
-                              <p:cond delay="0"/>
-                            </p:stCondLst>
-                            <p:childTnLst>
-                              <p:par>
-                                <p:cTn id="40" presetID="10" presetClass="entr" presetSubtype="0" fill="hold" grpId="0" nodeType="clickEffect">
-                                  <p:stCondLst>
-                                    <p:cond delay="0"/>
-                                  </p:stCondLst>
-                                  <p:childTnLst>
-                                    <p:set>
-                                      <p:cBhvr>
-                                        <p:cTn id="41" dur="1" fill="hold">
-                                          <p:stCondLst>
-                                            <p:cond delay="0"/>
-                                          </p:stCondLst>
-                                        </p:cTn>
-                                        <p:tgtEl>
-                                          <p:spTgt spid="3">
-                                            <p:txEl>
-                                              <p:pRg st="2" end="2"/>
-                                            </p:txEl>
-                                          </p:spTgt>
-                                        </p:tgtEl>
-                                        <p:attrNameLst>
-                                          <p:attrName>style.visibility</p:attrName>
-                                        </p:attrNameLst>
-                                      </p:cBhvr>
-                                      <p:to>
-                                        <p:strVal val="visible"/>
-                                      </p:to>
-                                    </p:set>
-                                    <p:animEffect transition="in" filter="fade">
-                                      <p:cBhvr>
-                                        <p:cTn id="42" dur="500"/>
-                                        <p:tgtEl>
-                                          <p:spTgt spid="3">
-                                            <p:txEl>
-                                              <p:pRg st="2" end="2"/>
-                                            </p:txEl>
-                                          </p:spTgt>
-                                        </p:tgtEl>
-                                      </p:cBhvr>
-                                    </p:animEffect>
-                                  </p:childTnLst>
-                                </p:cTn>
-                              </p:par>
-                            </p:childTnLst>
-                          </p:cTn>
-                        </p:par>
-                        <p:par>
-                          <p:cTn id="43" fill="hold">
-                            <p:stCondLst>
-                              <p:cond delay="500"/>
-                            </p:stCondLst>
-                            <p:childTnLst>
-                              <p:par>
-                                <p:cTn id="44" presetID="21" presetClass="entr" presetSubtype="1" fill="hold" nodeType="afterEffect">
-                                  <p:stCondLst>
-                                    <p:cond delay="0"/>
-                                  </p:stCondLst>
-                                  <p:childTnLst>
-                                    <p:set>
-                                      <p:cBhvr>
-                                        <p:cTn id="45" dur="1" fill="hold">
-                                          <p:stCondLst>
-                                            <p:cond delay="0"/>
-                                          </p:stCondLst>
-                                        </p:cTn>
-                                        <p:tgtEl>
-                                          <p:spTgt spid="7"/>
-                                        </p:tgtEl>
-                                        <p:attrNameLst>
-                                          <p:attrName>style.visibility</p:attrName>
-                                        </p:attrNameLst>
-                                      </p:cBhvr>
-                                      <p:to>
-                                        <p:strVal val="visible"/>
-                                      </p:to>
-                                    </p:set>
-                                    <p:animEffect transition="in" filter="wheel(1)">
-                                      <p:cBhvr>
-                                        <p:cTn id="46" dur="2000"/>
-                                        <p:tgtEl>
-                                          <p:spTgt spid="7"/>
-                                        </p:tgtEl>
-                                      </p:cBhvr>
-                                    </p:animEffect>
-                                  </p:childTnLst>
-                                </p:cTn>
-                              </p:par>
-                            </p:childTnLst>
-                          </p:cTn>
-                        </p:par>
-                      </p:childTnLst>
-                    </p:cTn>
-                  </p:par>
-                </p:childTnLst>
-              </p:cTn>
-              <p:prevCondLst>
-                <p:cond evt="onPrev" delay="0">
-                  <p:tgtEl>
-                    <p:sldTgt/>
-                  </p:tgtEl>
-                </p:cond>
-              </p:prevCondLst>
-              <p:nextCondLst>
-                <p:cond evt="onNext" delay="0">
-                  <p:tgtEl>
-                    <p:sldTgt/>
-                  </p:tgtEl>
-                </p:cond>
-              </p:nextCondLst>
-            </p:seq>
-          </p:childTnLst>
-        </p:cTn>
-      </p:par>
-    </p:tnLst>
-    <p:bldLst>
-      <p:bldP spid="2" grpId="0"/>
-      <p:bldP spid="3" grpId="0" uiExpand="1" build="p"/>
-      <p:bldP spid="4" grpId="0"/>
-    </p:bldLst>
-  </p:timing>
-</p:sld>
-</file>
-
-<file path=ppt/slides/slide6.xml><?xml version="1.0" encoding="utf-8"?>
-<p:sld xmlns:a="http://schemas.openxmlformats.org/drawingml/2006/main" xmlns:r="http://schemas.openxmlformats.org/officeDocument/2006/relationships" xmlns:p="http://schemas.openxmlformats.org/presentationml/2006/main">
-  <p:cSld>
-    <p:spTree>
-      <p:nvGrpSpPr>
-        <p:cNvPr id="1" name=""/>
-        <p:cNvGrpSpPr/>
-        <p:nvPr/>
-      </p:nvGrpSpPr>
-      <p:grpSpPr>
-        <a:xfrm>
-          <a:off x="0" y="0"/>
-          <a:ext cx="0" cy="0"/>
-          <a:chOff x="0" y="0"/>
-          <a:chExt cx="0" cy="0"/>
-        </a:xfrm>
-      </p:grpSpPr>
-      <p:pic>
-        <p:nvPicPr>
-          <p:cNvPr id="8" name="Picture 7"/>
-          <p:cNvPicPr>
-            <a:picLocks noChangeAspect="1"/>
-          </p:cNvPicPr>
-          <p:nvPr/>
-        </p:nvPicPr>
-        <p:blipFill>
-          <a:blip r:embed="rId2">
-            <a:extLst>
-              <a:ext uri="{28A0092B-C50C-407E-A947-70E740481C1C}">
-                <a14:useLocalDpi xmlns:a14="http://schemas.microsoft.com/office/drawing/2010/main" val="0"/>
-              </a:ext>
-            </a:extLst>
-          </a:blip>
-          <a:stretch>
-            <a:fillRect/>
-          </a:stretch>
-        </p:blipFill>
-        <p:spPr>
-          <a:xfrm>
-            <a:off x="1832636" y="2424397"/>
-            <a:ext cx="2970501" cy="2970501"/>
-          </a:xfrm>
-          <a:prstGeom prst="rect">
-            <a:avLst/>
-          </a:prstGeom>
-        </p:spPr>
-      </p:pic>
-      <p:sp>
-        <p:nvSpPr>
-          <p:cNvPr id="2" name="Title 1"/>
-          <p:cNvSpPr>
-            <a:spLocks noGrp="1"/>
-          </p:cNvSpPr>
-          <p:nvPr>
-            <p:ph type="title"/>
-          </p:nvPr>
-        </p:nvSpPr>
-        <p:spPr/>
-        <p:txBody>
-          <a:bodyPr/>
-          <a:lstStyle/>
-          <a:p>
-            <a:r>
-              <a:rPr lang="bg-BG" dirty="0" smtClean="0"/>
-              <a:t>Описание на решението (2)</a:t>
-            </a:r>
-            <a:br>
-              <a:rPr lang="bg-BG" dirty="0" smtClean="0"/>
-            </a:br>
-            <a:endParaRPr lang="bg-BG" sz="4800" dirty="0"/>
-          </a:p>
-        </p:txBody>
-      </p:sp>
-      <p:sp>
-        <p:nvSpPr>
-          <p:cNvPr id="3" name="Content Placeholder 2"/>
-          <p:cNvSpPr>
-            <a:spLocks noGrp="1"/>
-          </p:cNvSpPr>
-          <p:nvPr>
-            <p:ph idx="1"/>
-          </p:nvPr>
-        </p:nvSpPr>
-        <p:spPr>
-          <a:xfrm>
-            <a:off x="6172021" y="2320836"/>
-            <a:ext cx="5776139" cy="3593591"/>
-          </a:xfrm>
-        </p:spPr>
-        <p:txBody>
-          <a:bodyPr>
-            <a:normAutofit lnSpcReduction="10000"/>
-          </a:bodyPr>
-          <a:lstStyle/>
-          <a:p>
-            <a:r>
-              <a:rPr lang="bg-BG" dirty="0" smtClean="0"/>
-              <a:t>Влизане в профила като те задължително трябва да отговарят на дадена фирма и автомобил</a:t>
-            </a:r>
-          </a:p>
-          <a:p>
-            <a:r>
-              <a:rPr lang="bg-BG" dirty="0" smtClean="0"/>
-              <a:t>С едно натискане на бутона „Търси заявки“ шофьорите получават всички заявки в определен радиус</a:t>
-            </a:r>
-          </a:p>
-          <a:p>
-            <a:r>
-              <a:rPr lang="bg-BG" dirty="0" smtClean="0"/>
-              <a:t>Преглед на заявката </a:t>
-            </a:r>
-          </a:p>
-          <a:p>
-            <a:r>
-              <a:rPr lang="bg-BG" dirty="0" smtClean="0"/>
-              <a:t>Приемането й чрез бутона „Приеми заявката“</a:t>
-            </a:r>
-          </a:p>
-          <a:p>
-            <a:r>
-              <a:rPr lang="bg-BG" dirty="0" smtClean="0"/>
-              <a:t>Приключване на текущия курс и отново търсене на нови заявки</a:t>
-            </a:r>
-            <a:endParaRPr lang="bg-BG" dirty="0"/>
-          </a:p>
-        </p:txBody>
-      </p:sp>
-      <p:sp>
-        <p:nvSpPr>
-          <p:cNvPr id="4" name="TextBox 3"/>
-          <p:cNvSpPr txBox="1"/>
-          <p:nvPr/>
-        </p:nvSpPr>
-        <p:spPr>
-          <a:xfrm>
-            <a:off x="1419497" y="1062446"/>
-            <a:ext cx="3246851" cy="400110"/>
-          </a:xfrm>
-          <a:prstGeom prst="rect">
-            <a:avLst/>
-          </a:prstGeom>
-          <a:noFill/>
-        </p:spPr>
-        <p:txBody>
-          <a:bodyPr wrap="none" rtlCol="0">
-            <a:spAutoFit/>
-          </a:bodyPr>
-          <a:lstStyle/>
-          <a:p>
-            <a:r>
-              <a:rPr lang="bg-BG" sz="2000" i="1" dirty="0" smtClean="0"/>
-              <a:t>Приложение за шофьорите</a:t>
-            </a:r>
-            <a:endParaRPr lang="bg-BG" sz="2000" i="1" dirty="0"/>
-          </a:p>
-        </p:txBody>
-      </p:sp>
-      <p:pic>
-        <p:nvPicPr>
-          <p:cNvPr id="5" name="Picture 4"/>
-          <p:cNvPicPr>
-            <a:picLocks noChangeAspect="1"/>
-          </p:cNvPicPr>
-          <p:nvPr/>
-        </p:nvPicPr>
-        <p:blipFill>
-          <a:blip r:embed="rId3">
-            <a:extLst>
-              <a:ext uri="{28A0092B-C50C-407E-A947-70E740481C1C}">
-                <a14:useLocalDpi xmlns:a14="http://schemas.microsoft.com/office/drawing/2010/main" val="0"/>
-              </a:ext>
-            </a:extLst>
-          </a:blip>
-          <a:stretch>
-            <a:fillRect/>
-          </a:stretch>
-        </p:blipFill>
-        <p:spPr>
-          <a:xfrm>
-            <a:off x="1419497" y="2701736"/>
-            <a:ext cx="4168030" cy="2243362"/>
-          </a:xfrm>
-          <a:prstGeom prst="rect">
-            <a:avLst/>
-          </a:prstGeom>
-          <a:ln>
-            <a:solidFill>
-              <a:schemeClr val="tx1"/>
-            </a:solidFill>
-          </a:ln>
-        </p:spPr>
-      </p:pic>
-      <p:pic>
-        <p:nvPicPr>
-          <p:cNvPr id="6" name="Picture 5"/>
-          <p:cNvPicPr>
-            <a:picLocks noChangeAspect="1"/>
-          </p:cNvPicPr>
-          <p:nvPr/>
-        </p:nvPicPr>
-        <p:blipFill>
-          <a:blip r:embed="rId4">
-            <a:extLst>
-              <a:ext uri="{28A0092B-C50C-407E-A947-70E740481C1C}">
-                <a14:useLocalDpi xmlns:a14="http://schemas.microsoft.com/office/drawing/2010/main" val="0"/>
-              </a:ext>
-            </a:extLst>
-          </a:blip>
-          <a:stretch>
-            <a:fillRect/>
-          </a:stretch>
-        </p:blipFill>
-        <p:spPr>
-          <a:xfrm rot="992012">
-            <a:off x="1503630" y="2726659"/>
-            <a:ext cx="3998904" cy="2143556"/>
-          </a:xfrm>
-          <a:prstGeom prst="rect">
-            <a:avLst/>
-          </a:prstGeom>
-          <a:ln>
-            <a:solidFill>
-              <a:schemeClr val="tx1"/>
-            </a:solidFill>
-          </a:ln>
-        </p:spPr>
-      </p:pic>
-      <p:pic>
-        <p:nvPicPr>
-          <p:cNvPr id="7" name="Picture 6"/>
-          <p:cNvPicPr>
-            <a:picLocks noChangeAspect="1"/>
-          </p:cNvPicPr>
-          <p:nvPr/>
-        </p:nvPicPr>
-        <p:blipFill>
-          <a:blip r:embed="rId5">
-            <a:extLst>
-              <a:ext uri="{28A0092B-C50C-407E-A947-70E740481C1C}">
-                <a14:useLocalDpi xmlns:a14="http://schemas.microsoft.com/office/drawing/2010/main" val="0"/>
-              </a:ext>
-            </a:extLst>
-          </a:blip>
-          <a:stretch>
-            <a:fillRect/>
-          </a:stretch>
-        </p:blipFill>
-        <p:spPr>
-          <a:xfrm rot="20683741">
-            <a:off x="1383632" y="2660391"/>
-            <a:ext cx="4238901" cy="2276092"/>
-          </a:xfrm>
-          <a:prstGeom prst="rect">
-            <a:avLst/>
-          </a:prstGeom>
-          <a:ln>
-            <a:solidFill>
-              <a:schemeClr val="tx1"/>
-            </a:solidFill>
-          </a:ln>
-        </p:spPr>
-      </p:pic>
-    </p:spTree>
-    <p:extLst>
-      <p:ext uri="{BB962C8B-B14F-4D97-AF65-F5344CB8AC3E}">
-        <p14:creationId xmlns:p14="http://schemas.microsoft.com/office/powerpoint/2010/main" val="1067278197"/>
-      </p:ext>
-    </p:extLst>
-  </p:cSld>
-  <p:clrMapOvr>
-    <a:masterClrMapping/>
-  </p:clrMapOvr>
-  <p:transition spd="slow">
-    <p:push dir="u"/>
-  </p:transition>
-  <p:timing>
-    <p:tnLst>
-      <p:par>
-        <p:cTn id="1" dur="indefinite" restart="never" nodeType="tmRoot">
-          <p:childTnLst>
-            <p:seq concurrent="1" nextAc="seek">
-              <p:cTn id="2" dur="indefinite" nodeType="mainSeq">
-                <p:childTnLst>
-                  <p:par>
-                    <p:cTn id="3" fill="hold">
-                      <p:stCondLst>
-                        <p:cond delay="indefinite"/>
-                      </p:stCondLst>
-                      <p:childTnLst>
-                        <p:par>
-                          <p:cTn id="4" fill="hold">
-                            <p:stCondLst>
-                              <p:cond delay="0"/>
-                            </p:stCondLst>
-                            <p:childTnLst>
-                              <p:par>
-                                <p:cTn id="5" presetID="42" presetClass="entr" presetSubtype="0" fill="hold" grpId="0" nodeType="clickEffect">
-                                  <p:stCondLst>
-                                    <p:cond delay="0"/>
-                                  </p:stCondLst>
-                                  <p:childTnLst>
-                                    <p:set>
-                                      <p:cBhvr>
-                                        <p:cTn id="6" dur="1" fill="hold">
-                                          <p:stCondLst>
-                                            <p:cond delay="0"/>
-                                          </p:stCondLst>
-                                        </p:cTn>
-                                        <p:tgtEl>
-                                          <p:spTgt spid="2"/>
-                                        </p:tgtEl>
-                                        <p:attrNameLst>
-                                          <p:attrName>style.visibility</p:attrName>
-                                        </p:attrNameLst>
-                                      </p:cBhvr>
-                                      <p:to>
-                                        <p:strVal val="visible"/>
-                                      </p:to>
-                                    </p:set>
-                                    <p:animEffect transition="in" filter="fade">
-                                      <p:cBhvr>
-                                        <p:cTn id="7" dur="1000"/>
-                                        <p:tgtEl>
-                                          <p:spTgt spid="2"/>
-                                        </p:tgtEl>
-                                      </p:cBhvr>
-                                    </p:animEffect>
-                                    <p:anim calcmode="lin" valueType="num">
-                                      <p:cBhvr>
-                                        <p:cTn id="8" dur="1000" fill="hold"/>
-                                        <p:tgtEl>
-                                          <p:spTgt spid="2"/>
-                                        </p:tgtEl>
-                                        <p:attrNameLst>
-                                          <p:attrName>ppt_x</p:attrName>
-                                        </p:attrNameLst>
-                                      </p:cBhvr>
-                                      <p:tavLst>
-                                        <p:tav tm="0">
-                                          <p:val>
-                                            <p:strVal val="#ppt_x"/>
-                                          </p:val>
-                                        </p:tav>
-                                        <p:tav tm="100000">
-                                          <p:val>
-                                            <p:strVal val="#ppt_x"/>
-                                          </p:val>
-                                        </p:tav>
-                                      </p:tavLst>
-                                    </p:anim>
-                                    <p:anim calcmode="lin" valueType="num">
-                                      <p:cBhvr>
-                                        <p:cTn id="9" dur="1000" fill="hold"/>
-                                        <p:tgtEl>
-                                          <p:spTgt spid="2"/>
-                                        </p:tgtEl>
-                                        <p:attrNameLst>
-                                          <p:attrName>ppt_y</p:attrName>
-                                        </p:attrNameLst>
-                                      </p:cBhvr>
-                                      <p:tavLst>
-                                        <p:tav tm="0">
-                                          <p:val>
-                                            <p:strVal val="#ppt_y+.1"/>
-                                          </p:val>
-                                        </p:tav>
-                                        <p:tav tm="100000">
-                                          <p:val>
-                                            <p:strVal val="#ppt_y"/>
-                                          </p:val>
-                                        </p:tav>
-                                      </p:tavLst>
-                                    </p:anim>
-                                  </p:childTnLst>
-                                </p:cTn>
-                              </p:par>
-                            </p:childTnLst>
-                          </p:cTn>
-                        </p:par>
-                        <p:par>
-                          <p:cTn id="10" fill="hold">
-                            <p:stCondLst>
-                              <p:cond delay="1000"/>
-                            </p:stCondLst>
-                            <p:childTnLst>
-                              <p:par>
-                                <p:cTn id="11" presetID="22" presetClass="entr" presetSubtype="8" fill="hold" grpId="0" nodeType="afterEffect">
-                                  <p:stCondLst>
-                                    <p:cond delay="0"/>
-                                  </p:stCondLst>
-                                  <p:childTnLst>
-                                    <p:set>
-                                      <p:cBhvr>
-                                        <p:cTn id="12" dur="1" fill="hold">
-                                          <p:stCondLst>
-                                            <p:cond delay="0"/>
-                                          </p:stCondLst>
-                                        </p:cTn>
-                                        <p:tgtEl>
-                                          <p:spTgt spid="4"/>
-                                        </p:tgtEl>
-                                        <p:attrNameLst>
-                                          <p:attrName>style.visibility</p:attrName>
-                                        </p:attrNameLst>
-                                      </p:cBhvr>
-                                      <p:to>
-                                        <p:strVal val="visible"/>
-                                      </p:to>
-                                    </p:set>
-                                    <p:animEffect transition="in" filter="wipe(left)">
-                                      <p:cBhvr>
-                                        <p:cTn id="13" dur="500"/>
-                                        <p:tgtEl>
-                                          <p:spTgt spid="4"/>
-                                        </p:tgtEl>
-                                      </p:cBhvr>
-                                    </p:animEffect>
-                                  </p:childTnLst>
-                                </p:cTn>
-                              </p:par>
-                            </p:childTnLst>
-                          </p:cTn>
-                        </p:par>
-                      </p:childTnLst>
-                    </p:cTn>
-                  </p:par>
-                  <p:par>
-                    <p:cTn id="14" fill="hold">
-                      <p:stCondLst>
-                        <p:cond delay="indefinite"/>
-                      </p:stCondLst>
-                      <p:childTnLst>
-                        <p:par>
-                          <p:cTn id="15" fill="hold">
-                            <p:stCondLst>
-                              <p:cond delay="0"/>
-                            </p:stCondLst>
-                            <p:childTnLst>
-                              <p:par>
-                                <p:cTn id="16" presetID="10" presetClass="entr" presetSubtype="0" fill="hold" grpId="0" nodeType="clickEffect">
-                                  <p:stCondLst>
-                                    <p:cond delay="0"/>
-                                  </p:stCondLst>
-                                  <p:childTnLst>
-                                    <p:set>
-                                      <p:cBhvr>
-                                        <p:cTn id="17" dur="1" fill="hold">
-                                          <p:stCondLst>
-                                            <p:cond delay="0"/>
-                                          </p:stCondLst>
-                                        </p:cTn>
-                                        <p:tgtEl>
-                                          <p:spTgt spid="3">
-                                            <p:txEl>
-                                              <p:pRg st="0" end="0"/>
-                                            </p:txEl>
-                                          </p:spTgt>
-                                        </p:tgtEl>
-                                        <p:attrNameLst>
-                                          <p:attrName>style.visibility</p:attrName>
-                                        </p:attrNameLst>
-                                      </p:cBhvr>
-                                      <p:to>
-                                        <p:strVal val="visible"/>
-                                      </p:to>
-                                    </p:set>
-                                    <p:animEffect transition="in" filter="fade">
-                                      <p:cBhvr>
-                                        <p:cTn id="18" dur="500"/>
-                                        <p:tgtEl>
-                                          <p:spTgt spid="3">
-                                            <p:txEl>
-                                              <p:pRg st="0" end="0"/>
-                                            </p:txEl>
-                                          </p:spTgt>
-                                        </p:tgtEl>
-                                      </p:cBhvr>
-                                    </p:animEffect>
-                                  </p:childTnLst>
-                                </p:cTn>
-                              </p:par>
-                            </p:childTnLst>
-                          </p:cTn>
-                        </p:par>
-                        <p:par>
-                          <p:cTn id="19" fill="hold">
-                            <p:stCondLst>
-                              <p:cond delay="500"/>
-                            </p:stCondLst>
-                            <p:childTnLst>
-                              <p:par>
-                                <p:cTn id="20" presetID="31" presetClass="entr" presetSubtype="0" fill="hold" nodeType="afterEffect">
-                                  <p:stCondLst>
-                                    <p:cond delay="0"/>
-                                  </p:stCondLst>
-                                  <p:childTnLst>
-                                    <p:set>
-                                      <p:cBhvr>
-                                        <p:cTn id="21" dur="1" fill="hold">
-                                          <p:stCondLst>
-                                            <p:cond delay="0"/>
-                                          </p:stCondLst>
-                                        </p:cTn>
-                                        <p:tgtEl>
-                                          <p:spTgt spid="8"/>
-                                        </p:tgtEl>
-                                        <p:attrNameLst>
-                                          <p:attrName>style.visibility</p:attrName>
-                                        </p:attrNameLst>
-                                      </p:cBhvr>
-                                      <p:to>
-                                        <p:strVal val="visible"/>
-                                      </p:to>
-                                    </p:set>
-                                    <p:anim calcmode="lin" valueType="num">
-                                      <p:cBhvr>
-                                        <p:cTn id="22" dur="1000" fill="hold"/>
-                                        <p:tgtEl>
-                                          <p:spTgt spid="8"/>
-                                        </p:tgtEl>
-                                        <p:attrNameLst>
-                                          <p:attrName>ppt_w</p:attrName>
-                                        </p:attrNameLst>
-                                      </p:cBhvr>
-                                      <p:tavLst>
-                                        <p:tav tm="0">
-                                          <p:val>
-                                            <p:fltVal val="0"/>
-                                          </p:val>
-                                        </p:tav>
-                                        <p:tav tm="100000">
-                                          <p:val>
-                                            <p:strVal val="#ppt_w"/>
-                                          </p:val>
-                                        </p:tav>
-                                      </p:tavLst>
-                                    </p:anim>
-                                    <p:anim calcmode="lin" valueType="num">
-                                      <p:cBhvr>
-                                        <p:cTn id="23" dur="1000" fill="hold"/>
-                                        <p:tgtEl>
-                                          <p:spTgt spid="8"/>
-                                        </p:tgtEl>
-                                        <p:attrNameLst>
-                                          <p:attrName>ppt_h</p:attrName>
-                                        </p:attrNameLst>
-                                      </p:cBhvr>
-                                      <p:tavLst>
-                                        <p:tav tm="0">
-                                          <p:val>
-                                            <p:fltVal val="0"/>
-                                          </p:val>
-                                        </p:tav>
-                                        <p:tav tm="100000">
-                                          <p:val>
-                                            <p:strVal val="#ppt_h"/>
-                                          </p:val>
-                                        </p:tav>
-                                      </p:tavLst>
-                                    </p:anim>
-                                    <p:anim calcmode="lin" valueType="num">
-                                      <p:cBhvr>
-                                        <p:cTn id="24" dur="1000" fill="hold"/>
-                                        <p:tgtEl>
-                                          <p:spTgt spid="8"/>
-                                        </p:tgtEl>
-                                        <p:attrNameLst>
-                                          <p:attrName>style.rotation</p:attrName>
-                                        </p:attrNameLst>
-                                      </p:cBhvr>
-                                      <p:tavLst>
-                                        <p:tav tm="0">
-                                          <p:val>
-                                            <p:fltVal val="90"/>
-                                          </p:val>
-                                        </p:tav>
-                                        <p:tav tm="100000">
-                                          <p:val>
-                                            <p:fltVal val="0"/>
-                                          </p:val>
-                                        </p:tav>
-                                      </p:tavLst>
-                                    </p:anim>
-                                    <p:animEffect transition="in" filter="fade">
-                                      <p:cBhvr>
-                                        <p:cTn id="25" dur="1000"/>
-                                        <p:tgtEl>
-                                          <p:spTgt spid="8"/>
-                                        </p:tgtEl>
-                                      </p:cBhvr>
-                                    </p:animEffect>
-                                  </p:childTnLst>
-                                </p:cTn>
-                              </p:par>
-                            </p:childTnLst>
-                          </p:cTn>
-                        </p:par>
-                      </p:childTnLst>
-                    </p:cTn>
-                  </p:par>
-                  <p:par>
-                    <p:cTn id="26" fill="hold">
-                      <p:stCondLst>
-                        <p:cond delay="indefinite"/>
-                      </p:stCondLst>
-                      <p:childTnLst>
-                        <p:par>
-                          <p:cTn id="27" fill="hold">
-                            <p:stCondLst>
-                              <p:cond delay="0"/>
-                            </p:stCondLst>
-                            <p:childTnLst>
-                              <p:par>
-                                <p:cTn id="28" presetID="10" presetClass="entr" presetSubtype="0" fill="hold" grpId="0" nodeType="clickEffect">
-                                  <p:stCondLst>
-                                    <p:cond delay="0"/>
-                                  </p:stCondLst>
-                                  <p:childTnLst>
-                                    <p:set>
-                                      <p:cBhvr>
-                                        <p:cTn id="29" dur="1" fill="hold">
-                                          <p:stCondLst>
-                                            <p:cond delay="0"/>
-                                          </p:stCondLst>
-                                        </p:cTn>
-                                        <p:tgtEl>
-                                          <p:spTgt spid="3">
-                                            <p:txEl>
-                                              <p:pRg st="1" end="1"/>
-                                            </p:txEl>
-                                          </p:spTgt>
-                                        </p:tgtEl>
-                                        <p:attrNameLst>
-                                          <p:attrName>style.visibility</p:attrName>
-                                        </p:attrNameLst>
-                                      </p:cBhvr>
-                                      <p:to>
-                                        <p:strVal val="visible"/>
-                                      </p:to>
-                                    </p:set>
-                                    <p:animEffect transition="in" filter="fade">
-                                      <p:cBhvr>
-                                        <p:cTn id="30" dur="500"/>
-                                        <p:tgtEl>
-                                          <p:spTgt spid="3">
-                                            <p:txEl>
-                                              <p:pRg st="1" end="1"/>
-                                            </p:txEl>
-                                          </p:spTgt>
-                                        </p:tgtEl>
-                                      </p:cBhvr>
-                                    </p:animEffect>
-                                  </p:childTnLst>
-                                </p:cTn>
-                              </p:par>
-                            </p:childTnLst>
-                          </p:cTn>
-                        </p:par>
-                        <p:par>
-                          <p:cTn id="31" fill="hold">
-                            <p:stCondLst>
-                              <p:cond delay="500"/>
-                            </p:stCondLst>
-                            <p:childTnLst>
-                              <p:par>
-                                <p:cTn id="32" presetID="10" presetClass="exit" presetSubtype="0" fill="hold" nodeType="afterEffect">
-                                  <p:stCondLst>
-                                    <p:cond delay="0"/>
-                                  </p:stCondLst>
-                                  <p:childTnLst>
-                                    <p:animEffect transition="out" filter="fade">
-                                      <p:cBhvr>
-                                        <p:cTn id="33" dur="500"/>
-                                        <p:tgtEl>
-                                          <p:spTgt spid="8"/>
-                                        </p:tgtEl>
-                                      </p:cBhvr>
-                                    </p:animEffect>
-                                    <p:set>
-                                      <p:cBhvr>
-                                        <p:cTn id="34" dur="1" fill="hold">
-                                          <p:stCondLst>
-                                            <p:cond delay="499"/>
-                                          </p:stCondLst>
-                                        </p:cTn>
-                                        <p:tgtEl>
-                                          <p:spTgt spid="8"/>
-                                        </p:tgtEl>
-                                        <p:attrNameLst>
-                                          <p:attrName>style.visibility</p:attrName>
-                                        </p:attrNameLst>
-                                      </p:cBhvr>
-                                      <p:to>
-                                        <p:strVal val="hidden"/>
-                                      </p:to>
-                                    </p:set>
-                                  </p:childTnLst>
-                                </p:cTn>
-                              </p:par>
-                              <p:par>
-                                <p:cTn id="35" presetID="31" presetClass="entr" presetSubtype="0" fill="hold" nodeType="withEffect">
-                                  <p:stCondLst>
-                                    <p:cond delay="0"/>
-                                  </p:stCondLst>
-                                  <p:childTnLst>
-                                    <p:set>
-                                      <p:cBhvr>
-                                        <p:cTn id="36" dur="1" fill="hold">
-                                          <p:stCondLst>
-                                            <p:cond delay="0"/>
-                                          </p:stCondLst>
-                                        </p:cTn>
-                                        <p:tgtEl>
-                                          <p:spTgt spid="5"/>
-                                        </p:tgtEl>
-                                        <p:attrNameLst>
-                                          <p:attrName>style.visibility</p:attrName>
-                                        </p:attrNameLst>
-                                      </p:cBhvr>
-                                      <p:to>
-                                        <p:strVal val="visible"/>
-                                      </p:to>
-                                    </p:set>
-                                    <p:anim calcmode="lin" valueType="num">
-                                      <p:cBhvr>
-                                        <p:cTn id="37" dur="1000" fill="hold"/>
-                                        <p:tgtEl>
-                                          <p:spTgt spid="5"/>
-                                        </p:tgtEl>
-                                        <p:attrNameLst>
-                                          <p:attrName>ppt_w</p:attrName>
-                                        </p:attrNameLst>
-                                      </p:cBhvr>
-                                      <p:tavLst>
-                                        <p:tav tm="0">
-                                          <p:val>
-                                            <p:fltVal val="0"/>
-                                          </p:val>
-                                        </p:tav>
-                                        <p:tav tm="100000">
-                                          <p:val>
-                                            <p:strVal val="#ppt_w"/>
-                                          </p:val>
-                                        </p:tav>
-                                      </p:tavLst>
-                                    </p:anim>
-                                    <p:anim calcmode="lin" valueType="num">
-                                      <p:cBhvr>
-                                        <p:cTn id="38" dur="1000" fill="hold"/>
-                                        <p:tgtEl>
-                                          <p:spTgt spid="5"/>
-                                        </p:tgtEl>
-                                        <p:attrNameLst>
-                                          <p:attrName>ppt_h</p:attrName>
-                                        </p:attrNameLst>
-                                      </p:cBhvr>
-                                      <p:tavLst>
-                                        <p:tav tm="0">
-                                          <p:val>
-                                            <p:fltVal val="0"/>
-                                          </p:val>
-                                        </p:tav>
-                                        <p:tav tm="100000">
-                                          <p:val>
-                                            <p:strVal val="#ppt_h"/>
-                                          </p:val>
-                                        </p:tav>
-                                      </p:tavLst>
-                                    </p:anim>
-                                    <p:anim calcmode="lin" valueType="num">
-                                      <p:cBhvr>
-                                        <p:cTn id="39" dur="1000" fill="hold"/>
-                                        <p:tgtEl>
-                                          <p:spTgt spid="5"/>
-                                        </p:tgtEl>
-                                        <p:attrNameLst>
-                                          <p:attrName>style.rotation</p:attrName>
-                                        </p:attrNameLst>
-                                      </p:cBhvr>
-                                      <p:tavLst>
-                                        <p:tav tm="0">
-                                          <p:val>
-                                            <p:fltVal val="90"/>
-                                          </p:val>
-                                        </p:tav>
-                                        <p:tav tm="100000">
-                                          <p:val>
-                                            <p:fltVal val="0"/>
-                                          </p:val>
-                                        </p:tav>
-                                      </p:tavLst>
-                                    </p:anim>
-                                    <p:animEffect transition="in" filter="fade">
-                                      <p:cBhvr>
-                                        <p:cTn id="40" dur="1000"/>
-                                        <p:tgtEl>
-                                          <p:spTgt spid="5"/>
-                                        </p:tgtEl>
-                                      </p:cBhvr>
-                                    </p:animEffect>
-                                  </p:childTnLst>
-                                </p:cTn>
-                              </p:par>
-                            </p:childTnLst>
-                          </p:cTn>
-                        </p:par>
-                      </p:childTnLst>
-                    </p:cTn>
-                  </p:par>
-                  <p:par>
-                    <p:cTn id="41" fill="hold">
-                      <p:stCondLst>
-                        <p:cond delay="indefinite"/>
-                      </p:stCondLst>
-                      <p:childTnLst>
-                        <p:par>
-                          <p:cTn id="42" fill="hold">
-                            <p:stCondLst>
-                              <p:cond delay="0"/>
-                            </p:stCondLst>
-                            <p:childTnLst>
-                              <p:par>
-                                <p:cTn id="43" presetID="10" presetClass="entr" presetSubtype="0" fill="hold" grpId="0" nodeType="clickEffect">
-                                  <p:stCondLst>
-                                    <p:cond delay="0"/>
-                                  </p:stCondLst>
-                                  <p:childTnLst>
-                                    <p:set>
-                                      <p:cBhvr>
-                                        <p:cTn id="44" dur="1" fill="hold">
-                                          <p:stCondLst>
-                                            <p:cond delay="0"/>
-                                          </p:stCondLst>
-                                        </p:cTn>
-                                        <p:tgtEl>
-                                          <p:spTgt spid="3">
-                                            <p:txEl>
-                                              <p:pRg st="2" end="2"/>
-                                            </p:txEl>
-                                          </p:spTgt>
-                                        </p:tgtEl>
-                                        <p:attrNameLst>
-                                          <p:attrName>style.visibility</p:attrName>
-                                        </p:attrNameLst>
-                                      </p:cBhvr>
-                                      <p:to>
-                                        <p:strVal val="visible"/>
-                                      </p:to>
-                                    </p:set>
-                                    <p:animEffect transition="in" filter="fade">
-                                      <p:cBhvr>
-                                        <p:cTn id="45" dur="500"/>
-                                        <p:tgtEl>
-                                          <p:spTgt spid="3">
-                                            <p:txEl>
-                                              <p:pRg st="2" end="2"/>
-                                            </p:txEl>
-                                          </p:spTgt>
-                                        </p:tgtEl>
-                                      </p:cBhvr>
-                                    </p:animEffect>
-                                  </p:childTnLst>
-                                </p:cTn>
-                              </p:par>
-                              <p:par>
-                                <p:cTn id="46" presetID="21" presetClass="entr" presetSubtype="1" fill="hold" nodeType="withEffect">
-                                  <p:stCondLst>
-                                    <p:cond delay="0"/>
-                                  </p:stCondLst>
-                                  <p:childTnLst>
-                                    <p:set>
-                                      <p:cBhvr>
-                                        <p:cTn id="47" dur="1" fill="hold">
-                                          <p:stCondLst>
-                                            <p:cond delay="0"/>
-                                          </p:stCondLst>
-                                        </p:cTn>
-                                        <p:tgtEl>
-                                          <p:spTgt spid="6"/>
-                                        </p:tgtEl>
-                                        <p:attrNameLst>
-                                          <p:attrName>style.visibility</p:attrName>
-                                        </p:attrNameLst>
-                                      </p:cBhvr>
-                                      <p:to>
-                                        <p:strVal val="visible"/>
-                                      </p:to>
-                                    </p:set>
-                                    <p:animEffect transition="in" filter="wheel(1)">
-                                      <p:cBhvr>
-                                        <p:cTn id="48" dur="1500"/>
-                                        <p:tgtEl>
-                                          <p:spTgt spid="6"/>
-                                        </p:tgtEl>
-                                      </p:cBhvr>
-                                    </p:animEffect>
-                                  </p:childTnLst>
-                                </p:cTn>
-                              </p:par>
-                            </p:childTnLst>
-                          </p:cTn>
-                        </p:par>
-                      </p:childTnLst>
-                    </p:cTn>
-                  </p:par>
-                  <p:par>
-                    <p:cTn id="49" fill="hold">
-                      <p:stCondLst>
-                        <p:cond delay="indefinite"/>
-                      </p:stCondLst>
-                      <p:childTnLst>
-                        <p:par>
-                          <p:cTn id="50" fill="hold">
-                            <p:stCondLst>
-                              <p:cond delay="0"/>
-                            </p:stCondLst>
-                            <p:childTnLst>
-                              <p:par>
-                                <p:cTn id="51" presetID="10" presetClass="entr" presetSubtype="0" fill="hold" grpId="0" nodeType="clickEffect">
-                                  <p:stCondLst>
-                                    <p:cond delay="0"/>
-                                  </p:stCondLst>
-                                  <p:childTnLst>
-                                    <p:set>
-                                      <p:cBhvr>
-                                        <p:cTn id="52" dur="1" fill="hold">
-                                          <p:stCondLst>
-                                            <p:cond delay="0"/>
-                                          </p:stCondLst>
-                                        </p:cTn>
-                                        <p:tgtEl>
-                                          <p:spTgt spid="3">
-                                            <p:txEl>
-                                              <p:pRg st="3" end="3"/>
-                                            </p:txEl>
-                                          </p:spTgt>
-                                        </p:tgtEl>
-                                        <p:attrNameLst>
-                                          <p:attrName>style.visibility</p:attrName>
-                                        </p:attrNameLst>
-                                      </p:cBhvr>
-                                      <p:to>
-                                        <p:strVal val="visible"/>
-                                      </p:to>
-                                    </p:set>
-                                    <p:animEffect transition="in" filter="fade">
-                                      <p:cBhvr>
-                                        <p:cTn id="53" dur="500"/>
-                                        <p:tgtEl>
-                                          <p:spTgt spid="3">
-                                            <p:txEl>
-                                              <p:pRg st="3" end="3"/>
-                                            </p:txEl>
-                                          </p:spTgt>
-                                        </p:tgtEl>
-                                      </p:cBhvr>
-                                    </p:animEffect>
-                                  </p:childTnLst>
-                                </p:cTn>
-                              </p:par>
-                            </p:childTnLst>
-                          </p:cTn>
-                        </p:par>
-                        <p:par>
-                          <p:cTn id="54" fill="hold">
-                            <p:stCondLst>
-                              <p:cond delay="500"/>
-                            </p:stCondLst>
-                            <p:childTnLst>
-                              <p:par>
-                                <p:cTn id="55" presetID="6" presetClass="entr" presetSubtype="16" fill="hold" nodeType="afterEffect">
-                                  <p:stCondLst>
-                                    <p:cond delay="0"/>
-                                  </p:stCondLst>
-                                  <p:childTnLst>
-                                    <p:set>
-                                      <p:cBhvr>
-                                        <p:cTn id="56" dur="1" fill="hold">
-                                          <p:stCondLst>
-                                            <p:cond delay="0"/>
-                                          </p:stCondLst>
-                                        </p:cTn>
-                                        <p:tgtEl>
-                                          <p:spTgt spid="7"/>
-                                        </p:tgtEl>
-                                        <p:attrNameLst>
-                                          <p:attrName>style.visibility</p:attrName>
-                                        </p:attrNameLst>
-                                      </p:cBhvr>
-                                      <p:to>
-                                        <p:strVal val="visible"/>
-                                      </p:to>
-                                    </p:set>
-                                    <p:animEffect transition="in" filter="circle(in)">
-                                      <p:cBhvr>
-                                        <p:cTn id="57" dur="1750"/>
-                                        <p:tgtEl>
-                                          <p:spTgt spid="7"/>
-                                        </p:tgtEl>
-                                      </p:cBhvr>
-                                    </p:animEffect>
-                                  </p:childTnLst>
-                                </p:cTn>
-                              </p:par>
-                            </p:childTnLst>
-                          </p:cTn>
-                        </p:par>
-                      </p:childTnLst>
-                    </p:cTn>
-                  </p:par>
-                  <p:par>
-                    <p:cTn id="58" fill="hold">
-                      <p:stCondLst>
-                        <p:cond delay="indefinite"/>
-                      </p:stCondLst>
-                      <p:childTnLst>
-                        <p:par>
-                          <p:cTn id="59" fill="hold">
-                            <p:stCondLst>
-                              <p:cond delay="0"/>
-                            </p:stCondLst>
-                            <p:childTnLst>
-                              <p:par>
-                                <p:cTn id="60" presetID="10" presetClass="entr" presetSubtype="0" fill="hold" grpId="0" nodeType="clickEffect">
-                                  <p:stCondLst>
-                                    <p:cond delay="0"/>
-                                  </p:stCondLst>
-                                  <p:childTnLst>
-                                    <p:set>
-                                      <p:cBhvr>
-                                        <p:cTn id="61" dur="1" fill="hold">
-                                          <p:stCondLst>
-                                            <p:cond delay="0"/>
-                                          </p:stCondLst>
-                                        </p:cTn>
-                                        <p:tgtEl>
-                                          <p:spTgt spid="3">
-                                            <p:txEl>
-                                              <p:pRg st="4" end="4"/>
-                                            </p:txEl>
-                                          </p:spTgt>
-                                        </p:tgtEl>
-                                        <p:attrNameLst>
-                                          <p:attrName>style.visibility</p:attrName>
-                                        </p:attrNameLst>
-                                      </p:cBhvr>
-                                      <p:to>
-                                        <p:strVal val="visible"/>
-                                      </p:to>
-                                    </p:set>
-                                    <p:animEffect transition="in" filter="fade">
-                                      <p:cBhvr>
-                                        <p:cTn id="62" dur="500"/>
-                                        <p:tgtEl>
-                                          <p:spTgt spid="3">
-                                            <p:txEl>
-                                              <p:pRg st="4" end="4"/>
-                                            </p:txEl>
-                                          </p:spTgt>
-                                        </p:tgtEl>
-                                      </p:cBhvr>
-                                    </p:animEffect>
-                                  </p:childTnLst>
-                                </p:cTn>
-                              </p:par>
-                            </p:childTnLst>
-                          </p:cTn>
-                        </p:par>
-                      </p:childTnLst>
-                    </p:cTn>
-                  </p:par>
-                </p:childTnLst>
-              </p:cTn>
-              <p:prevCondLst>
-                <p:cond evt="onPrev" delay="0">
-                  <p:tgtEl>
-                    <p:sldTgt/>
-                  </p:tgtEl>
-                </p:cond>
-              </p:prevCondLst>
-              <p:nextCondLst>
-                <p:cond evt="onNext" delay="0">
-                  <p:tgtEl>
-                    <p:sldTgt/>
-                  </p:tgtEl>
-                </p:cond>
-              </p:nextCondLst>
-            </p:seq>
-          </p:childTnLst>
-        </p:cTn>
-      </p:par>
-    </p:tnLst>
-    <p:bldLst>
-      <p:bldP spid="2" grpId="0"/>
-      <p:bldP spid="3" grpId="0" uiExpand="1" build="p"/>
-      <p:bldP spid="4" grpId="0"/>
-    </p:bldLst>
-  </p:timing>
-</p:sld>
-</file>
-
-<file path=ppt/slides/slide7.xml><?xml version="1.0" encoding="utf-8"?>
-<p:sld xmlns:a="http://schemas.openxmlformats.org/drawingml/2006/main" xmlns:r="http://schemas.openxmlformats.org/officeDocument/2006/relationships" xmlns:p="http://schemas.openxmlformats.org/presentationml/2006/main">
-  <p:cSld>
-    <p:spTree>
-      <p:nvGrpSpPr>
-        <p:cNvPr id="1" name=""/>
-        <p:cNvGrpSpPr/>
-        <p:nvPr/>
-      </p:nvGrpSpPr>
-      <p:grpSpPr>
-        <a:xfrm>
-          <a:off x="0" y="0"/>
-          <a:ext cx="0" cy="0"/>
-          <a:chOff x="0" y="0"/>
-          <a:chExt cx="0" cy="0"/>
-        </a:xfrm>
-      </p:grpSpPr>
-      <p:sp>
-        <p:nvSpPr>
-          <p:cNvPr id="2" name="Title 1"/>
-          <p:cNvSpPr>
-            <a:spLocks noGrp="1"/>
-          </p:cNvSpPr>
-          <p:nvPr>
-            <p:ph type="title"/>
-          </p:nvPr>
-        </p:nvSpPr>
-        <p:spPr/>
-        <p:txBody>
-          <a:bodyPr/>
-          <a:lstStyle/>
-          <a:p>
-            <a:r>
-              <a:rPr lang="bg-BG" dirty="0" smtClean="0"/>
-              <a:t>Описание на решението (3)</a:t>
             </a:r>
             <a:br>
               <a:rPr lang="bg-BG" dirty="0" smtClean="0"/>
@@ -11893,6 +9906,1607 @@
                                         <p:cTn id="40" dur="2000"/>
                                         <p:tgtEl>
                                           <p:spTgt spid="8"/>
+                                        </p:tgtEl>
+                                      </p:cBhvr>
+                                    </p:animEffect>
+                                  </p:childTnLst>
+                                </p:cTn>
+                              </p:par>
+                            </p:childTnLst>
+                          </p:cTn>
+                        </p:par>
+                      </p:childTnLst>
+                    </p:cTn>
+                  </p:par>
+                </p:childTnLst>
+              </p:cTn>
+              <p:prevCondLst>
+                <p:cond evt="onPrev" delay="0">
+                  <p:tgtEl>
+                    <p:sldTgt/>
+                  </p:tgtEl>
+                </p:cond>
+              </p:prevCondLst>
+              <p:nextCondLst>
+                <p:cond evt="onNext" delay="0">
+                  <p:tgtEl>
+                    <p:sldTgt/>
+                  </p:tgtEl>
+                </p:cond>
+              </p:nextCondLst>
+            </p:seq>
+          </p:childTnLst>
+        </p:cTn>
+      </p:par>
+    </p:tnLst>
+    <p:bldLst>
+      <p:bldP spid="2" grpId="0"/>
+      <p:bldP spid="3" grpId="0" uiExpand="1" build="p"/>
+      <p:bldP spid="4" grpId="0"/>
+    </p:bldLst>
+  </p:timing>
+</p:sld>
+</file>
+
+<file path=ppt/slides/slide6.xml><?xml version="1.0" encoding="utf-8"?>
+<p:sld xmlns:a="http://schemas.openxmlformats.org/drawingml/2006/main" xmlns:r="http://schemas.openxmlformats.org/officeDocument/2006/relationships" xmlns:p="http://schemas.openxmlformats.org/presentationml/2006/main">
+  <p:cSld>
+    <p:spTree>
+      <p:nvGrpSpPr>
+        <p:cNvPr id="1" name=""/>
+        <p:cNvGrpSpPr/>
+        <p:nvPr/>
+      </p:nvGrpSpPr>
+      <p:grpSpPr>
+        <a:xfrm>
+          <a:off x="0" y="0"/>
+          <a:ext cx="0" cy="0"/>
+          <a:chOff x="0" y="0"/>
+          <a:chExt cx="0" cy="0"/>
+        </a:xfrm>
+      </p:grpSpPr>
+      <p:sp>
+        <p:nvSpPr>
+          <p:cNvPr id="2" name="Title 1"/>
+          <p:cNvSpPr>
+            <a:spLocks noGrp="1"/>
+          </p:cNvSpPr>
+          <p:nvPr>
+            <p:ph type="title"/>
+          </p:nvPr>
+        </p:nvSpPr>
+        <p:spPr/>
+        <p:txBody>
+          <a:bodyPr/>
+          <a:lstStyle/>
+          <a:p>
+            <a:r>
+              <a:rPr lang="bg-BG" dirty="0" smtClean="0"/>
+              <a:t>Описание на решението (2)</a:t>
+            </a:r>
+            <a:br>
+              <a:rPr lang="bg-BG" dirty="0" smtClean="0"/>
+            </a:br>
+            <a:endParaRPr lang="bg-BG" sz="4800" dirty="0"/>
+          </a:p>
+        </p:txBody>
+      </p:sp>
+      <p:sp>
+        <p:nvSpPr>
+          <p:cNvPr id="3" name="Content Placeholder 2"/>
+          <p:cNvSpPr>
+            <a:spLocks noGrp="1"/>
+          </p:cNvSpPr>
+          <p:nvPr>
+            <p:ph idx="1"/>
+          </p:nvPr>
+        </p:nvSpPr>
+        <p:spPr>
+          <a:xfrm>
+            <a:off x="1332920" y="5261597"/>
+            <a:ext cx="10696482" cy="1986862"/>
+          </a:xfrm>
+        </p:spPr>
+        <p:txBody>
+          <a:bodyPr>
+            <a:normAutofit/>
+          </a:bodyPr>
+          <a:lstStyle/>
+          <a:p>
+            <a:r>
+              <a:rPr lang="bg-BG" dirty="0" smtClean="0"/>
+              <a:t>Абсолютно автоматизирана система за изпращане на заявки към шофьорите</a:t>
+            </a:r>
+          </a:p>
+          <a:p>
+            <a:r>
+              <a:rPr lang="bg-BG" dirty="0" smtClean="0"/>
+              <a:t>Следене на статусите на изпратените заявки</a:t>
+            </a:r>
+          </a:p>
+          <a:p>
+            <a:r>
+              <a:rPr lang="bg-BG" dirty="0" smtClean="0"/>
+              <a:t>Получаване на информация за местоположението на колите</a:t>
+            </a:r>
+          </a:p>
+        </p:txBody>
+      </p:sp>
+      <p:sp>
+        <p:nvSpPr>
+          <p:cNvPr id="4" name="TextBox 3"/>
+          <p:cNvSpPr txBox="1"/>
+          <p:nvPr/>
+        </p:nvSpPr>
+        <p:spPr>
+          <a:xfrm>
+            <a:off x="1419497" y="1062446"/>
+            <a:ext cx="2000099" cy="400110"/>
+          </a:xfrm>
+          <a:prstGeom prst="rect">
+            <a:avLst/>
+          </a:prstGeom>
+          <a:noFill/>
+        </p:spPr>
+        <p:txBody>
+          <a:bodyPr wrap="none" rtlCol="0">
+            <a:spAutoFit/>
+          </a:bodyPr>
+          <a:lstStyle/>
+          <a:p>
+            <a:r>
+              <a:rPr lang="bg-BG" sz="2000" i="1" dirty="0" smtClean="0"/>
+              <a:t>Администрация</a:t>
+            </a:r>
+            <a:endParaRPr lang="bg-BG" sz="2000" i="1" dirty="0"/>
+          </a:p>
+        </p:txBody>
+      </p:sp>
+      <p:pic>
+        <p:nvPicPr>
+          <p:cNvPr id="8" name="Picture 7"/>
+          <p:cNvPicPr>
+            <a:picLocks noChangeAspect="1"/>
+          </p:cNvPicPr>
+          <p:nvPr/>
+        </p:nvPicPr>
+        <p:blipFill>
+          <a:blip r:embed="rId2">
+            <a:extLst>
+              <a:ext uri="{28A0092B-C50C-407E-A947-70E740481C1C}">
+                <a14:useLocalDpi xmlns:a14="http://schemas.microsoft.com/office/drawing/2010/main" val="0"/>
+              </a:ext>
+            </a:extLst>
+          </a:blip>
+          <a:stretch>
+            <a:fillRect/>
+          </a:stretch>
+        </p:blipFill>
+        <p:spPr>
+          <a:xfrm>
+            <a:off x="1419497" y="1462556"/>
+            <a:ext cx="7559663" cy="3642202"/>
+          </a:xfrm>
+          <a:prstGeom prst="rect">
+            <a:avLst/>
+          </a:prstGeom>
+        </p:spPr>
+      </p:pic>
+    </p:spTree>
+    <p:extLst>
+      <p:ext uri="{BB962C8B-B14F-4D97-AF65-F5344CB8AC3E}">
+        <p14:creationId xmlns:p14="http://schemas.microsoft.com/office/powerpoint/2010/main" val="739042383"/>
+      </p:ext>
+    </p:extLst>
+  </p:cSld>
+  <p:clrMapOvr>
+    <a:masterClrMapping/>
+  </p:clrMapOvr>
+  <p:transition spd="slow">
+    <p:push dir="u"/>
+  </p:transition>
+  <p:timing>
+    <p:tnLst>
+      <p:par>
+        <p:cTn id="1" dur="indefinite" restart="never" nodeType="tmRoot">
+          <p:childTnLst>
+            <p:seq concurrent="1" nextAc="seek">
+              <p:cTn id="2" dur="indefinite" nodeType="mainSeq">
+                <p:childTnLst>
+                  <p:par>
+                    <p:cTn id="3" fill="hold">
+                      <p:stCondLst>
+                        <p:cond delay="indefinite"/>
+                      </p:stCondLst>
+                      <p:childTnLst>
+                        <p:par>
+                          <p:cTn id="4" fill="hold">
+                            <p:stCondLst>
+                              <p:cond delay="0"/>
+                            </p:stCondLst>
+                            <p:childTnLst>
+                              <p:par>
+                                <p:cTn id="5" presetID="42" presetClass="entr" presetSubtype="0" fill="hold" grpId="0" nodeType="clickEffect">
+                                  <p:stCondLst>
+                                    <p:cond delay="0"/>
+                                  </p:stCondLst>
+                                  <p:childTnLst>
+                                    <p:set>
+                                      <p:cBhvr>
+                                        <p:cTn id="6" dur="1" fill="hold">
+                                          <p:stCondLst>
+                                            <p:cond delay="0"/>
+                                          </p:stCondLst>
+                                        </p:cTn>
+                                        <p:tgtEl>
+                                          <p:spTgt spid="2"/>
+                                        </p:tgtEl>
+                                        <p:attrNameLst>
+                                          <p:attrName>style.visibility</p:attrName>
+                                        </p:attrNameLst>
+                                      </p:cBhvr>
+                                      <p:to>
+                                        <p:strVal val="visible"/>
+                                      </p:to>
+                                    </p:set>
+                                    <p:animEffect transition="in" filter="fade">
+                                      <p:cBhvr>
+                                        <p:cTn id="7" dur="1000"/>
+                                        <p:tgtEl>
+                                          <p:spTgt spid="2"/>
+                                        </p:tgtEl>
+                                      </p:cBhvr>
+                                    </p:animEffect>
+                                    <p:anim calcmode="lin" valueType="num">
+                                      <p:cBhvr>
+                                        <p:cTn id="8" dur="1000" fill="hold"/>
+                                        <p:tgtEl>
+                                          <p:spTgt spid="2"/>
+                                        </p:tgtEl>
+                                        <p:attrNameLst>
+                                          <p:attrName>ppt_x</p:attrName>
+                                        </p:attrNameLst>
+                                      </p:cBhvr>
+                                      <p:tavLst>
+                                        <p:tav tm="0">
+                                          <p:val>
+                                            <p:strVal val="#ppt_x"/>
+                                          </p:val>
+                                        </p:tav>
+                                        <p:tav tm="100000">
+                                          <p:val>
+                                            <p:strVal val="#ppt_x"/>
+                                          </p:val>
+                                        </p:tav>
+                                      </p:tavLst>
+                                    </p:anim>
+                                    <p:anim calcmode="lin" valueType="num">
+                                      <p:cBhvr>
+                                        <p:cTn id="9" dur="1000" fill="hold"/>
+                                        <p:tgtEl>
+                                          <p:spTgt spid="2"/>
+                                        </p:tgtEl>
+                                        <p:attrNameLst>
+                                          <p:attrName>ppt_y</p:attrName>
+                                        </p:attrNameLst>
+                                      </p:cBhvr>
+                                      <p:tavLst>
+                                        <p:tav tm="0">
+                                          <p:val>
+                                            <p:strVal val="#ppt_y+.1"/>
+                                          </p:val>
+                                        </p:tav>
+                                        <p:tav tm="100000">
+                                          <p:val>
+                                            <p:strVal val="#ppt_y"/>
+                                          </p:val>
+                                        </p:tav>
+                                      </p:tavLst>
+                                    </p:anim>
+                                  </p:childTnLst>
+                                </p:cTn>
+                              </p:par>
+                            </p:childTnLst>
+                          </p:cTn>
+                        </p:par>
+                        <p:par>
+                          <p:cTn id="10" fill="hold">
+                            <p:stCondLst>
+                              <p:cond delay="1000"/>
+                            </p:stCondLst>
+                            <p:childTnLst>
+                              <p:par>
+                                <p:cTn id="11" presetID="22" presetClass="entr" presetSubtype="8" fill="hold" grpId="0" nodeType="afterEffect">
+                                  <p:stCondLst>
+                                    <p:cond delay="0"/>
+                                  </p:stCondLst>
+                                  <p:childTnLst>
+                                    <p:set>
+                                      <p:cBhvr>
+                                        <p:cTn id="12" dur="1" fill="hold">
+                                          <p:stCondLst>
+                                            <p:cond delay="0"/>
+                                          </p:stCondLst>
+                                        </p:cTn>
+                                        <p:tgtEl>
+                                          <p:spTgt spid="4"/>
+                                        </p:tgtEl>
+                                        <p:attrNameLst>
+                                          <p:attrName>style.visibility</p:attrName>
+                                        </p:attrNameLst>
+                                      </p:cBhvr>
+                                      <p:to>
+                                        <p:strVal val="visible"/>
+                                      </p:to>
+                                    </p:set>
+                                    <p:animEffect transition="in" filter="wipe(left)">
+                                      <p:cBhvr>
+                                        <p:cTn id="13" dur="500"/>
+                                        <p:tgtEl>
+                                          <p:spTgt spid="4"/>
+                                        </p:tgtEl>
+                                      </p:cBhvr>
+                                    </p:animEffect>
+                                  </p:childTnLst>
+                                </p:cTn>
+                              </p:par>
+                            </p:childTnLst>
+                          </p:cTn>
+                        </p:par>
+                        <p:par>
+                          <p:cTn id="14" fill="hold">
+                            <p:stCondLst>
+                              <p:cond delay="1500"/>
+                            </p:stCondLst>
+                            <p:childTnLst>
+                              <p:par>
+                                <p:cTn id="15" presetID="6" presetClass="entr" presetSubtype="16" fill="hold" nodeType="afterEffect">
+                                  <p:stCondLst>
+                                    <p:cond delay="0"/>
+                                  </p:stCondLst>
+                                  <p:childTnLst>
+                                    <p:set>
+                                      <p:cBhvr>
+                                        <p:cTn id="16" dur="1" fill="hold">
+                                          <p:stCondLst>
+                                            <p:cond delay="0"/>
+                                          </p:stCondLst>
+                                        </p:cTn>
+                                        <p:tgtEl>
+                                          <p:spTgt spid="8"/>
+                                        </p:tgtEl>
+                                        <p:attrNameLst>
+                                          <p:attrName>style.visibility</p:attrName>
+                                        </p:attrNameLst>
+                                      </p:cBhvr>
+                                      <p:to>
+                                        <p:strVal val="visible"/>
+                                      </p:to>
+                                    </p:set>
+                                    <p:animEffect transition="in" filter="circle(in)">
+                                      <p:cBhvr>
+                                        <p:cTn id="17" dur="2000"/>
+                                        <p:tgtEl>
+                                          <p:spTgt spid="8"/>
+                                        </p:tgtEl>
+                                      </p:cBhvr>
+                                    </p:animEffect>
+                                  </p:childTnLst>
+                                </p:cTn>
+                              </p:par>
+                            </p:childTnLst>
+                          </p:cTn>
+                        </p:par>
+                      </p:childTnLst>
+                    </p:cTn>
+                  </p:par>
+                  <p:par>
+                    <p:cTn id="18" fill="hold">
+                      <p:stCondLst>
+                        <p:cond delay="indefinite"/>
+                      </p:stCondLst>
+                      <p:childTnLst>
+                        <p:par>
+                          <p:cTn id="19" fill="hold">
+                            <p:stCondLst>
+                              <p:cond delay="0"/>
+                            </p:stCondLst>
+                            <p:childTnLst>
+                              <p:par>
+                                <p:cTn id="20" presetID="10" presetClass="entr" presetSubtype="0" fill="hold" grpId="0" nodeType="clickEffect">
+                                  <p:stCondLst>
+                                    <p:cond delay="0"/>
+                                  </p:stCondLst>
+                                  <p:childTnLst>
+                                    <p:set>
+                                      <p:cBhvr>
+                                        <p:cTn id="21" dur="1" fill="hold">
+                                          <p:stCondLst>
+                                            <p:cond delay="0"/>
+                                          </p:stCondLst>
+                                        </p:cTn>
+                                        <p:tgtEl>
+                                          <p:spTgt spid="3">
+                                            <p:txEl>
+                                              <p:pRg st="0" end="0"/>
+                                            </p:txEl>
+                                          </p:spTgt>
+                                        </p:tgtEl>
+                                        <p:attrNameLst>
+                                          <p:attrName>style.visibility</p:attrName>
+                                        </p:attrNameLst>
+                                      </p:cBhvr>
+                                      <p:to>
+                                        <p:strVal val="visible"/>
+                                      </p:to>
+                                    </p:set>
+                                    <p:animEffect transition="in" filter="fade">
+                                      <p:cBhvr>
+                                        <p:cTn id="22" dur="500"/>
+                                        <p:tgtEl>
+                                          <p:spTgt spid="3">
+                                            <p:txEl>
+                                              <p:pRg st="0" end="0"/>
+                                            </p:txEl>
+                                          </p:spTgt>
+                                        </p:tgtEl>
+                                      </p:cBhvr>
+                                    </p:animEffect>
+                                  </p:childTnLst>
+                                </p:cTn>
+                              </p:par>
+                            </p:childTnLst>
+                          </p:cTn>
+                        </p:par>
+                      </p:childTnLst>
+                    </p:cTn>
+                  </p:par>
+                  <p:par>
+                    <p:cTn id="23" fill="hold">
+                      <p:stCondLst>
+                        <p:cond delay="indefinite"/>
+                      </p:stCondLst>
+                      <p:childTnLst>
+                        <p:par>
+                          <p:cTn id="24" fill="hold">
+                            <p:stCondLst>
+                              <p:cond delay="0"/>
+                            </p:stCondLst>
+                            <p:childTnLst>
+                              <p:par>
+                                <p:cTn id="25" presetID="10" presetClass="entr" presetSubtype="0" fill="hold" grpId="0" nodeType="clickEffect">
+                                  <p:stCondLst>
+                                    <p:cond delay="0"/>
+                                  </p:stCondLst>
+                                  <p:childTnLst>
+                                    <p:set>
+                                      <p:cBhvr>
+                                        <p:cTn id="26" dur="1" fill="hold">
+                                          <p:stCondLst>
+                                            <p:cond delay="0"/>
+                                          </p:stCondLst>
+                                        </p:cTn>
+                                        <p:tgtEl>
+                                          <p:spTgt spid="3">
+                                            <p:txEl>
+                                              <p:pRg st="1" end="1"/>
+                                            </p:txEl>
+                                          </p:spTgt>
+                                        </p:tgtEl>
+                                        <p:attrNameLst>
+                                          <p:attrName>style.visibility</p:attrName>
+                                        </p:attrNameLst>
+                                      </p:cBhvr>
+                                      <p:to>
+                                        <p:strVal val="visible"/>
+                                      </p:to>
+                                    </p:set>
+                                    <p:animEffect transition="in" filter="fade">
+                                      <p:cBhvr>
+                                        <p:cTn id="27" dur="500"/>
+                                        <p:tgtEl>
+                                          <p:spTgt spid="3">
+                                            <p:txEl>
+                                              <p:pRg st="1" end="1"/>
+                                            </p:txEl>
+                                          </p:spTgt>
+                                        </p:tgtEl>
+                                      </p:cBhvr>
+                                    </p:animEffect>
+                                  </p:childTnLst>
+                                </p:cTn>
+                              </p:par>
+                            </p:childTnLst>
+                          </p:cTn>
+                        </p:par>
+                      </p:childTnLst>
+                    </p:cTn>
+                  </p:par>
+                  <p:par>
+                    <p:cTn id="28" fill="hold">
+                      <p:stCondLst>
+                        <p:cond delay="indefinite"/>
+                      </p:stCondLst>
+                      <p:childTnLst>
+                        <p:par>
+                          <p:cTn id="29" fill="hold">
+                            <p:stCondLst>
+                              <p:cond delay="0"/>
+                            </p:stCondLst>
+                            <p:childTnLst>
+                              <p:par>
+                                <p:cTn id="30" presetID="10" presetClass="entr" presetSubtype="0" fill="hold" grpId="0" nodeType="clickEffect">
+                                  <p:stCondLst>
+                                    <p:cond delay="0"/>
+                                  </p:stCondLst>
+                                  <p:childTnLst>
+                                    <p:set>
+                                      <p:cBhvr>
+                                        <p:cTn id="31" dur="1" fill="hold">
+                                          <p:stCondLst>
+                                            <p:cond delay="0"/>
+                                          </p:stCondLst>
+                                        </p:cTn>
+                                        <p:tgtEl>
+                                          <p:spTgt spid="3">
+                                            <p:txEl>
+                                              <p:pRg st="2" end="2"/>
+                                            </p:txEl>
+                                          </p:spTgt>
+                                        </p:tgtEl>
+                                        <p:attrNameLst>
+                                          <p:attrName>style.visibility</p:attrName>
+                                        </p:attrNameLst>
+                                      </p:cBhvr>
+                                      <p:to>
+                                        <p:strVal val="visible"/>
+                                      </p:to>
+                                    </p:set>
+                                    <p:animEffect transition="in" filter="fade">
+                                      <p:cBhvr>
+                                        <p:cTn id="32" dur="500"/>
+                                        <p:tgtEl>
+                                          <p:spTgt spid="3">
+                                            <p:txEl>
+                                              <p:pRg st="2" end="2"/>
+                                            </p:txEl>
+                                          </p:spTgt>
+                                        </p:tgtEl>
+                                      </p:cBhvr>
+                                    </p:animEffect>
+                                  </p:childTnLst>
+                                </p:cTn>
+                              </p:par>
+                            </p:childTnLst>
+                          </p:cTn>
+                        </p:par>
+                      </p:childTnLst>
+                    </p:cTn>
+                  </p:par>
+                </p:childTnLst>
+              </p:cTn>
+              <p:prevCondLst>
+                <p:cond evt="onPrev" delay="0">
+                  <p:tgtEl>
+                    <p:sldTgt/>
+                  </p:tgtEl>
+                </p:cond>
+              </p:prevCondLst>
+              <p:nextCondLst>
+                <p:cond evt="onNext" delay="0">
+                  <p:tgtEl>
+                    <p:sldTgt/>
+                  </p:tgtEl>
+                </p:cond>
+              </p:nextCondLst>
+            </p:seq>
+          </p:childTnLst>
+        </p:cTn>
+      </p:par>
+    </p:tnLst>
+    <p:bldLst>
+      <p:bldP spid="2" grpId="0"/>
+      <p:bldP spid="3" grpId="0" uiExpand="1" build="p"/>
+      <p:bldP spid="4" grpId="0"/>
+    </p:bldLst>
+  </p:timing>
+</p:sld>
+</file>
+
+<file path=ppt/slides/slide7.xml><?xml version="1.0" encoding="utf-8"?>
+<p:sld xmlns:a="http://schemas.openxmlformats.org/drawingml/2006/main" xmlns:r="http://schemas.openxmlformats.org/officeDocument/2006/relationships" xmlns:p="http://schemas.openxmlformats.org/presentationml/2006/main">
+  <p:cSld>
+    <p:spTree>
+      <p:nvGrpSpPr>
+        <p:cNvPr id="1" name=""/>
+        <p:cNvGrpSpPr/>
+        <p:nvPr/>
+      </p:nvGrpSpPr>
+      <p:grpSpPr>
+        <a:xfrm>
+          <a:off x="0" y="0"/>
+          <a:ext cx="0" cy="0"/>
+          <a:chOff x="0" y="0"/>
+          <a:chExt cx="0" cy="0"/>
+        </a:xfrm>
+      </p:grpSpPr>
+      <p:pic>
+        <p:nvPicPr>
+          <p:cNvPr id="8" name="Picture 7"/>
+          <p:cNvPicPr>
+            <a:picLocks noChangeAspect="1"/>
+          </p:cNvPicPr>
+          <p:nvPr/>
+        </p:nvPicPr>
+        <p:blipFill>
+          <a:blip r:embed="rId2">
+            <a:extLst>
+              <a:ext uri="{28A0092B-C50C-407E-A947-70E740481C1C}">
+                <a14:useLocalDpi xmlns:a14="http://schemas.microsoft.com/office/drawing/2010/main" val="0"/>
+              </a:ext>
+            </a:extLst>
+          </a:blip>
+          <a:stretch>
+            <a:fillRect/>
+          </a:stretch>
+        </p:blipFill>
+        <p:spPr>
+          <a:xfrm>
+            <a:off x="1832636" y="2424397"/>
+            <a:ext cx="2970501" cy="2970501"/>
+          </a:xfrm>
+          <a:prstGeom prst="rect">
+            <a:avLst/>
+          </a:prstGeom>
+        </p:spPr>
+      </p:pic>
+      <p:sp>
+        <p:nvSpPr>
+          <p:cNvPr id="2" name="Title 1"/>
+          <p:cNvSpPr>
+            <a:spLocks noGrp="1"/>
+          </p:cNvSpPr>
+          <p:nvPr>
+            <p:ph type="title"/>
+          </p:nvPr>
+        </p:nvSpPr>
+        <p:spPr/>
+        <p:txBody>
+          <a:bodyPr/>
+          <a:lstStyle/>
+          <a:p>
+            <a:r>
+              <a:rPr lang="bg-BG" dirty="0" smtClean="0"/>
+              <a:t>Описание на решението (2)</a:t>
+            </a:r>
+            <a:br>
+              <a:rPr lang="bg-BG" dirty="0" smtClean="0"/>
+            </a:br>
+            <a:endParaRPr lang="bg-BG" sz="4800" dirty="0"/>
+          </a:p>
+        </p:txBody>
+      </p:sp>
+      <p:sp>
+        <p:nvSpPr>
+          <p:cNvPr id="3" name="Content Placeholder 2"/>
+          <p:cNvSpPr>
+            <a:spLocks noGrp="1"/>
+          </p:cNvSpPr>
+          <p:nvPr>
+            <p:ph idx="1"/>
+          </p:nvPr>
+        </p:nvSpPr>
+        <p:spPr>
+          <a:xfrm>
+            <a:off x="6172021" y="2320836"/>
+            <a:ext cx="5776139" cy="3593591"/>
+          </a:xfrm>
+        </p:spPr>
+        <p:txBody>
+          <a:bodyPr>
+            <a:normAutofit/>
+          </a:bodyPr>
+          <a:lstStyle/>
+          <a:p>
+            <a:r>
+              <a:rPr lang="bg-BG" dirty="0" smtClean="0"/>
+              <a:t>Влизане в профила като те задължително трябва да отговарят на дадена фирма и автомобил</a:t>
+            </a:r>
+          </a:p>
+          <a:p>
+            <a:r>
+              <a:rPr lang="bg-BG" dirty="0" smtClean="0"/>
+              <a:t>Изпращане на заявки за текущото местоположение  и следене на статуси</a:t>
+            </a:r>
+          </a:p>
+          <a:p>
+            <a:r>
+              <a:rPr lang="bg-BG" dirty="0" smtClean="0"/>
+              <a:t>Получаване на най-близките заявки</a:t>
+            </a:r>
+          </a:p>
+          <a:p>
+            <a:r>
+              <a:rPr lang="bg-BG" dirty="0" smtClean="0"/>
+              <a:t>При приета заявка не се изпращат други заявки към съответната кола</a:t>
+            </a:r>
+          </a:p>
+          <a:p>
+            <a:endParaRPr lang="bg-BG" dirty="0"/>
+          </a:p>
+        </p:txBody>
+      </p:sp>
+      <p:sp>
+        <p:nvSpPr>
+          <p:cNvPr id="4" name="TextBox 3"/>
+          <p:cNvSpPr txBox="1"/>
+          <p:nvPr/>
+        </p:nvSpPr>
+        <p:spPr>
+          <a:xfrm>
+            <a:off x="1419497" y="1062446"/>
+            <a:ext cx="3246851" cy="400110"/>
+          </a:xfrm>
+          <a:prstGeom prst="rect">
+            <a:avLst/>
+          </a:prstGeom>
+          <a:noFill/>
+        </p:spPr>
+        <p:txBody>
+          <a:bodyPr wrap="none" rtlCol="0">
+            <a:spAutoFit/>
+          </a:bodyPr>
+          <a:lstStyle/>
+          <a:p>
+            <a:r>
+              <a:rPr lang="bg-BG" sz="2000" i="1" dirty="0" smtClean="0"/>
+              <a:t>Приложение за шофьорите</a:t>
+            </a:r>
+            <a:endParaRPr lang="bg-BG" sz="2000" i="1" dirty="0"/>
+          </a:p>
+        </p:txBody>
+      </p:sp>
+      <p:pic>
+        <p:nvPicPr>
+          <p:cNvPr id="5" name="Picture 4"/>
+          <p:cNvPicPr>
+            <a:picLocks noChangeAspect="1"/>
+          </p:cNvPicPr>
+          <p:nvPr/>
+        </p:nvPicPr>
+        <p:blipFill>
+          <a:blip r:embed="rId3">
+            <a:extLst>
+              <a:ext uri="{28A0092B-C50C-407E-A947-70E740481C1C}">
+                <a14:useLocalDpi xmlns:a14="http://schemas.microsoft.com/office/drawing/2010/main" val="0"/>
+              </a:ext>
+            </a:extLst>
+          </a:blip>
+          <a:stretch>
+            <a:fillRect/>
+          </a:stretch>
+        </p:blipFill>
+        <p:spPr>
+          <a:xfrm>
+            <a:off x="1419497" y="2714721"/>
+            <a:ext cx="4168030" cy="2217391"/>
+          </a:xfrm>
+          <a:prstGeom prst="rect">
+            <a:avLst/>
+          </a:prstGeom>
+          <a:ln>
+            <a:solidFill>
+              <a:schemeClr val="tx1"/>
+            </a:solidFill>
+          </a:ln>
+        </p:spPr>
+      </p:pic>
+      <p:pic>
+        <p:nvPicPr>
+          <p:cNvPr id="6" name="Picture 5"/>
+          <p:cNvPicPr>
+            <a:picLocks noChangeAspect="1"/>
+          </p:cNvPicPr>
+          <p:nvPr/>
+        </p:nvPicPr>
+        <p:blipFill>
+          <a:blip r:embed="rId4">
+            <a:extLst>
+              <a:ext uri="{28A0092B-C50C-407E-A947-70E740481C1C}">
+                <a14:useLocalDpi xmlns:a14="http://schemas.microsoft.com/office/drawing/2010/main" val="0"/>
+              </a:ext>
+            </a:extLst>
+          </a:blip>
+          <a:stretch>
+            <a:fillRect/>
+          </a:stretch>
+        </p:blipFill>
+        <p:spPr>
+          <a:xfrm rot="992012">
+            <a:off x="1503630" y="2734729"/>
+            <a:ext cx="3998904" cy="2127416"/>
+          </a:xfrm>
+          <a:prstGeom prst="rect">
+            <a:avLst/>
+          </a:prstGeom>
+          <a:ln>
+            <a:solidFill>
+              <a:schemeClr val="tx1"/>
+            </a:solidFill>
+          </a:ln>
+        </p:spPr>
+      </p:pic>
+      <p:pic>
+        <p:nvPicPr>
+          <p:cNvPr id="7" name="Picture 6"/>
+          <p:cNvPicPr>
+            <a:picLocks noChangeAspect="1"/>
+          </p:cNvPicPr>
+          <p:nvPr/>
+        </p:nvPicPr>
+        <p:blipFill>
+          <a:blip r:embed="rId5">
+            <a:extLst>
+              <a:ext uri="{28A0092B-C50C-407E-A947-70E740481C1C}">
+                <a14:useLocalDpi xmlns:a14="http://schemas.microsoft.com/office/drawing/2010/main" val="0"/>
+              </a:ext>
+            </a:extLst>
+          </a:blip>
+          <a:stretch>
+            <a:fillRect/>
+          </a:stretch>
+        </p:blipFill>
+        <p:spPr>
+          <a:xfrm rot="20683741">
+            <a:off x="1383632" y="2669569"/>
+            <a:ext cx="4238901" cy="2257736"/>
+          </a:xfrm>
+          <a:prstGeom prst="rect">
+            <a:avLst/>
+          </a:prstGeom>
+          <a:ln>
+            <a:solidFill>
+              <a:schemeClr val="tx1"/>
+            </a:solidFill>
+          </a:ln>
+        </p:spPr>
+      </p:pic>
+    </p:spTree>
+    <p:extLst>
+      <p:ext uri="{BB962C8B-B14F-4D97-AF65-F5344CB8AC3E}">
+        <p14:creationId xmlns:p14="http://schemas.microsoft.com/office/powerpoint/2010/main" val="1067278197"/>
+      </p:ext>
+    </p:extLst>
+  </p:cSld>
+  <p:clrMapOvr>
+    <a:masterClrMapping/>
+  </p:clrMapOvr>
+  <p:transition spd="slow">
+    <p:push dir="u"/>
+  </p:transition>
+  <p:timing>
+    <p:tnLst>
+      <p:par>
+        <p:cTn id="1" dur="indefinite" restart="never" nodeType="tmRoot">
+          <p:childTnLst>
+            <p:seq concurrent="1" nextAc="seek">
+              <p:cTn id="2" dur="indefinite" nodeType="mainSeq">
+                <p:childTnLst>
+                  <p:par>
+                    <p:cTn id="3" fill="hold">
+                      <p:stCondLst>
+                        <p:cond delay="indefinite"/>
+                      </p:stCondLst>
+                      <p:childTnLst>
+                        <p:par>
+                          <p:cTn id="4" fill="hold">
+                            <p:stCondLst>
+                              <p:cond delay="0"/>
+                            </p:stCondLst>
+                            <p:childTnLst>
+                              <p:par>
+                                <p:cTn id="5" presetID="42" presetClass="entr" presetSubtype="0" fill="hold" grpId="0" nodeType="clickEffect">
+                                  <p:stCondLst>
+                                    <p:cond delay="0"/>
+                                  </p:stCondLst>
+                                  <p:childTnLst>
+                                    <p:set>
+                                      <p:cBhvr>
+                                        <p:cTn id="6" dur="1" fill="hold">
+                                          <p:stCondLst>
+                                            <p:cond delay="0"/>
+                                          </p:stCondLst>
+                                        </p:cTn>
+                                        <p:tgtEl>
+                                          <p:spTgt spid="2"/>
+                                        </p:tgtEl>
+                                        <p:attrNameLst>
+                                          <p:attrName>style.visibility</p:attrName>
+                                        </p:attrNameLst>
+                                      </p:cBhvr>
+                                      <p:to>
+                                        <p:strVal val="visible"/>
+                                      </p:to>
+                                    </p:set>
+                                    <p:animEffect transition="in" filter="fade">
+                                      <p:cBhvr>
+                                        <p:cTn id="7" dur="1000"/>
+                                        <p:tgtEl>
+                                          <p:spTgt spid="2"/>
+                                        </p:tgtEl>
+                                      </p:cBhvr>
+                                    </p:animEffect>
+                                    <p:anim calcmode="lin" valueType="num">
+                                      <p:cBhvr>
+                                        <p:cTn id="8" dur="1000" fill="hold"/>
+                                        <p:tgtEl>
+                                          <p:spTgt spid="2"/>
+                                        </p:tgtEl>
+                                        <p:attrNameLst>
+                                          <p:attrName>ppt_x</p:attrName>
+                                        </p:attrNameLst>
+                                      </p:cBhvr>
+                                      <p:tavLst>
+                                        <p:tav tm="0">
+                                          <p:val>
+                                            <p:strVal val="#ppt_x"/>
+                                          </p:val>
+                                        </p:tav>
+                                        <p:tav tm="100000">
+                                          <p:val>
+                                            <p:strVal val="#ppt_x"/>
+                                          </p:val>
+                                        </p:tav>
+                                      </p:tavLst>
+                                    </p:anim>
+                                    <p:anim calcmode="lin" valueType="num">
+                                      <p:cBhvr>
+                                        <p:cTn id="9" dur="1000" fill="hold"/>
+                                        <p:tgtEl>
+                                          <p:spTgt spid="2"/>
+                                        </p:tgtEl>
+                                        <p:attrNameLst>
+                                          <p:attrName>ppt_y</p:attrName>
+                                        </p:attrNameLst>
+                                      </p:cBhvr>
+                                      <p:tavLst>
+                                        <p:tav tm="0">
+                                          <p:val>
+                                            <p:strVal val="#ppt_y+.1"/>
+                                          </p:val>
+                                        </p:tav>
+                                        <p:tav tm="100000">
+                                          <p:val>
+                                            <p:strVal val="#ppt_y"/>
+                                          </p:val>
+                                        </p:tav>
+                                      </p:tavLst>
+                                    </p:anim>
+                                  </p:childTnLst>
+                                </p:cTn>
+                              </p:par>
+                            </p:childTnLst>
+                          </p:cTn>
+                        </p:par>
+                        <p:par>
+                          <p:cTn id="10" fill="hold">
+                            <p:stCondLst>
+                              <p:cond delay="1000"/>
+                            </p:stCondLst>
+                            <p:childTnLst>
+                              <p:par>
+                                <p:cTn id="11" presetID="22" presetClass="entr" presetSubtype="8" fill="hold" grpId="0" nodeType="afterEffect">
+                                  <p:stCondLst>
+                                    <p:cond delay="0"/>
+                                  </p:stCondLst>
+                                  <p:childTnLst>
+                                    <p:set>
+                                      <p:cBhvr>
+                                        <p:cTn id="12" dur="1" fill="hold">
+                                          <p:stCondLst>
+                                            <p:cond delay="0"/>
+                                          </p:stCondLst>
+                                        </p:cTn>
+                                        <p:tgtEl>
+                                          <p:spTgt spid="4"/>
+                                        </p:tgtEl>
+                                        <p:attrNameLst>
+                                          <p:attrName>style.visibility</p:attrName>
+                                        </p:attrNameLst>
+                                      </p:cBhvr>
+                                      <p:to>
+                                        <p:strVal val="visible"/>
+                                      </p:to>
+                                    </p:set>
+                                    <p:animEffect transition="in" filter="wipe(left)">
+                                      <p:cBhvr>
+                                        <p:cTn id="13" dur="500"/>
+                                        <p:tgtEl>
+                                          <p:spTgt spid="4"/>
+                                        </p:tgtEl>
+                                      </p:cBhvr>
+                                    </p:animEffect>
+                                  </p:childTnLst>
+                                </p:cTn>
+                              </p:par>
+                            </p:childTnLst>
+                          </p:cTn>
+                        </p:par>
+                      </p:childTnLst>
+                    </p:cTn>
+                  </p:par>
+                  <p:par>
+                    <p:cTn id="14" fill="hold">
+                      <p:stCondLst>
+                        <p:cond delay="indefinite"/>
+                      </p:stCondLst>
+                      <p:childTnLst>
+                        <p:par>
+                          <p:cTn id="15" fill="hold">
+                            <p:stCondLst>
+                              <p:cond delay="0"/>
+                            </p:stCondLst>
+                            <p:childTnLst>
+                              <p:par>
+                                <p:cTn id="16" presetID="10" presetClass="entr" presetSubtype="0" fill="hold" grpId="0" nodeType="clickEffect">
+                                  <p:stCondLst>
+                                    <p:cond delay="0"/>
+                                  </p:stCondLst>
+                                  <p:childTnLst>
+                                    <p:set>
+                                      <p:cBhvr>
+                                        <p:cTn id="17" dur="1" fill="hold">
+                                          <p:stCondLst>
+                                            <p:cond delay="0"/>
+                                          </p:stCondLst>
+                                        </p:cTn>
+                                        <p:tgtEl>
+                                          <p:spTgt spid="3">
+                                            <p:txEl>
+                                              <p:pRg st="0" end="0"/>
+                                            </p:txEl>
+                                          </p:spTgt>
+                                        </p:tgtEl>
+                                        <p:attrNameLst>
+                                          <p:attrName>style.visibility</p:attrName>
+                                        </p:attrNameLst>
+                                      </p:cBhvr>
+                                      <p:to>
+                                        <p:strVal val="visible"/>
+                                      </p:to>
+                                    </p:set>
+                                    <p:animEffect transition="in" filter="fade">
+                                      <p:cBhvr>
+                                        <p:cTn id="18" dur="500"/>
+                                        <p:tgtEl>
+                                          <p:spTgt spid="3">
+                                            <p:txEl>
+                                              <p:pRg st="0" end="0"/>
+                                            </p:txEl>
+                                          </p:spTgt>
+                                        </p:tgtEl>
+                                      </p:cBhvr>
+                                    </p:animEffect>
+                                  </p:childTnLst>
+                                </p:cTn>
+                              </p:par>
+                            </p:childTnLst>
+                          </p:cTn>
+                        </p:par>
+                        <p:par>
+                          <p:cTn id="19" fill="hold">
+                            <p:stCondLst>
+                              <p:cond delay="500"/>
+                            </p:stCondLst>
+                            <p:childTnLst>
+                              <p:par>
+                                <p:cTn id="20" presetID="31" presetClass="entr" presetSubtype="0" fill="hold" nodeType="afterEffect">
+                                  <p:stCondLst>
+                                    <p:cond delay="0"/>
+                                  </p:stCondLst>
+                                  <p:childTnLst>
+                                    <p:set>
+                                      <p:cBhvr>
+                                        <p:cTn id="21" dur="1" fill="hold">
+                                          <p:stCondLst>
+                                            <p:cond delay="0"/>
+                                          </p:stCondLst>
+                                        </p:cTn>
+                                        <p:tgtEl>
+                                          <p:spTgt spid="8"/>
+                                        </p:tgtEl>
+                                        <p:attrNameLst>
+                                          <p:attrName>style.visibility</p:attrName>
+                                        </p:attrNameLst>
+                                      </p:cBhvr>
+                                      <p:to>
+                                        <p:strVal val="visible"/>
+                                      </p:to>
+                                    </p:set>
+                                    <p:anim calcmode="lin" valueType="num">
+                                      <p:cBhvr>
+                                        <p:cTn id="22" dur="1000" fill="hold"/>
+                                        <p:tgtEl>
+                                          <p:spTgt spid="8"/>
+                                        </p:tgtEl>
+                                        <p:attrNameLst>
+                                          <p:attrName>ppt_w</p:attrName>
+                                        </p:attrNameLst>
+                                      </p:cBhvr>
+                                      <p:tavLst>
+                                        <p:tav tm="0">
+                                          <p:val>
+                                            <p:fltVal val="0"/>
+                                          </p:val>
+                                        </p:tav>
+                                        <p:tav tm="100000">
+                                          <p:val>
+                                            <p:strVal val="#ppt_w"/>
+                                          </p:val>
+                                        </p:tav>
+                                      </p:tavLst>
+                                    </p:anim>
+                                    <p:anim calcmode="lin" valueType="num">
+                                      <p:cBhvr>
+                                        <p:cTn id="23" dur="1000" fill="hold"/>
+                                        <p:tgtEl>
+                                          <p:spTgt spid="8"/>
+                                        </p:tgtEl>
+                                        <p:attrNameLst>
+                                          <p:attrName>ppt_h</p:attrName>
+                                        </p:attrNameLst>
+                                      </p:cBhvr>
+                                      <p:tavLst>
+                                        <p:tav tm="0">
+                                          <p:val>
+                                            <p:fltVal val="0"/>
+                                          </p:val>
+                                        </p:tav>
+                                        <p:tav tm="100000">
+                                          <p:val>
+                                            <p:strVal val="#ppt_h"/>
+                                          </p:val>
+                                        </p:tav>
+                                      </p:tavLst>
+                                    </p:anim>
+                                    <p:anim calcmode="lin" valueType="num">
+                                      <p:cBhvr>
+                                        <p:cTn id="24" dur="1000" fill="hold"/>
+                                        <p:tgtEl>
+                                          <p:spTgt spid="8"/>
+                                        </p:tgtEl>
+                                        <p:attrNameLst>
+                                          <p:attrName>style.rotation</p:attrName>
+                                        </p:attrNameLst>
+                                      </p:cBhvr>
+                                      <p:tavLst>
+                                        <p:tav tm="0">
+                                          <p:val>
+                                            <p:fltVal val="90"/>
+                                          </p:val>
+                                        </p:tav>
+                                        <p:tav tm="100000">
+                                          <p:val>
+                                            <p:fltVal val="0"/>
+                                          </p:val>
+                                        </p:tav>
+                                      </p:tavLst>
+                                    </p:anim>
+                                    <p:animEffect transition="in" filter="fade">
+                                      <p:cBhvr>
+                                        <p:cTn id="25" dur="1000"/>
+                                        <p:tgtEl>
+                                          <p:spTgt spid="8"/>
+                                        </p:tgtEl>
+                                      </p:cBhvr>
+                                    </p:animEffect>
+                                  </p:childTnLst>
+                                </p:cTn>
+                              </p:par>
+                            </p:childTnLst>
+                          </p:cTn>
+                        </p:par>
+                      </p:childTnLst>
+                    </p:cTn>
+                  </p:par>
+                  <p:par>
+                    <p:cTn id="26" fill="hold">
+                      <p:stCondLst>
+                        <p:cond delay="indefinite"/>
+                      </p:stCondLst>
+                      <p:childTnLst>
+                        <p:par>
+                          <p:cTn id="27" fill="hold">
+                            <p:stCondLst>
+                              <p:cond delay="0"/>
+                            </p:stCondLst>
+                            <p:childTnLst>
+                              <p:par>
+                                <p:cTn id="28" presetID="10" presetClass="entr" presetSubtype="0" fill="hold" grpId="0" nodeType="clickEffect">
+                                  <p:stCondLst>
+                                    <p:cond delay="0"/>
+                                  </p:stCondLst>
+                                  <p:childTnLst>
+                                    <p:set>
+                                      <p:cBhvr>
+                                        <p:cTn id="29" dur="1" fill="hold">
+                                          <p:stCondLst>
+                                            <p:cond delay="0"/>
+                                          </p:stCondLst>
+                                        </p:cTn>
+                                        <p:tgtEl>
+                                          <p:spTgt spid="3">
+                                            <p:txEl>
+                                              <p:pRg st="1" end="1"/>
+                                            </p:txEl>
+                                          </p:spTgt>
+                                        </p:tgtEl>
+                                        <p:attrNameLst>
+                                          <p:attrName>style.visibility</p:attrName>
+                                        </p:attrNameLst>
+                                      </p:cBhvr>
+                                      <p:to>
+                                        <p:strVal val="visible"/>
+                                      </p:to>
+                                    </p:set>
+                                    <p:animEffect transition="in" filter="fade">
+                                      <p:cBhvr>
+                                        <p:cTn id="30" dur="500"/>
+                                        <p:tgtEl>
+                                          <p:spTgt spid="3">
+                                            <p:txEl>
+                                              <p:pRg st="1" end="1"/>
+                                            </p:txEl>
+                                          </p:spTgt>
+                                        </p:tgtEl>
+                                      </p:cBhvr>
+                                    </p:animEffect>
+                                  </p:childTnLst>
+                                </p:cTn>
+                              </p:par>
+                            </p:childTnLst>
+                          </p:cTn>
+                        </p:par>
+                        <p:par>
+                          <p:cTn id="31" fill="hold">
+                            <p:stCondLst>
+                              <p:cond delay="500"/>
+                            </p:stCondLst>
+                            <p:childTnLst>
+                              <p:par>
+                                <p:cTn id="32" presetID="10" presetClass="exit" presetSubtype="0" fill="hold" nodeType="afterEffect">
+                                  <p:stCondLst>
+                                    <p:cond delay="0"/>
+                                  </p:stCondLst>
+                                  <p:childTnLst>
+                                    <p:animEffect transition="out" filter="fade">
+                                      <p:cBhvr>
+                                        <p:cTn id="33" dur="500"/>
+                                        <p:tgtEl>
+                                          <p:spTgt spid="8"/>
+                                        </p:tgtEl>
+                                      </p:cBhvr>
+                                    </p:animEffect>
+                                    <p:set>
+                                      <p:cBhvr>
+                                        <p:cTn id="34" dur="1" fill="hold">
+                                          <p:stCondLst>
+                                            <p:cond delay="499"/>
+                                          </p:stCondLst>
+                                        </p:cTn>
+                                        <p:tgtEl>
+                                          <p:spTgt spid="8"/>
+                                        </p:tgtEl>
+                                        <p:attrNameLst>
+                                          <p:attrName>style.visibility</p:attrName>
+                                        </p:attrNameLst>
+                                      </p:cBhvr>
+                                      <p:to>
+                                        <p:strVal val="hidden"/>
+                                      </p:to>
+                                    </p:set>
+                                  </p:childTnLst>
+                                </p:cTn>
+                              </p:par>
+                              <p:par>
+                                <p:cTn id="35" presetID="31" presetClass="entr" presetSubtype="0" fill="hold" nodeType="withEffect">
+                                  <p:stCondLst>
+                                    <p:cond delay="0"/>
+                                  </p:stCondLst>
+                                  <p:childTnLst>
+                                    <p:set>
+                                      <p:cBhvr>
+                                        <p:cTn id="36" dur="1" fill="hold">
+                                          <p:stCondLst>
+                                            <p:cond delay="0"/>
+                                          </p:stCondLst>
+                                        </p:cTn>
+                                        <p:tgtEl>
+                                          <p:spTgt spid="5"/>
+                                        </p:tgtEl>
+                                        <p:attrNameLst>
+                                          <p:attrName>style.visibility</p:attrName>
+                                        </p:attrNameLst>
+                                      </p:cBhvr>
+                                      <p:to>
+                                        <p:strVal val="visible"/>
+                                      </p:to>
+                                    </p:set>
+                                    <p:anim calcmode="lin" valueType="num">
+                                      <p:cBhvr>
+                                        <p:cTn id="37" dur="1000" fill="hold"/>
+                                        <p:tgtEl>
+                                          <p:spTgt spid="5"/>
+                                        </p:tgtEl>
+                                        <p:attrNameLst>
+                                          <p:attrName>ppt_w</p:attrName>
+                                        </p:attrNameLst>
+                                      </p:cBhvr>
+                                      <p:tavLst>
+                                        <p:tav tm="0">
+                                          <p:val>
+                                            <p:fltVal val="0"/>
+                                          </p:val>
+                                        </p:tav>
+                                        <p:tav tm="100000">
+                                          <p:val>
+                                            <p:strVal val="#ppt_w"/>
+                                          </p:val>
+                                        </p:tav>
+                                      </p:tavLst>
+                                    </p:anim>
+                                    <p:anim calcmode="lin" valueType="num">
+                                      <p:cBhvr>
+                                        <p:cTn id="38" dur="1000" fill="hold"/>
+                                        <p:tgtEl>
+                                          <p:spTgt spid="5"/>
+                                        </p:tgtEl>
+                                        <p:attrNameLst>
+                                          <p:attrName>ppt_h</p:attrName>
+                                        </p:attrNameLst>
+                                      </p:cBhvr>
+                                      <p:tavLst>
+                                        <p:tav tm="0">
+                                          <p:val>
+                                            <p:fltVal val="0"/>
+                                          </p:val>
+                                        </p:tav>
+                                        <p:tav tm="100000">
+                                          <p:val>
+                                            <p:strVal val="#ppt_h"/>
+                                          </p:val>
+                                        </p:tav>
+                                      </p:tavLst>
+                                    </p:anim>
+                                    <p:anim calcmode="lin" valueType="num">
+                                      <p:cBhvr>
+                                        <p:cTn id="39" dur="1000" fill="hold"/>
+                                        <p:tgtEl>
+                                          <p:spTgt spid="5"/>
+                                        </p:tgtEl>
+                                        <p:attrNameLst>
+                                          <p:attrName>style.rotation</p:attrName>
+                                        </p:attrNameLst>
+                                      </p:cBhvr>
+                                      <p:tavLst>
+                                        <p:tav tm="0">
+                                          <p:val>
+                                            <p:fltVal val="90"/>
+                                          </p:val>
+                                        </p:tav>
+                                        <p:tav tm="100000">
+                                          <p:val>
+                                            <p:fltVal val="0"/>
+                                          </p:val>
+                                        </p:tav>
+                                      </p:tavLst>
+                                    </p:anim>
+                                    <p:animEffect transition="in" filter="fade">
+                                      <p:cBhvr>
+                                        <p:cTn id="40" dur="1000"/>
+                                        <p:tgtEl>
+                                          <p:spTgt spid="5"/>
+                                        </p:tgtEl>
+                                      </p:cBhvr>
+                                    </p:animEffect>
+                                  </p:childTnLst>
+                                </p:cTn>
+                              </p:par>
+                            </p:childTnLst>
+                          </p:cTn>
+                        </p:par>
+                      </p:childTnLst>
+                    </p:cTn>
+                  </p:par>
+                  <p:par>
+                    <p:cTn id="41" fill="hold">
+                      <p:stCondLst>
+                        <p:cond delay="indefinite"/>
+                      </p:stCondLst>
+                      <p:childTnLst>
+                        <p:par>
+                          <p:cTn id="42" fill="hold">
+                            <p:stCondLst>
+                              <p:cond delay="0"/>
+                            </p:stCondLst>
+                            <p:childTnLst>
+                              <p:par>
+                                <p:cTn id="43" presetID="10" presetClass="entr" presetSubtype="0" fill="hold" grpId="0" nodeType="clickEffect">
+                                  <p:stCondLst>
+                                    <p:cond delay="0"/>
+                                  </p:stCondLst>
+                                  <p:childTnLst>
+                                    <p:set>
+                                      <p:cBhvr>
+                                        <p:cTn id="44" dur="1" fill="hold">
+                                          <p:stCondLst>
+                                            <p:cond delay="0"/>
+                                          </p:stCondLst>
+                                        </p:cTn>
+                                        <p:tgtEl>
+                                          <p:spTgt spid="3">
+                                            <p:txEl>
+                                              <p:pRg st="2" end="2"/>
+                                            </p:txEl>
+                                          </p:spTgt>
+                                        </p:tgtEl>
+                                        <p:attrNameLst>
+                                          <p:attrName>style.visibility</p:attrName>
+                                        </p:attrNameLst>
+                                      </p:cBhvr>
+                                      <p:to>
+                                        <p:strVal val="visible"/>
+                                      </p:to>
+                                    </p:set>
+                                    <p:animEffect transition="in" filter="fade">
+                                      <p:cBhvr>
+                                        <p:cTn id="45" dur="500"/>
+                                        <p:tgtEl>
+                                          <p:spTgt spid="3">
+                                            <p:txEl>
+                                              <p:pRg st="2" end="2"/>
+                                            </p:txEl>
+                                          </p:spTgt>
+                                        </p:tgtEl>
+                                      </p:cBhvr>
+                                    </p:animEffect>
+                                  </p:childTnLst>
+                                </p:cTn>
+                              </p:par>
+                              <p:par>
+                                <p:cTn id="46" presetID="21" presetClass="entr" presetSubtype="1" fill="hold" nodeType="withEffect">
+                                  <p:stCondLst>
+                                    <p:cond delay="0"/>
+                                  </p:stCondLst>
+                                  <p:childTnLst>
+                                    <p:set>
+                                      <p:cBhvr>
+                                        <p:cTn id="47" dur="1" fill="hold">
+                                          <p:stCondLst>
+                                            <p:cond delay="0"/>
+                                          </p:stCondLst>
+                                        </p:cTn>
+                                        <p:tgtEl>
+                                          <p:spTgt spid="6"/>
+                                        </p:tgtEl>
+                                        <p:attrNameLst>
+                                          <p:attrName>style.visibility</p:attrName>
+                                        </p:attrNameLst>
+                                      </p:cBhvr>
+                                      <p:to>
+                                        <p:strVal val="visible"/>
+                                      </p:to>
+                                    </p:set>
+                                    <p:animEffect transition="in" filter="wheel(1)">
+                                      <p:cBhvr>
+                                        <p:cTn id="48" dur="1500"/>
+                                        <p:tgtEl>
+                                          <p:spTgt spid="6"/>
+                                        </p:tgtEl>
+                                      </p:cBhvr>
+                                    </p:animEffect>
+                                  </p:childTnLst>
+                                </p:cTn>
+                              </p:par>
+                            </p:childTnLst>
+                          </p:cTn>
+                        </p:par>
+                      </p:childTnLst>
+                    </p:cTn>
+                  </p:par>
+                  <p:par>
+                    <p:cTn id="49" fill="hold">
+                      <p:stCondLst>
+                        <p:cond delay="indefinite"/>
+                      </p:stCondLst>
+                      <p:childTnLst>
+                        <p:par>
+                          <p:cTn id="50" fill="hold">
+                            <p:stCondLst>
+                              <p:cond delay="0"/>
+                            </p:stCondLst>
+                            <p:childTnLst>
+                              <p:par>
+                                <p:cTn id="51" presetID="10" presetClass="entr" presetSubtype="0" fill="hold" grpId="0" nodeType="clickEffect">
+                                  <p:stCondLst>
+                                    <p:cond delay="0"/>
+                                  </p:stCondLst>
+                                  <p:childTnLst>
+                                    <p:set>
+                                      <p:cBhvr>
+                                        <p:cTn id="52" dur="1" fill="hold">
+                                          <p:stCondLst>
+                                            <p:cond delay="0"/>
+                                          </p:stCondLst>
+                                        </p:cTn>
+                                        <p:tgtEl>
+                                          <p:spTgt spid="3">
+                                            <p:txEl>
+                                              <p:pRg st="3" end="3"/>
+                                            </p:txEl>
+                                          </p:spTgt>
+                                        </p:tgtEl>
+                                        <p:attrNameLst>
+                                          <p:attrName>style.visibility</p:attrName>
+                                        </p:attrNameLst>
+                                      </p:cBhvr>
+                                      <p:to>
+                                        <p:strVal val="visible"/>
+                                      </p:to>
+                                    </p:set>
+                                    <p:animEffect transition="in" filter="fade">
+                                      <p:cBhvr>
+                                        <p:cTn id="53" dur="500"/>
+                                        <p:tgtEl>
+                                          <p:spTgt spid="3">
+                                            <p:txEl>
+                                              <p:pRg st="3" end="3"/>
+                                            </p:txEl>
+                                          </p:spTgt>
+                                        </p:tgtEl>
+                                      </p:cBhvr>
+                                    </p:animEffect>
+                                  </p:childTnLst>
+                                </p:cTn>
+                              </p:par>
+                            </p:childTnLst>
+                          </p:cTn>
+                        </p:par>
+                        <p:par>
+                          <p:cTn id="54" fill="hold">
+                            <p:stCondLst>
+                              <p:cond delay="1500"/>
+                            </p:stCondLst>
+                            <p:childTnLst>
+                              <p:par>
+                                <p:cTn id="55" presetID="6" presetClass="entr" presetSubtype="16" fill="hold" nodeType="afterEffect">
+                                  <p:stCondLst>
+                                    <p:cond delay="0"/>
+                                  </p:stCondLst>
+                                  <p:childTnLst>
+                                    <p:set>
+                                      <p:cBhvr>
+                                        <p:cTn id="56" dur="1" fill="hold">
+                                          <p:stCondLst>
+                                            <p:cond delay="0"/>
+                                          </p:stCondLst>
+                                        </p:cTn>
+                                        <p:tgtEl>
+                                          <p:spTgt spid="7"/>
+                                        </p:tgtEl>
+                                        <p:attrNameLst>
+                                          <p:attrName>style.visibility</p:attrName>
+                                        </p:attrNameLst>
+                                      </p:cBhvr>
+                                      <p:to>
+                                        <p:strVal val="visible"/>
+                                      </p:to>
+                                    </p:set>
+                                    <p:animEffect transition="in" filter="circle(in)">
+                                      <p:cBhvr>
+                                        <p:cTn id="57" dur="1750"/>
+                                        <p:tgtEl>
+                                          <p:spTgt spid="7"/>
                                         </p:tgtEl>
                                       </p:cBhvr>
                                     </p:animEffect>

</xml_diff>

<commit_message>
CarsByDateChart and RequestsByDateChart added
</commit_message>
<xml_diff>
--- a/Presentation.pptx
+++ b/Presentation.pptx
@@ -9,11 +9,12 @@
     <p:sldId id="258" r:id="rId3"/>
     <p:sldId id="259" r:id="rId4"/>
     <p:sldId id="260" r:id="rId5"/>
-    <p:sldId id="265" r:id="rId6"/>
-    <p:sldId id="270" r:id="rId7"/>
-    <p:sldId id="263" r:id="rId8"/>
-    <p:sldId id="267" r:id="rId9"/>
-    <p:sldId id="269" r:id="rId10"/>
+    <p:sldId id="271" r:id="rId6"/>
+    <p:sldId id="265" r:id="rId7"/>
+    <p:sldId id="270" r:id="rId8"/>
+    <p:sldId id="263" r:id="rId9"/>
+    <p:sldId id="267" r:id="rId10"/>
+    <p:sldId id="269" r:id="rId11"/>
   </p:sldIdLst>
   <p:sldSz cx="12192000" cy="6858000"/>
   <p:notesSz cx="6858000" cy="9144000"/>
@@ -1332,7 +1333,7 @@
             <a:fld id="{9334D819-9F07-4261-B09B-9E467E5D9002}" type="datetimeFigureOut">
               <a:rPr lang="en-US" dirty="0"/>
               <a:pPr/>
-              <a:t>3/7/2017</a:t>
+              <a:t>4/21/2017</a:t>
             </a:fld>
             <a:endParaRPr lang="en-US" dirty="0"/>
           </a:p>
@@ -1578,7 +1579,7 @@
           <a:p>
             <a:fld id="{9334D819-9F07-4261-B09B-9E467E5D9002}" type="datetimeFigureOut">
               <a:rPr lang="en-US" dirty="0"/>
-              <a:t>3/7/2017</a:t>
+              <a:t>4/21/2017</a:t>
             </a:fld>
             <a:endParaRPr lang="en-US" dirty="0"/>
           </a:p>
@@ -1765,7 +1766,7 @@
           <a:p>
             <a:fld id="{9334D819-9F07-4261-B09B-9E467E5D9002}" type="datetimeFigureOut">
               <a:rPr lang="en-US" dirty="0"/>
-              <a:t>3/7/2017</a:t>
+              <a:t>4/21/2017</a:t>
             </a:fld>
             <a:endParaRPr lang="en-US" dirty="0"/>
           </a:p>
@@ -1942,7 +1943,7 @@
           <a:p>
             <a:fld id="{9334D819-9F07-4261-B09B-9E467E5D9002}" type="datetimeFigureOut">
               <a:rPr lang="en-US" dirty="0"/>
-              <a:t>3/7/2017</a:t>
+              <a:t>4/21/2017</a:t>
             </a:fld>
             <a:endParaRPr lang="en-US" dirty="0"/>
           </a:p>
@@ -2226,7 +2227,7 @@
             <a:fld id="{9334D819-9F07-4261-B09B-9E467E5D9002}" type="datetimeFigureOut">
               <a:rPr lang="en-US" dirty="0"/>
               <a:pPr/>
-              <a:t>3/7/2017</a:t>
+              <a:t>4/21/2017</a:t>
             </a:fld>
             <a:endParaRPr lang="en-US" dirty="0"/>
           </a:p>
@@ -3435,7 +3436,7 @@
           <a:p>
             <a:fld id="{9334D819-9F07-4261-B09B-9E467E5D9002}" type="datetimeFigureOut">
               <a:rPr lang="en-US" dirty="0"/>
-              <a:t>3/7/2017</a:t>
+              <a:t>4/21/2017</a:t>
             </a:fld>
             <a:endParaRPr lang="en-US" dirty="0"/>
           </a:p>
@@ -3832,7 +3833,7 @@
           <a:p>
             <a:fld id="{9334D819-9F07-4261-B09B-9E467E5D9002}" type="datetimeFigureOut">
               <a:rPr lang="en-US" dirty="0"/>
-              <a:t>3/7/2017</a:t>
+              <a:t>4/21/2017</a:t>
             </a:fld>
             <a:endParaRPr lang="en-US" dirty="0"/>
           </a:p>
@@ -3962,7 +3963,7 @@
           <a:p>
             <a:fld id="{9334D819-9F07-4261-B09B-9E467E5D9002}" type="datetimeFigureOut">
               <a:rPr lang="en-US" dirty="0"/>
-              <a:t>3/7/2017</a:t>
+              <a:t>4/21/2017</a:t>
             </a:fld>
             <a:endParaRPr lang="en-US" dirty="0"/>
           </a:p>
@@ -4064,7 +4065,7 @@
           <a:p>
             <a:fld id="{9334D819-9F07-4261-B09B-9E467E5D9002}" type="datetimeFigureOut">
               <a:rPr lang="en-US" dirty="0"/>
-              <a:t>3/7/2017</a:t>
+              <a:t>4/21/2017</a:t>
             </a:fld>
             <a:endParaRPr lang="en-US" dirty="0"/>
           </a:p>
@@ -4834,7 +4835,7 @@
           <a:p>
             <a:fld id="{9334D819-9F07-4261-B09B-9E467E5D9002}" type="datetimeFigureOut">
               <a:rPr lang="en-US" dirty="0"/>
-              <a:t>3/7/2017</a:t>
+              <a:t>4/21/2017</a:t>
             </a:fld>
             <a:endParaRPr lang="en-US" dirty="0"/>
           </a:p>
@@ -5681,7 +5682,7 @@
           <a:p>
             <a:fld id="{9334D819-9F07-4261-B09B-9E467E5D9002}" type="datetimeFigureOut">
               <a:rPr lang="en-US" dirty="0"/>
-              <a:t>3/7/2017</a:t>
+              <a:t>4/21/2017</a:t>
             </a:fld>
             <a:endParaRPr lang="en-US" dirty="0"/>
           </a:p>
@@ -5916,7 +5917,7 @@
             <a:fld id="{9334D819-9F07-4261-B09B-9E467E5D9002}" type="datetimeFigureOut">
               <a:rPr lang="en-US" dirty="0"/>
               <a:pPr/>
-              <a:t>3/7/2017</a:t>
+              <a:t>4/21/2017</a:t>
             </a:fld>
             <a:endParaRPr lang="en-US" dirty="0"/>
           </a:p>
@@ -7584,6 +7585,174 @@
 </p:sld>
 </file>
 
+<file path=ppt/slides/slide10.xml><?xml version="1.0" encoding="utf-8"?>
+<p:sld xmlns:a="http://schemas.openxmlformats.org/drawingml/2006/main" xmlns:r="http://schemas.openxmlformats.org/officeDocument/2006/relationships" xmlns:p="http://schemas.openxmlformats.org/presentationml/2006/main">
+  <p:cSld>
+    <p:spTree>
+      <p:nvGrpSpPr>
+        <p:cNvPr id="1" name=""/>
+        <p:cNvGrpSpPr/>
+        <p:nvPr/>
+      </p:nvGrpSpPr>
+      <p:grpSpPr>
+        <a:xfrm>
+          <a:off x="0" y="0"/>
+          <a:ext cx="0" cy="0"/>
+          <a:chOff x="0" y="0"/>
+          <a:chExt cx="0" cy="0"/>
+        </a:xfrm>
+      </p:grpSpPr>
+      <p:sp>
+        <p:nvSpPr>
+          <p:cNvPr id="2" name="TextBox 1"/>
+          <p:cNvSpPr txBox="1"/>
+          <p:nvPr/>
+        </p:nvSpPr>
+        <p:spPr>
+          <a:xfrm>
+            <a:off x="2724995" y="1988106"/>
+            <a:ext cx="7406388" cy="2123658"/>
+          </a:xfrm>
+          <a:prstGeom prst="rect">
+            <a:avLst/>
+          </a:prstGeom>
+          <a:noFill/>
+        </p:spPr>
+        <p:txBody>
+          <a:bodyPr wrap="none" rtlCol="0">
+            <a:spAutoFit/>
+          </a:bodyPr>
+          <a:lstStyle/>
+          <a:p>
+            <a:pPr algn="ctr"/>
+            <a:r>
+              <a:rPr lang="bg-BG" sz="6600" b="1" dirty="0" smtClean="0">
+                <a:ln w="12700">
+                  <a:solidFill>
+                    <a:schemeClr val="tx2">
+                      <a:lumMod val="75000"/>
+                    </a:schemeClr>
+                  </a:solidFill>
+                  <a:prstDash val="solid"/>
+                </a:ln>
+                <a:pattFill prst="dkUpDiag">
+                  <a:fgClr>
+                    <a:schemeClr val="tx2"/>
+                  </a:fgClr>
+                  <a:bgClr>
+                    <a:schemeClr val="tx2">
+                      <a:lumMod val="20000"/>
+                      <a:lumOff val="80000"/>
+                    </a:schemeClr>
+                  </a:bgClr>
+                </a:pattFill>
+                <a:effectLst>
+                  <a:outerShdw dist="38100" dir="2640000" algn="bl" rotWithShape="0">
+                    <a:schemeClr val="tx2">
+                      <a:lumMod val="75000"/>
+                    </a:schemeClr>
+                  </a:outerShdw>
+                </a:effectLst>
+              </a:rPr>
+              <a:t>БЛАГОДАРЯ </a:t>
+            </a:r>
+          </a:p>
+          <a:p>
+            <a:pPr algn="ctr"/>
+            <a:r>
+              <a:rPr lang="bg-BG" sz="6600" b="1" dirty="0" smtClean="0">
+                <a:ln w="12700">
+                  <a:solidFill>
+                    <a:schemeClr val="tx2">
+                      <a:lumMod val="75000"/>
+                    </a:schemeClr>
+                  </a:solidFill>
+                  <a:prstDash val="solid"/>
+                </a:ln>
+                <a:pattFill prst="dkUpDiag">
+                  <a:fgClr>
+                    <a:schemeClr val="tx2"/>
+                  </a:fgClr>
+                  <a:bgClr>
+                    <a:schemeClr val="tx2">
+                      <a:lumMod val="20000"/>
+                      <a:lumOff val="80000"/>
+                    </a:schemeClr>
+                  </a:bgClr>
+                </a:pattFill>
+                <a:effectLst>
+                  <a:outerShdw dist="38100" dir="2640000" algn="bl" rotWithShape="0">
+                    <a:schemeClr val="tx2">
+                      <a:lumMod val="75000"/>
+                    </a:schemeClr>
+                  </a:outerShdw>
+                </a:effectLst>
+              </a:rPr>
+              <a:t>ЗА ВНИМАНИЕТО!</a:t>
+            </a:r>
+            <a:endParaRPr lang="bg-BG" sz="6600" b="1" dirty="0">
+              <a:ln w="12700">
+                <a:solidFill>
+                  <a:schemeClr val="tx2">
+                    <a:lumMod val="75000"/>
+                  </a:schemeClr>
+                </a:solidFill>
+                <a:prstDash val="solid"/>
+              </a:ln>
+              <a:pattFill prst="dkUpDiag">
+                <a:fgClr>
+                  <a:schemeClr val="tx2"/>
+                </a:fgClr>
+                <a:bgClr>
+                  <a:schemeClr val="tx2">
+                    <a:lumMod val="20000"/>
+                    <a:lumOff val="80000"/>
+                  </a:schemeClr>
+                </a:bgClr>
+              </a:pattFill>
+              <a:effectLst>
+                <a:outerShdw dist="38100" dir="2640000" algn="bl" rotWithShape="0">
+                  <a:schemeClr val="tx2">
+                    <a:lumMod val="75000"/>
+                  </a:schemeClr>
+                </a:outerShdw>
+              </a:effectLst>
+            </a:endParaRPr>
+          </a:p>
+        </p:txBody>
+      </p:sp>
+    </p:spTree>
+    <p:extLst>
+      <p:ext uri="{BB962C8B-B14F-4D97-AF65-F5344CB8AC3E}">
+        <p14:creationId xmlns:p14="http://schemas.microsoft.com/office/powerpoint/2010/main" val="2342813153"/>
+      </p:ext>
+    </p:extLst>
+  </p:cSld>
+  <p:clrMapOvr>
+    <a:masterClrMapping/>
+  </p:clrMapOvr>
+  <mc:AlternateContent xmlns:mc="http://schemas.openxmlformats.org/markup-compatibility/2006" xmlns:p14="http://schemas.microsoft.com/office/powerpoint/2010/main">
+    <mc:Choice Requires="p14">
+      <p:transition spd="slow" p14:dur="2750">
+        <p:fade/>
+      </p:transition>
+    </mc:Choice>
+    <mc:Fallback xmlns="">
+      <p:transition spd="slow">
+        <p:fade/>
+      </p:transition>
+    </mc:Fallback>
+  </mc:AlternateContent>
+  <p:timing>
+    <p:tnLst>
+      <p:par>
+        <p:cTn id="1" dur="indefinite" restart="never" nodeType="tmRoot"/>
+      </p:par>
+    </p:tnLst>
+  </p:timing>
+</p:sld>
+</file>
+
 <file path=ppt/slides/slide2.xml><?xml version="1.0" encoding="utf-8"?>
 <p:sld xmlns:a="http://schemas.openxmlformats.org/drawingml/2006/main" xmlns:r="http://schemas.openxmlformats.org/officeDocument/2006/relationships" xmlns:p="http://schemas.openxmlformats.org/presentationml/2006/main">
   <p:cSld>
@@ -7887,7 +8056,23 @@
           <a:p>
             <a:r>
               <a:rPr lang="bg-BG" dirty="0" smtClean="0"/>
-              <a:t>Без повече радиостанции, защото шофьорите получават заявките дирекно на своя таблет или смартфон.</a:t>
+              <a:t>Без повече радиостанции, защото шофьорите получават заявките </a:t>
+            </a:r>
+            <a:r>
+              <a:rPr lang="bg-BG" dirty="0" smtClean="0"/>
+              <a:t>дирек</a:t>
+            </a:r>
+            <a:r>
+              <a:rPr lang="bg-BG" dirty="0"/>
+              <a:t>т</a:t>
+            </a:r>
+            <a:r>
+              <a:rPr lang="bg-BG" dirty="0" smtClean="0"/>
+              <a:t>но </a:t>
+            </a:r>
+            <a:r>
+              <a:rPr lang="bg-BG" dirty="0" smtClean="0"/>
+              <a:t>на своя таблет или смартфон.</a:t>
             </a:r>
           </a:p>
           <a:p>
@@ -8760,32 +8945,14 @@
             </a:r>
           </a:p>
           <a:p>
+            <a:pPr lvl="0"/>
             <a:r>
               <a:rPr lang="bg-BG" dirty="0"/>
               <a:t>Създаване на </a:t>
             </a:r>
             <a:r>
               <a:rPr lang="bg-BG" dirty="0" smtClean="0"/>
-              <a:t>мобилното </a:t>
-            </a:r>
-            <a:r>
-              <a:rPr lang="bg-BG" dirty="0" smtClean="0"/>
-              <a:t>приложение</a:t>
-            </a:r>
-            <a:endParaRPr lang="en-US" dirty="0" smtClean="0"/>
-          </a:p>
-          <a:p>
-            <a:r>
-              <a:rPr lang="bg-BG" dirty="0" smtClean="0"/>
-              <a:t>Създаване </a:t>
-            </a:r>
-            <a:r>
-              <a:rPr lang="bg-BG" dirty="0"/>
-              <a:t>на трите основни потребителски роли в </a:t>
-            </a:r>
-            <a:r>
-              <a:rPr lang="bg-BG" dirty="0" smtClean="0"/>
-              <a:t>проекта</a:t>
+              <a:t>мобилното приложение</a:t>
             </a:r>
             <a:endParaRPr lang="bg-BG" dirty="0"/>
           </a:p>
@@ -8804,11 +8971,30 @@
             <a:pPr lvl="0"/>
             <a:r>
               <a:rPr lang="bg-BG" dirty="0" smtClean="0"/>
-              <a:t>Проверка </a:t>
+              <a:t>Създаване </a:t>
+            </a:r>
+            <a:r>
+              <a:rPr lang="bg-BG" dirty="0"/>
+              <a:t>на трите </a:t>
             </a:r>
             <a:r>
               <a:rPr lang="bg-BG" dirty="0" smtClean="0"/>
-              <a:t>и отстраняване на грешките</a:t>
+              <a:t>основни потребителски </a:t>
+            </a:r>
+            <a:r>
+              <a:rPr lang="bg-BG" dirty="0"/>
+              <a:t>роли в </a:t>
+            </a:r>
+            <a:r>
+              <a:rPr lang="bg-BG" dirty="0" smtClean="0"/>
+              <a:t>проекта</a:t>
+            </a:r>
+          </a:p>
+          <a:p>
+            <a:pPr lvl="0"/>
+            <a:r>
+              <a:rPr lang="bg-BG" dirty="0" smtClean="0"/>
+              <a:t>Проверка и отстраняване на грешките</a:t>
             </a:r>
             <a:endParaRPr lang="bg-BG" dirty="0"/>
           </a:p>
@@ -9233,6 +9419,76 @@
 </file>
 
 <file path=ppt/slides/slide5.xml><?xml version="1.0" encoding="utf-8"?>
+<p:sld xmlns:a="http://schemas.openxmlformats.org/drawingml/2006/main" xmlns:r="http://schemas.openxmlformats.org/officeDocument/2006/relationships" xmlns:p="http://schemas.openxmlformats.org/presentationml/2006/main">
+  <p:cSld>
+    <p:spTree>
+      <p:nvGrpSpPr>
+        <p:cNvPr id="1" name=""/>
+        <p:cNvGrpSpPr/>
+        <p:nvPr/>
+      </p:nvGrpSpPr>
+      <p:grpSpPr>
+        <a:xfrm>
+          <a:off x="0" y="0"/>
+          <a:ext cx="0" cy="0"/>
+          <a:chOff x="0" y="0"/>
+          <a:chExt cx="0" cy="0"/>
+        </a:xfrm>
+      </p:grpSpPr>
+      <p:pic>
+        <p:nvPicPr>
+          <p:cNvPr id="2" name="Picture 1"/>
+          <p:cNvPicPr>
+            <a:picLocks noChangeAspect="1"/>
+          </p:cNvPicPr>
+          <p:nvPr/>
+        </p:nvPicPr>
+        <p:blipFill>
+          <a:blip r:embed="rId2">
+            <a:extLst>
+              <a:ext uri="{28A0092B-C50C-407E-A947-70E740481C1C}">
+                <a14:useLocalDpi xmlns:a14="http://schemas.microsoft.com/office/drawing/2010/main" val="0"/>
+              </a:ext>
+            </a:extLst>
+          </a:blip>
+          <a:stretch>
+            <a:fillRect/>
+          </a:stretch>
+        </p:blipFill>
+        <p:spPr>
+          <a:xfrm>
+            <a:off x="1591587" y="0"/>
+            <a:ext cx="9008825" cy="6858000"/>
+          </a:xfrm>
+          <a:prstGeom prst="rect">
+            <a:avLst/>
+          </a:prstGeom>
+        </p:spPr>
+      </p:pic>
+    </p:spTree>
+    <p:extLst>
+      <p:ext uri="{BB962C8B-B14F-4D97-AF65-F5344CB8AC3E}">
+        <p14:creationId xmlns:p14="http://schemas.microsoft.com/office/powerpoint/2010/main" val="2769955594"/>
+      </p:ext>
+    </p:extLst>
+  </p:cSld>
+  <p:clrMapOvr>
+    <a:masterClrMapping/>
+  </p:clrMapOvr>
+  <p:transition spd="slow">
+    <p:push dir="u"/>
+  </p:transition>
+  <p:timing>
+    <p:tnLst>
+      <p:par>
+        <p:cTn id="1" dur="indefinite" restart="never" nodeType="tmRoot"/>
+      </p:par>
+    </p:tnLst>
+  </p:timing>
+</p:sld>
+</file>
+
+<file path=ppt/slides/slide6.xml><?xml version="1.0" encoding="utf-8"?>
 <p:sld xmlns:a="http://schemas.openxmlformats.org/drawingml/2006/main" xmlns:r="http://schemas.openxmlformats.org/officeDocument/2006/relationships" xmlns:p="http://schemas.openxmlformats.org/presentationml/2006/main">
   <p:cSld>
     <p:spTree>
@@ -9948,7 +10204,7 @@
 </p:sld>
 </file>
 
-<file path=ppt/slides/slide6.xml><?xml version="1.0" encoding="utf-8"?>
+<file path=ppt/slides/slide7.xml><?xml version="1.0" encoding="utf-8"?>
 <p:sld xmlns:a="http://schemas.openxmlformats.org/drawingml/2006/main" xmlns:r="http://schemas.openxmlformats.org/officeDocument/2006/relationships" xmlns:p="http://schemas.openxmlformats.org/presentationml/2006/main">
   <p:cSld>
     <p:spTree>
@@ -10084,8 +10340,8 @@
         </p:blipFill>
         <p:spPr>
           <a:xfrm>
-            <a:off x="1419497" y="1462556"/>
-            <a:ext cx="7559663" cy="3642202"/>
+            <a:off x="1419497" y="1490206"/>
+            <a:ext cx="7559663" cy="3586902"/>
           </a:xfrm>
           <a:prstGeom prst="rect">
             <a:avLst/>
@@ -10513,7 +10769,7 @@
 </p:sld>
 </file>
 
-<file path=ppt/slides/slide7.xml><?xml version="1.0" encoding="utf-8"?>
+<file path=ppt/slides/slide8.xml><?xml version="1.0" encoding="utf-8"?>
 <p:sld xmlns:a="http://schemas.openxmlformats.org/drawingml/2006/main" xmlns:r="http://schemas.openxmlformats.org/officeDocument/2006/relationships" xmlns:p="http://schemas.openxmlformats.org/presentationml/2006/main">
   <p:cSld>
     <p:spTree>
@@ -10577,7 +10833,15 @@
           <a:p>
             <a:r>
               <a:rPr lang="bg-BG" dirty="0" smtClean="0"/>
-              <a:t>Описание на решението (2)</a:t>
+              <a:t>Описание на решението </a:t>
+            </a:r>
+            <a:r>
+              <a:rPr lang="bg-BG" dirty="0" smtClean="0"/>
+              <a:t>(3)</a:t>
+            </a:r>
+            <a:r>
+              <a:rPr lang="bg-BG" dirty="0" smtClean="0"/>
+              <a:t/>
             </a:r>
             <a:br>
               <a:rPr lang="bg-BG" dirty="0" smtClean="0"/>
@@ -11475,7 +11739,7 @@
                         <p:par>
                           <p:cTn id="54" fill="hold">
                             <p:stCondLst>
-                              <p:cond delay="1500"/>
+                              <p:cond delay="500"/>
                             </p:stCondLst>
                             <p:childTnLst>
                               <p:par>
@@ -11549,7 +11813,7 @@
 </p:sld>
 </file>
 
-<file path=ppt/slides/slide8.xml><?xml version="1.0" encoding="utf-8"?>
+<file path=ppt/slides/slide9.xml><?xml version="1.0" encoding="utf-8"?>
 <p:sld xmlns:a="http://schemas.openxmlformats.org/drawingml/2006/main" xmlns:r="http://schemas.openxmlformats.org/officeDocument/2006/relationships" xmlns:p="http://schemas.openxmlformats.org/presentationml/2006/main">
   <p:cSld>
     <p:spTree>
@@ -12438,174 +12702,6 @@
     <p:bldLst>
       <p:bldP spid="4" grpId="0" uiExpand="1" build="p"/>
     </p:bldLst>
-  </p:timing>
-</p:sld>
-</file>
-
-<file path=ppt/slides/slide9.xml><?xml version="1.0" encoding="utf-8"?>
-<p:sld xmlns:a="http://schemas.openxmlformats.org/drawingml/2006/main" xmlns:r="http://schemas.openxmlformats.org/officeDocument/2006/relationships" xmlns:p="http://schemas.openxmlformats.org/presentationml/2006/main">
-  <p:cSld>
-    <p:spTree>
-      <p:nvGrpSpPr>
-        <p:cNvPr id="1" name=""/>
-        <p:cNvGrpSpPr/>
-        <p:nvPr/>
-      </p:nvGrpSpPr>
-      <p:grpSpPr>
-        <a:xfrm>
-          <a:off x="0" y="0"/>
-          <a:ext cx="0" cy="0"/>
-          <a:chOff x="0" y="0"/>
-          <a:chExt cx="0" cy="0"/>
-        </a:xfrm>
-      </p:grpSpPr>
-      <p:sp>
-        <p:nvSpPr>
-          <p:cNvPr id="2" name="TextBox 1"/>
-          <p:cNvSpPr txBox="1"/>
-          <p:nvPr/>
-        </p:nvSpPr>
-        <p:spPr>
-          <a:xfrm>
-            <a:off x="2724995" y="1988106"/>
-            <a:ext cx="7406388" cy="2123658"/>
-          </a:xfrm>
-          <a:prstGeom prst="rect">
-            <a:avLst/>
-          </a:prstGeom>
-          <a:noFill/>
-        </p:spPr>
-        <p:txBody>
-          <a:bodyPr wrap="none" rtlCol="0">
-            <a:spAutoFit/>
-          </a:bodyPr>
-          <a:lstStyle/>
-          <a:p>
-            <a:pPr algn="ctr"/>
-            <a:r>
-              <a:rPr lang="bg-BG" sz="6600" b="1" dirty="0" smtClean="0">
-                <a:ln w="12700">
-                  <a:solidFill>
-                    <a:schemeClr val="tx2">
-                      <a:lumMod val="75000"/>
-                    </a:schemeClr>
-                  </a:solidFill>
-                  <a:prstDash val="solid"/>
-                </a:ln>
-                <a:pattFill prst="dkUpDiag">
-                  <a:fgClr>
-                    <a:schemeClr val="tx2"/>
-                  </a:fgClr>
-                  <a:bgClr>
-                    <a:schemeClr val="tx2">
-                      <a:lumMod val="20000"/>
-                      <a:lumOff val="80000"/>
-                    </a:schemeClr>
-                  </a:bgClr>
-                </a:pattFill>
-                <a:effectLst>
-                  <a:outerShdw dist="38100" dir="2640000" algn="bl" rotWithShape="0">
-                    <a:schemeClr val="tx2">
-                      <a:lumMod val="75000"/>
-                    </a:schemeClr>
-                  </a:outerShdw>
-                </a:effectLst>
-              </a:rPr>
-              <a:t>БЛАГОДАРЯ </a:t>
-            </a:r>
-          </a:p>
-          <a:p>
-            <a:pPr algn="ctr"/>
-            <a:r>
-              <a:rPr lang="bg-BG" sz="6600" b="1" dirty="0" smtClean="0">
-                <a:ln w="12700">
-                  <a:solidFill>
-                    <a:schemeClr val="tx2">
-                      <a:lumMod val="75000"/>
-                    </a:schemeClr>
-                  </a:solidFill>
-                  <a:prstDash val="solid"/>
-                </a:ln>
-                <a:pattFill prst="dkUpDiag">
-                  <a:fgClr>
-                    <a:schemeClr val="tx2"/>
-                  </a:fgClr>
-                  <a:bgClr>
-                    <a:schemeClr val="tx2">
-                      <a:lumMod val="20000"/>
-                      <a:lumOff val="80000"/>
-                    </a:schemeClr>
-                  </a:bgClr>
-                </a:pattFill>
-                <a:effectLst>
-                  <a:outerShdw dist="38100" dir="2640000" algn="bl" rotWithShape="0">
-                    <a:schemeClr val="tx2">
-                      <a:lumMod val="75000"/>
-                    </a:schemeClr>
-                  </a:outerShdw>
-                </a:effectLst>
-              </a:rPr>
-              <a:t>ЗА ВНИМАНИЕТО!</a:t>
-            </a:r>
-            <a:endParaRPr lang="bg-BG" sz="6600" b="1" dirty="0">
-              <a:ln w="12700">
-                <a:solidFill>
-                  <a:schemeClr val="tx2">
-                    <a:lumMod val="75000"/>
-                  </a:schemeClr>
-                </a:solidFill>
-                <a:prstDash val="solid"/>
-              </a:ln>
-              <a:pattFill prst="dkUpDiag">
-                <a:fgClr>
-                  <a:schemeClr val="tx2"/>
-                </a:fgClr>
-                <a:bgClr>
-                  <a:schemeClr val="tx2">
-                    <a:lumMod val="20000"/>
-                    <a:lumOff val="80000"/>
-                  </a:schemeClr>
-                </a:bgClr>
-              </a:pattFill>
-              <a:effectLst>
-                <a:outerShdw dist="38100" dir="2640000" algn="bl" rotWithShape="0">
-                  <a:schemeClr val="tx2">
-                    <a:lumMod val="75000"/>
-                  </a:schemeClr>
-                </a:outerShdw>
-              </a:effectLst>
-            </a:endParaRPr>
-          </a:p>
-        </p:txBody>
-      </p:sp>
-    </p:spTree>
-    <p:extLst>
-      <p:ext uri="{BB962C8B-B14F-4D97-AF65-F5344CB8AC3E}">
-        <p14:creationId xmlns:p14="http://schemas.microsoft.com/office/powerpoint/2010/main" val="2342813153"/>
-      </p:ext>
-    </p:extLst>
-  </p:cSld>
-  <p:clrMapOvr>
-    <a:masterClrMapping/>
-  </p:clrMapOvr>
-  <mc:AlternateContent xmlns:mc="http://schemas.openxmlformats.org/markup-compatibility/2006" xmlns:p14="http://schemas.microsoft.com/office/powerpoint/2010/main">
-    <mc:Choice Requires="p14">
-      <p:transition spd="slow" p14:dur="2750">
-        <p:fade/>
-      </p:transition>
-    </mc:Choice>
-    <mc:Fallback xmlns="">
-      <p:transition spd="slow">
-        <p:fade/>
-      </p:transition>
-    </mc:Fallback>
-  </mc:AlternateContent>
-  <p:timing>
-    <p:tnLst>
-      <p:par>
-        <p:cTn id="1" dur="indefinite" restart="never" nodeType="tmRoot"/>
-      </p:par>
-    </p:tnLst>
   </p:timing>
 </p:sld>
 </file>

</xml_diff>

<commit_message>
Client login and register added using accessTokens
</commit_message>
<xml_diff>
--- a/Presentation.pptx
+++ b/Presentation.pptx
@@ -13,8 +13,9 @@
     <p:sldId id="265" r:id="rId7"/>
     <p:sldId id="270" r:id="rId8"/>
     <p:sldId id="263" r:id="rId9"/>
-    <p:sldId id="267" r:id="rId10"/>
-    <p:sldId id="269" r:id="rId11"/>
+    <p:sldId id="272" r:id="rId10"/>
+    <p:sldId id="267" r:id="rId11"/>
+    <p:sldId id="269" r:id="rId12"/>
   </p:sldIdLst>
   <p:sldSz cx="12192000" cy="6858000"/>
   <p:notesSz cx="6858000" cy="9144000"/>
@@ -1333,7 +1334,7 @@
             <a:fld id="{9334D819-9F07-4261-B09B-9E467E5D9002}" type="datetimeFigureOut">
               <a:rPr lang="en-US" dirty="0"/>
               <a:pPr/>
-              <a:t>4/21/2017</a:t>
+              <a:t>5/12/2017</a:t>
             </a:fld>
             <a:endParaRPr lang="en-US" dirty="0"/>
           </a:p>
@@ -1579,7 +1580,7 @@
           <a:p>
             <a:fld id="{9334D819-9F07-4261-B09B-9E467E5D9002}" type="datetimeFigureOut">
               <a:rPr lang="en-US" dirty="0"/>
-              <a:t>4/21/2017</a:t>
+              <a:t>5/12/2017</a:t>
             </a:fld>
             <a:endParaRPr lang="en-US" dirty="0"/>
           </a:p>
@@ -1766,7 +1767,7 @@
           <a:p>
             <a:fld id="{9334D819-9F07-4261-B09B-9E467E5D9002}" type="datetimeFigureOut">
               <a:rPr lang="en-US" dirty="0"/>
-              <a:t>4/21/2017</a:t>
+              <a:t>5/12/2017</a:t>
             </a:fld>
             <a:endParaRPr lang="en-US" dirty="0"/>
           </a:p>
@@ -1943,7 +1944,7 @@
           <a:p>
             <a:fld id="{9334D819-9F07-4261-B09B-9E467E5D9002}" type="datetimeFigureOut">
               <a:rPr lang="en-US" dirty="0"/>
-              <a:t>4/21/2017</a:t>
+              <a:t>5/12/2017</a:t>
             </a:fld>
             <a:endParaRPr lang="en-US" dirty="0"/>
           </a:p>
@@ -2227,7 +2228,7 @@
             <a:fld id="{9334D819-9F07-4261-B09B-9E467E5D9002}" type="datetimeFigureOut">
               <a:rPr lang="en-US" dirty="0"/>
               <a:pPr/>
-              <a:t>4/21/2017</a:t>
+              <a:t>5/12/2017</a:t>
             </a:fld>
             <a:endParaRPr lang="en-US" dirty="0"/>
           </a:p>
@@ -3436,7 +3437,7 @@
           <a:p>
             <a:fld id="{9334D819-9F07-4261-B09B-9E467E5D9002}" type="datetimeFigureOut">
               <a:rPr lang="en-US" dirty="0"/>
-              <a:t>4/21/2017</a:t>
+              <a:t>5/12/2017</a:t>
             </a:fld>
             <a:endParaRPr lang="en-US" dirty="0"/>
           </a:p>
@@ -3833,7 +3834,7 @@
           <a:p>
             <a:fld id="{9334D819-9F07-4261-B09B-9E467E5D9002}" type="datetimeFigureOut">
               <a:rPr lang="en-US" dirty="0"/>
-              <a:t>4/21/2017</a:t>
+              <a:t>5/12/2017</a:t>
             </a:fld>
             <a:endParaRPr lang="en-US" dirty="0"/>
           </a:p>
@@ -3963,7 +3964,7 @@
           <a:p>
             <a:fld id="{9334D819-9F07-4261-B09B-9E467E5D9002}" type="datetimeFigureOut">
               <a:rPr lang="en-US" dirty="0"/>
-              <a:t>4/21/2017</a:t>
+              <a:t>5/12/2017</a:t>
             </a:fld>
             <a:endParaRPr lang="en-US" dirty="0"/>
           </a:p>
@@ -4065,7 +4066,7 @@
           <a:p>
             <a:fld id="{9334D819-9F07-4261-B09B-9E467E5D9002}" type="datetimeFigureOut">
               <a:rPr lang="en-US" dirty="0"/>
-              <a:t>4/21/2017</a:t>
+              <a:t>5/12/2017</a:t>
             </a:fld>
             <a:endParaRPr lang="en-US" dirty="0"/>
           </a:p>
@@ -4835,7 +4836,7 @@
           <a:p>
             <a:fld id="{9334D819-9F07-4261-B09B-9E467E5D9002}" type="datetimeFigureOut">
               <a:rPr lang="en-US" dirty="0"/>
-              <a:t>4/21/2017</a:t>
+              <a:t>5/12/2017</a:t>
             </a:fld>
             <a:endParaRPr lang="en-US" dirty="0"/>
           </a:p>
@@ -5682,7 +5683,7 @@
           <a:p>
             <a:fld id="{9334D819-9F07-4261-B09B-9E467E5D9002}" type="datetimeFigureOut">
               <a:rPr lang="en-US" dirty="0"/>
-              <a:t>4/21/2017</a:t>
+              <a:t>5/12/2017</a:t>
             </a:fld>
             <a:endParaRPr lang="en-US" dirty="0"/>
           </a:p>
@@ -5917,7 +5918,7 @@
             <a:fld id="{9334D819-9F07-4261-B09B-9E467E5D9002}" type="datetimeFigureOut">
               <a:rPr lang="en-US" dirty="0"/>
               <a:pPr/>
-              <a:t>4/21/2017</a:t>
+              <a:t>5/12/2017</a:t>
             </a:fld>
             <a:endParaRPr lang="en-US" dirty="0"/>
           </a:p>
@@ -7602,6 +7603,899 @@
           <a:chExt cx="0" cy="0"/>
         </a:xfrm>
       </p:grpSpPr>
+      <p:pic>
+        <p:nvPicPr>
+          <p:cNvPr id="3" name="Picture Placeholder 2"/>
+          <p:cNvPicPr>
+            <a:picLocks noGrp="1" noChangeAspect="1"/>
+          </p:cNvPicPr>
+          <p:nvPr>
+            <p:ph type="pic" idx="1"/>
+          </p:nvPr>
+        </p:nvPicPr>
+        <p:blipFill rotWithShape="1">
+          <a:blip r:embed="rId2">
+            <a:extLst>
+              <a:ext uri="{28A0092B-C50C-407E-A947-70E740481C1C}">
+                <a14:useLocalDpi xmlns:a14="http://schemas.microsoft.com/office/drawing/2010/main" val="0"/>
+              </a:ext>
+            </a:extLst>
+          </a:blip>
+          <a:srcRect l="1897" t="20724" r="3399" b="26751"/>
+          <a:stretch/>
+        </p:blipFill>
+        <p:spPr>
+          <a:xfrm>
+            <a:off x="1632449" y="208651"/>
+            <a:ext cx="4821663" cy="1781561"/>
+          </a:xfrm>
+        </p:spPr>
+      </p:pic>
+      <p:sp>
+        <p:nvSpPr>
+          <p:cNvPr id="4" name="Text Placeholder 3"/>
+          <p:cNvSpPr>
+            <a:spLocks noGrp="1"/>
+          </p:cNvSpPr>
+          <p:nvPr>
+            <p:ph type="body" sz="half" idx="2"/>
+          </p:nvPr>
+        </p:nvSpPr>
+        <p:spPr>
+          <a:xfrm>
+            <a:off x="8146294" y="1619416"/>
+            <a:ext cx="3592860" cy="4164164"/>
+          </a:xfrm>
+        </p:spPr>
+        <p:txBody>
+          <a:bodyPr/>
+          <a:lstStyle/>
+          <a:p>
+            <a:pPr>
+              <a:lnSpc>
+                <a:spcPct val="100000"/>
+              </a:lnSpc>
+            </a:pPr>
+            <a:r>
+              <a:rPr lang="bg-BG" dirty="0"/>
+              <a:t>Проектът е реализиран с помощта на:</a:t>
+            </a:r>
+            <a:endParaRPr lang="en-US" dirty="0"/>
+          </a:p>
+          <a:p>
+            <a:pPr marL="342900" indent="-342900">
+              <a:lnSpc>
+                <a:spcPct val="100000"/>
+              </a:lnSpc>
+              <a:buFont typeface="+mj-lt"/>
+              <a:buAutoNum type="arabicPeriod"/>
+            </a:pPr>
+            <a:r>
+              <a:rPr lang="en-US" dirty="0"/>
+              <a:t>Microsoft Visual Studio 2015</a:t>
+            </a:r>
+            <a:endParaRPr lang="bg-BG" dirty="0"/>
+          </a:p>
+          <a:p>
+            <a:pPr marL="285750" indent="-285750">
+              <a:lnSpc>
+                <a:spcPct val="100000"/>
+              </a:lnSpc>
+              <a:buFont typeface="Arial" panose="020B0604020202020204" pitchFamily="34" charset="0"/>
+              <a:buChar char="•"/>
+            </a:pPr>
+            <a:r>
+              <a:rPr lang="en-US" dirty="0" smtClean="0"/>
+              <a:t>ASP.NET MVC 5</a:t>
+            </a:r>
+          </a:p>
+          <a:p>
+            <a:pPr marL="285750" indent="-285750">
+              <a:lnSpc>
+                <a:spcPct val="100000"/>
+              </a:lnSpc>
+              <a:buFont typeface="Arial" panose="020B0604020202020204" pitchFamily="34" charset="0"/>
+              <a:buChar char="•"/>
+            </a:pPr>
+            <a:r>
+              <a:rPr lang="en-US" dirty="0" err="1" smtClean="0"/>
+              <a:t>Telerik</a:t>
+            </a:r>
+            <a:r>
+              <a:rPr lang="en-US" dirty="0" smtClean="0"/>
+              <a:t> </a:t>
+            </a:r>
+            <a:r>
+              <a:rPr lang="en-US" dirty="0"/>
+              <a:t>Platform</a:t>
+            </a:r>
+          </a:p>
+          <a:p>
+            <a:pPr marL="285750" indent="-285750">
+              <a:lnSpc>
+                <a:spcPct val="100000"/>
+              </a:lnSpc>
+              <a:buFont typeface="Arial" panose="020B0604020202020204" pitchFamily="34" charset="0"/>
+              <a:buChar char="•"/>
+            </a:pPr>
+            <a:r>
+              <a:rPr lang="en-US" dirty="0"/>
+              <a:t>Google Console API </a:t>
+            </a:r>
+          </a:p>
+          <a:p>
+            <a:pPr marL="285750" indent="-285750">
+              <a:lnSpc>
+                <a:spcPct val="100000"/>
+              </a:lnSpc>
+              <a:buFont typeface="Arial" panose="020B0604020202020204" pitchFamily="34" charset="0"/>
+              <a:buChar char="•"/>
+            </a:pPr>
+            <a:r>
+              <a:rPr lang="en-US" dirty="0" smtClean="0"/>
+              <a:t>Entity Framework</a:t>
+            </a:r>
+          </a:p>
+          <a:p>
+            <a:endParaRPr lang="bg-BG" dirty="0"/>
+          </a:p>
+        </p:txBody>
+      </p:sp>
+      <p:pic>
+        <p:nvPicPr>
+          <p:cNvPr id="9" name="Picture 8"/>
+          <p:cNvPicPr>
+            <a:picLocks noChangeAspect="1"/>
+          </p:cNvPicPr>
+          <p:nvPr/>
+        </p:nvPicPr>
+        <p:blipFill>
+          <a:blip r:embed="rId3"/>
+          <a:stretch>
+            <a:fillRect/>
+          </a:stretch>
+        </p:blipFill>
+        <p:spPr>
+          <a:xfrm>
+            <a:off x="7639049" y="463260"/>
+            <a:ext cx="10479932" cy="1713124"/>
+          </a:xfrm>
+          <a:prstGeom prst="rect">
+            <a:avLst/>
+          </a:prstGeom>
+        </p:spPr>
+      </p:pic>
+      <p:pic>
+        <p:nvPicPr>
+          <p:cNvPr id="5" name="Picture 4"/>
+          <p:cNvPicPr>
+            <a:picLocks noChangeAspect="1"/>
+          </p:cNvPicPr>
+          <p:nvPr/>
+        </p:nvPicPr>
+        <p:blipFill rotWithShape="1">
+          <a:blip r:embed="rId4">
+            <a:extLst>
+              <a:ext uri="{28A0092B-C50C-407E-A947-70E740481C1C}">
+                <a14:useLocalDpi xmlns:a14="http://schemas.microsoft.com/office/drawing/2010/main" val="0"/>
+              </a:ext>
+            </a:extLst>
+          </a:blip>
+          <a:srcRect t="8786" r="259" b="15145"/>
+          <a:stretch/>
+        </p:blipFill>
+        <p:spPr>
+          <a:xfrm>
+            <a:off x="1632450" y="2482624"/>
+            <a:ext cx="4821663" cy="2002077"/>
+          </a:xfrm>
+          <a:prstGeom prst="rect">
+            <a:avLst/>
+          </a:prstGeom>
+        </p:spPr>
+      </p:pic>
+      <p:pic>
+        <p:nvPicPr>
+          <p:cNvPr id="6" name="Picture 5"/>
+          <p:cNvPicPr>
+            <a:picLocks noChangeAspect="1"/>
+          </p:cNvPicPr>
+          <p:nvPr/>
+        </p:nvPicPr>
+        <p:blipFill>
+          <a:blip r:embed="rId5">
+            <a:extLst>
+              <a:ext uri="{28A0092B-C50C-407E-A947-70E740481C1C}">
+                <a14:useLocalDpi xmlns:a14="http://schemas.microsoft.com/office/drawing/2010/main" val="0"/>
+              </a:ext>
+            </a:extLst>
+          </a:blip>
+          <a:stretch>
+            <a:fillRect/>
+          </a:stretch>
+        </p:blipFill>
+        <p:spPr>
+          <a:xfrm>
+            <a:off x="572139" y="4977113"/>
+            <a:ext cx="6405623" cy="1174291"/>
+          </a:xfrm>
+          <a:prstGeom prst="rect">
+            <a:avLst/>
+          </a:prstGeom>
+        </p:spPr>
+      </p:pic>
+    </p:spTree>
+    <p:extLst>
+      <p:ext uri="{BB962C8B-B14F-4D97-AF65-F5344CB8AC3E}">
+        <p14:creationId xmlns:p14="http://schemas.microsoft.com/office/powerpoint/2010/main" val="4236305089"/>
+      </p:ext>
+    </p:extLst>
+  </p:cSld>
+  <p:clrMapOvr>
+    <a:masterClrMapping/>
+  </p:clrMapOvr>
+  <mc:AlternateContent xmlns:mc="http://schemas.openxmlformats.org/markup-compatibility/2006" xmlns:p14="http://schemas.microsoft.com/office/powerpoint/2010/main">
+    <mc:Choice Requires="p14">
+      <p:transition spd="slow" p14:dur="2750">
+        <p:fade/>
+      </p:transition>
+    </mc:Choice>
+    <mc:Fallback xmlns="">
+      <p:transition spd="slow">
+        <p:fade/>
+      </p:transition>
+    </mc:Fallback>
+  </mc:AlternateContent>
+  <p:timing>
+    <p:tnLst>
+      <p:par>
+        <p:cTn id="1" dur="indefinite" restart="never" nodeType="tmRoot">
+          <p:childTnLst>
+            <p:seq concurrent="1" nextAc="seek">
+              <p:cTn id="2" dur="indefinite" nodeType="mainSeq">
+                <p:childTnLst>
+                  <p:par>
+                    <p:cTn id="3" fill="hold">
+                      <p:stCondLst>
+                        <p:cond delay="indefinite"/>
+                      </p:stCondLst>
+                      <p:childTnLst>
+                        <p:par>
+                          <p:cTn id="4" fill="hold">
+                            <p:stCondLst>
+                              <p:cond delay="0"/>
+                            </p:stCondLst>
+                            <p:childTnLst>
+                              <p:par>
+                                <p:cTn id="5" presetID="42" presetClass="entr" presetSubtype="0" fill="hold" nodeType="clickEffect">
+                                  <p:stCondLst>
+                                    <p:cond delay="0"/>
+                                  </p:stCondLst>
+                                  <p:childTnLst>
+                                    <p:set>
+                                      <p:cBhvr>
+                                        <p:cTn id="6" dur="1" fill="hold">
+                                          <p:stCondLst>
+                                            <p:cond delay="0"/>
+                                          </p:stCondLst>
+                                        </p:cTn>
+                                        <p:tgtEl>
+                                          <p:spTgt spid="9"/>
+                                        </p:tgtEl>
+                                        <p:attrNameLst>
+                                          <p:attrName>style.visibility</p:attrName>
+                                        </p:attrNameLst>
+                                      </p:cBhvr>
+                                      <p:to>
+                                        <p:strVal val="visible"/>
+                                      </p:to>
+                                    </p:set>
+                                    <p:animEffect transition="in" filter="fade">
+                                      <p:cBhvr>
+                                        <p:cTn id="7" dur="1000"/>
+                                        <p:tgtEl>
+                                          <p:spTgt spid="9"/>
+                                        </p:tgtEl>
+                                      </p:cBhvr>
+                                    </p:animEffect>
+                                    <p:anim calcmode="lin" valueType="num">
+                                      <p:cBhvr>
+                                        <p:cTn id="8" dur="1000" fill="hold"/>
+                                        <p:tgtEl>
+                                          <p:spTgt spid="9"/>
+                                        </p:tgtEl>
+                                        <p:attrNameLst>
+                                          <p:attrName>ppt_x</p:attrName>
+                                        </p:attrNameLst>
+                                      </p:cBhvr>
+                                      <p:tavLst>
+                                        <p:tav tm="0">
+                                          <p:val>
+                                            <p:strVal val="#ppt_x"/>
+                                          </p:val>
+                                        </p:tav>
+                                        <p:tav tm="100000">
+                                          <p:val>
+                                            <p:strVal val="#ppt_x"/>
+                                          </p:val>
+                                        </p:tav>
+                                      </p:tavLst>
+                                    </p:anim>
+                                    <p:anim calcmode="lin" valueType="num">
+                                      <p:cBhvr>
+                                        <p:cTn id="9" dur="1000" fill="hold"/>
+                                        <p:tgtEl>
+                                          <p:spTgt spid="9"/>
+                                        </p:tgtEl>
+                                        <p:attrNameLst>
+                                          <p:attrName>ppt_y</p:attrName>
+                                        </p:attrNameLst>
+                                      </p:cBhvr>
+                                      <p:tavLst>
+                                        <p:tav tm="0">
+                                          <p:val>
+                                            <p:strVal val="#ppt_y+.1"/>
+                                          </p:val>
+                                        </p:tav>
+                                        <p:tav tm="100000">
+                                          <p:val>
+                                            <p:strVal val="#ppt_y"/>
+                                          </p:val>
+                                        </p:tav>
+                                      </p:tavLst>
+                                    </p:anim>
+                                  </p:childTnLst>
+                                </p:cTn>
+                              </p:par>
+                            </p:childTnLst>
+                          </p:cTn>
+                        </p:par>
+                      </p:childTnLst>
+                    </p:cTn>
+                  </p:par>
+                  <p:par>
+                    <p:cTn id="10" fill="hold">
+                      <p:stCondLst>
+                        <p:cond delay="indefinite"/>
+                      </p:stCondLst>
+                      <p:childTnLst>
+                        <p:par>
+                          <p:cTn id="11" fill="hold">
+                            <p:stCondLst>
+                              <p:cond delay="0"/>
+                            </p:stCondLst>
+                            <p:childTnLst>
+                              <p:par>
+                                <p:cTn id="12" presetID="10" presetClass="entr" presetSubtype="0" fill="hold" grpId="0" nodeType="clickEffect">
+                                  <p:stCondLst>
+                                    <p:cond delay="0"/>
+                                  </p:stCondLst>
+                                  <p:childTnLst>
+                                    <p:set>
+                                      <p:cBhvr>
+                                        <p:cTn id="13" dur="1" fill="hold">
+                                          <p:stCondLst>
+                                            <p:cond delay="0"/>
+                                          </p:stCondLst>
+                                        </p:cTn>
+                                        <p:tgtEl>
+                                          <p:spTgt spid="4">
+                                            <p:txEl>
+                                              <p:pRg st="0" end="0"/>
+                                            </p:txEl>
+                                          </p:spTgt>
+                                        </p:tgtEl>
+                                        <p:attrNameLst>
+                                          <p:attrName>style.visibility</p:attrName>
+                                        </p:attrNameLst>
+                                      </p:cBhvr>
+                                      <p:to>
+                                        <p:strVal val="visible"/>
+                                      </p:to>
+                                    </p:set>
+                                    <p:animEffect transition="in" filter="fade">
+                                      <p:cBhvr>
+                                        <p:cTn id="14" dur="500"/>
+                                        <p:tgtEl>
+                                          <p:spTgt spid="4">
+                                            <p:txEl>
+                                              <p:pRg st="0" end="0"/>
+                                            </p:txEl>
+                                          </p:spTgt>
+                                        </p:tgtEl>
+                                      </p:cBhvr>
+                                    </p:animEffect>
+                                  </p:childTnLst>
+                                </p:cTn>
+                              </p:par>
+                            </p:childTnLst>
+                          </p:cTn>
+                        </p:par>
+                      </p:childTnLst>
+                    </p:cTn>
+                  </p:par>
+                  <p:par>
+                    <p:cTn id="15" fill="hold">
+                      <p:stCondLst>
+                        <p:cond delay="indefinite"/>
+                      </p:stCondLst>
+                      <p:childTnLst>
+                        <p:par>
+                          <p:cTn id="16" fill="hold">
+                            <p:stCondLst>
+                              <p:cond delay="0"/>
+                            </p:stCondLst>
+                            <p:childTnLst>
+                              <p:par>
+                                <p:cTn id="17" presetID="10" presetClass="entr" presetSubtype="0" fill="hold" grpId="0" nodeType="clickEffect">
+                                  <p:stCondLst>
+                                    <p:cond delay="0"/>
+                                  </p:stCondLst>
+                                  <p:childTnLst>
+                                    <p:set>
+                                      <p:cBhvr>
+                                        <p:cTn id="18" dur="1" fill="hold">
+                                          <p:stCondLst>
+                                            <p:cond delay="0"/>
+                                          </p:stCondLst>
+                                        </p:cTn>
+                                        <p:tgtEl>
+                                          <p:spTgt spid="4">
+                                            <p:txEl>
+                                              <p:pRg st="1" end="1"/>
+                                            </p:txEl>
+                                          </p:spTgt>
+                                        </p:tgtEl>
+                                        <p:attrNameLst>
+                                          <p:attrName>style.visibility</p:attrName>
+                                        </p:attrNameLst>
+                                      </p:cBhvr>
+                                      <p:to>
+                                        <p:strVal val="visible"/>
+                                      </p:to>
+                                    </p:set>
+                                    <p:animEffect transition="in" filter="fade">
+                                      <p:cBhvr>
+                                        <p:cTn id="19" dur="500"/>
+                                        <p:tgtEl>
+                                          <p:spTgt spid="4">
+                                            <p:txEl>
+                                              <p:pRg st="1" end="1"/>
+                                            </p:txEl>
+                                          </p:spTgt>
+                                        </p:tgtEl>
+                                      </p:cBhvr>
+                                    </p:animEffect>
+                                  </p:childTnLst>
+                                </p:cTn>
+                              </p:par>
+                            </p:childTnLst>
+                          </p:cTn>
+                        </p:par>
+                        <p:par>
+                          <p:cTn id="20" fill="hold">
+                            <p:stCondLst>
+                              <p:cond delay="500"/>
+                            </p:stCondLst>
+                            <p:childTnLst>
+                              <p:par>
+                                <p:cTn id="21" presetID="10" presetClass="entr" presetSubtype="0" fill="hold" nodeType="afterEffect">
+                                  <p:stCondLst>
+                                    <p:cond delay="0"/>
+                                  </p:stCondLst>
+                                  <p:childTnLst>
+                                    <p:set>
+                                      <p:cBhvr>
+                                        <p:cTn id="22" dur="1" fill="hold">
+                                          <p:stCondLst>
+                                            <p:cond delay="0"/>
+                                          </p:stCondLst>
+                                        </p:cTn>
+                                        <p:tgtEl>
+                                          <p:spTgt spid="3"/>
+                                        </p:tgtEl>
+                                        <p:attrNameLst>
+                                          <p:attrName>style.visibility</p:attrName>
+                                        </p:attrNameLst>
+                                      </p:cBhvr>
+                                      <p:to>
+                                        <p:strVal val="visible"/>
+                                      </p:to>
+                                    </p:set>
+                                    <p:animEffect transition="in" filter="fade">
+                                      <p:cBhvr>
+                                        <p:cTn id="23" dur="500"/>
+                                        <p:tgtEl>
+                                          <p:spTgt spid="3"/>
+                                        </p:tgtEl>
+                                      </p:cBhvr>
+                                    </p:animEffect>
+                                  </p:childTnLst>
+                                </p:cTn>
+                              </p:par>
+                            </p:childTnLst>
+                          </p:cTn>
+                        </p:par>
+                      </p:childTnLst>
+                    </p:cTn>
+                  </p:par>
+                  <p:par>
+                    <p:cTn id="24" fill="hold">
+                      <p:stCondLst>
+                        <p:cond delay="indefinite"/>
+                      </p:stCondLst>
+                      <p:childTnLst>
+                        <p:par>
+                          <p:cTn id="25" fill="hold">
+                            <p:stCondLst>
+                              <p:cond delay="0"/>
+                            </p:stCondLst>
+                            <p:childTnLst>
+                              <p:par>
+                                <p:cTn id="26" presetID="10" presetClass="entr" presetSubtype="0" fill="hold" grpId="0" nodeType="clickEffect">
+                                  <p:stCondLst>
+                                    <p:cond delay="0"/>
+                                  </p:stCondLst>
+                                  <p:childTnLst>
+                                    <p:set>
+                                      <p:cBhvr>
+                                        <p:cTn id="27" dur="1" fill="hold">
+                                          <p:stCondLst>
+                                            <p:cond delay="0"/>
+                                          </p:stCondLst>
+                                        </p:cTn>
+                                        <p:tgtEl>
+                                          <p:spTgt spid="4">
+                                            <p:txEl>
+                                              <p:pRg st="2" end="2"/>
+                                            </p:txEl>
+                                          </p:spTgt>
+                                        </p:tgtEl>
+                                        <p:attrNameLst>
+                                          <p:attrName>style.visibility</p:attrName>
+                                        </p:attrNameLst>
+                                      </p:cBhvr>
+                                      <p:to>
+                                        <p:strVal val="visible"/>
+                                      </p:to>
+                                    </p:set>
+                                    <p:animEffect transition="in" filter="fade">
+                                      <p:cBhvr>
+                                        <p:cTn id="28" dur="500"/>
+                                        <p:tgtEl>
+                                          <p:spTgt spid="4">
+                                            <p:txEl>
+                                              <p:pRg st="2" end="2"/>
+                                            </p:txEl>
+                                          </p:spTgt>
+                                        </p:tgtEl>
+                                      </p:cBhvr>
+                                    </p:animEffect>
+                                  </p:childTnLst>
+                                </p:cTn>
+                              </p:par>
+                            </p:childTnLst>
+                          </p:cTn>
+                        </p:par>
+                        <p:par>
+                          <p:cTn id="29" fill="hold">
+                            <p:stCondLst>
+                              <p:cond delay="500"/>
+                            </p:stCondLst>
+                            <p:childTnLst>
+                              <p:par>
+                                <p:cTn id="30" presetID="10" presetClass="entr" presetSubtype="0" fill="hold" nodeType="afterEffect">
+                                  <p:stCondLst>
+                                    <p:cond delay="0"/>
+                                  </p:stCondLst>
+                                  <p:childTnLst>
+                                    <p:set>
+                                      <p:cBhvr>
+                                        <p:cTn id="31" dur="1" fill="hold">
+                                          <p:stCondLst>
+                                            <p:cond delay="0"/>
+                                          </p:stCondLst>
+                                        </p:cTn>
+                                        <p:tgtEl>
+                                          <p:spTgt spid="5"/>
+                                        </p:tgtEl>
+                                        <p:attrNameLst>
+                                          <p:attrName>style.visibility</p:attrName>
+                                        </p:attrNameLst>
+                                      </p:cBhvr>
+                                      <p:to>
+                                        <p:strVal val="visible"/>
+                                      </p:to>
+                                    </p:set>
+                                    <p:animEffect transition="in" filter="fade">
+                                      <p:cBhvr>
+                                        <p:cTn id="32" dur="500"/>
+                                        <p:tgtEl>
+                                          <p:spTgt spid="5"/>
+                                        </p:tgtEl>
+                                      </p:cBhvr>
+                                    </p:animEffect>
+                                  </p:childTnLst>
+                                </p:cTn>
+                              </p:par>
+                            </p:childTnLst>
+                          </p:cTn>
+                        </p:par>
+                      </p:childTnLst>
+                    </p:cTn>
+                  </p:par>
+                  <p:par>
+                    <p:cTn id="33" fill="hold">
+                      <p:stCondLst>
+                        <p:cond delay="indefinite"/>
+                      </p:stCondLst>
+                      <p:childTnLst>
+                        <p:par>
+                          <p:cTn id="34" fill="hold">
+                            <p:stCondLst>
+                              <p:cond delay="0"/>
+                            </p:stCondLst>
+                            <p:childTnLst>
+                              <p:par>
+                                <p:cTn id="35" presetID="10" presetClass="entr" presetSubtype="0" fill="hold" grpId="0" nodeType="clickEffect">
+                                  <p:stCondLst>
+                                    <p:cond delay="0"/>
+                                  </p:stCondLst>
+                                  <p:childTnLst>
+                                    <p:set>
+                                      <p:cBhvr>
+                                        <p:cTn id="36" dur="1" fill="hold">
+                                          <p:stCondLst>
+                                            <p:cond delay="0"/>
+                                          </p:stCondLst>
+                                        </p:cTn>
+                                        <p:tgtEl>
+                                          <p:spTgt spid="4">
+                                            <p:txEl>
+                                              <p:pRg st="3" end="3"/>
+                                            </p:txEl>
+                                          </p:spTgt>
+                                        </p:tgtEl>
+                                        <p:attrNameLst>
+                                          <p:attrName>style.visibility</p:attrName>
+                                        </p:attrNameLst>
+                                      </p:cBhvr>
+                                      <p:to>
+                                        <p:strVal val="visible"/>
+                                      </p:to>
+                                    </p:set>
+                                    <p:animEffect transition="in" filter="fade">
+                                      <p:cBhvr>
+                                        <p:cTn id="37" dur="500"/>
+                                        <p:tgtEl>
+                                          <p:spTgt spid="4">
+                                            <p:txEl>
+                                              <p:pRg st="3" end="3"/>
+                                            </p:txEl>
+                                          </p:spTgt>
+                                        </p:tgtEl>
+                                      </p:cBhvr>
+                                    </p:animEffect>
+                                  </p:childTnLst>
+                                </p:cTn>
+                              </p:par>
+                            </p:childTnLst>
+                          </p:cTn>
+                        </p:par>
+                        <p:par>
+                          <p:cTn id="38" fill="hold">
+                            <p:stCondLst>
+                              <p:cond delay="500"/>
+                            </p:stCondLst>
+                            <p:childTnLst>
+                              <p:par>
+                                <p:cTn id="39" presetID="10" presetClass="entr" presetSubtype="0" fill="hold" nodeType="afterEffect">
+                                  <p:stCondLst>
+                                    <p:cond delay="0"/>
+                                  </p:stCondLst>
+                                  <p:childTnLst>
+                                    <p:set>
+                                      <p:cBhvr>
+                                        <p:cTn id="40" dur="1" fill="hold">
+                                          <p:stCondLst>
+                                            <p:cond delay="0"/>
+                                          </p:stCondLst>
+                                        </p:cTn>
+                                        <p:tgtEl>
+                                          <p:spTgt spid="6"/>
+                                        </p:tgtEl>
+                                        <p:attrNameLst>
+                                          <p:attrName>style.visibility</p:attrName>
+                                        </p:attrNameLst>
+                                      </p:cBhvr>
+                                      <p:to>
+                                        <p:strVal val="visible"/>
+                                      </p:to>
+                                    </p:set>
+                                    <p:animEffect transition="in" filter="fade">
+                                      <p:cBhvr>
+                                        <p:cTn id="41" dur="500"/>
+                                        <p:tgtEl>
+                                          <p:spTgt spid="6"/>
+                                        </p:tgtEl>
+                                      </p:cBhvr>
+                                    </p:animEffect>
+                                  </p:childTnLst>
+                                </p:cTn>
+                              </p:par>
+                            </p:childTnLst>
+                          </p:cTn>
+                        </p:par>
+                      </p:childTnLst>
+                    </p:cTn>
+                  </p:par>
+                  <p:par>
+                    <p:cTn id="42" fill="hold">
+                      <p:stCondLst>
+                        <p:cond delay="indefinite"/>
+                      </p:stCondLst>
+                      <p:childTnLst>
+                        <p:par>
+                          <p:cTn id="43" fill="hold">
+                            <p:stCondLst>
+                              <p:cond delay="0"/>
+                            </p:stCondLst>
+                            <p:childTnLst>
+                              <p:par>
+                                <p:cTn id="44" presetID="10" presetClass="entr" presetSubtype="0" fill="hold" grpId="0" nodeType="clickEffect">
+                                  <p:stCondLst>
+                                    <p:cond delay="0"/>
+                                  </p:stCondLst>
+                                  <p:childTnLst>
+                                    <p:set>
+                                      <p:cBhvr>
+                                        <p:cTn id="45" dur="1" fill="hold">
+                                          <p:stCondLst>
+                                            <p:cond delay="0"/>
+                                          </p:stCondLst>
+                                        </p:cTn>
+                                        <p:tgtEl>
+                                          <p:spTgt spid="4">
+                                            <p:txEl>
+                                              <p:pRg st="4" end="4"/>
+                                            </p:txEl>
+                                          </p:spTgt>
+                                        </p:tgtEl>
+                                        <p:attrNameLst>
+                                          <p:attrName>style.visibility</p:attrName>
+                                        </p:attrNameLst>
+                                      </p:cBhvr>
+                                      <p:to>
+                                        <p:strVal val="visible"/>
+                                      </p:to>
+                                    </p:set>
+                                    <p:animEffect transition="in" filter="fade">
+                                      <p:cBhvr>
+                                        <p:cTn id="46" dur="500"/>
+                                        <p:tgtEl>
+                                          <p:spTgt spid="4">
+                                            <p:txEl>
+                                              <p:pRg st="4" end="4"/>
+                                            </p:txEl>
+                                          </p:spTgt>
+                                        </p:tgtEl>
+                                      </p:cBhvr>
+                                    </p:animEffect>
+                                  </p:childTnLst>
+                                </p:cTn>
+                              </p:par>
+                            </p:childTnLst>
+                          </p:cTn>
+                        </p:par>
+                      </p:childTnLst>
+                    </p:cTn>
+                  </p:par>
+                  <p:par>
+                    <p:cTn id="47" fill="hold">
+                      <p:stCondLst>
+                        <p:cond delay="indefinite"/>
+                      </p:stCondLst>
+                      <p:childTnLst>
+                        <p:par>
+                          <p:cTn id="48" fill="hold">
+                            <p:stCondLst>
+                              <p:cond delay="0"/>
+                            </p:stCondLst>
+                            <p:childTnLst>
+                              <p:par>
+                                <p:cTn id="49" presetID="10" presetClass="entr" presetSubtype="0" fill="hold" grpId="0" nodeType="clickEffect">
+                                  <p:stCondLst>
+                                    <p:cond delay="0"/>
+                                  </p:stCondLst>
+                                  <p:childTnLst>
+                                    <p:set>
+                                      <p:cBhvr>
+                                        <p:cTn id="50" dur="1" fill="hold">
+                                          <p:stCondLst>
+                                            <p:cond delay="0"/>
+                                          </p:stCondLst>
+                                        </p:cTn>
+                                        <p:tgtEl>
+                                          <p:spTgt spid="4">
+                                            <p:txEl>
+                                              <p:pRg st="5" end="5"/>
+                                            </p:txEl>
+                                          </p:spTgt>
+                                        </p:tgtEl>
+                                        <p:attrNameLst>
+                                          <p:attrName>style.visibility</p:attrName>
+                                        </p:attrNameLst>
+                                      </p:cBhvr>
+                                      <p:to>
+                                        <p:strVal val="visible"/>
+                                      </p:to>
+                                    </p:set>
+                                    <p:animEffect transition="in" filter="fade">
+                                      <p:cBhvr>
+                                        <p:cTn id="51" dur="500"/>
+                                        <p:tgtEl>
+                                          <p:spTgt spid="4">
+                                            <p:txEl>
+                                              <p:pRg st="5" end="5"/>
+                                            </p:txEl>
+                                          </p:spTgt>
+                                        </p:tgtEl>
+                                      </p:cBhvr>
+                                    </p:animEffect>
+                                  </p:childTnLst>
+                                </p:cTn>
+                              </p:par>
+                            </p:childTnLst>
+                          </p:cTn>
+                        </p:par>
+                      </p:childTnLst>
+                    </p:cTn>
+                  </p:par>
+                </p:childTnLst>
+              </p:cTn>
+              <p:prevCondLst>
+                <p:cond evt="onPrev" delay="0">
+                  <p:tgtEl>
+                    <p:sldTgt/>
+                  </p:tgtEl>
+                </p:cond>
+              </p:prevCondLst>
+              <p:nextCondLst>
+                <p:cond evt="onNext" delay="0">
+                  <p:tgtEl>
+                    <p:sldTgt/>
+                  </p:tgtEl>
+                </p:cond>
+              </p:nextCondLst>
+            </p:seq>
+          </p:childTnLst>
+        </p:cTn>
+      </p:par>
+    </p:tnLst>
+    <p:bldLst>
+      <p:bldP spid="4" grpId="0" uiExpand="1" build="p"/>
+    </p:bldLst>
+  </p:timing>
+</p:sld>
+</file>
+
+<file path=ppt/slides/slide11.xml><?xml version="1.0" encoding="utf-8"?>
+<p:sld xmlns:a="http://schemas.openxmlformats.org/drawingml/2006/main" xmlns:r="http://schemas.openxmlformats.org/officeDocument/2006/relationships" xmlns:p="http://schemas.openxmlformats.org/presentationml/2006/main">
+  <p:cSld>
+    <p:spTree>
+      <p:nvGrpSpPr>
+        <p:cNvPr id="1" name=""/>
+        <p:cNvGrpSpPr/>
+        <p:nvPr/>
+      </p:nvGrpSpPr>
+      <p:grpSpPr>
+        <a:xfrm>
+          <a:off x="0" y="0"/>
+          <a:ext cx="0" cy="0"/>
+          <a:chOff x="0" y="0"/>
+          <a:chExt cx="0" cy="0"/>
+        </a:xfrm>
+      </p:grpSpPr>
       <p:sp>
         <p:nvSpPr>
           <p:cNvPr id="2" name="TextBox 1"/>
@@ -8056,11 +8950,7 @@
           <a:p>
             <a:r>
               <a:rPr lang="bg-BG" dirty="0" smtClean="0"/>
-              <a:t>Без повече радиостанции, защото шофьорите получават заявките </a:t>
-            </a:r>
-            <a:r>
-              <a:rPr lang="bg-BG" dirty="0" smtClean="0"/>
-              <a:t>дирек</a:t>
+              <a:t>Без повече радиостанции, защото шофьорите получават заявките дирек</a:t>
             </a:r>
             <a:r>
               <a:rPr lang="bg-BG" dirty="0"/>
@@ -8068,11 +8958,7 @@
             </a:r>
             <a:r>
               <a:rPr lang="bg-BG" dirty="0" smtClean="0"/>
-              <a:t>но </a:t>
-            </a:r>
-            <a:r>
-              <a:rPr lang="bg-BG" dirty="0" smtClean="0"/>
-              <a:t>на своя таблет или смартфон.</a:t>
+              <a:t>но на своя таблет или смартфон.</a:t>
             </a:r>
           </a:p>
           <a:p>
@@ -10833,15 +11719,7 @@
           <a:p>
             <a:r>
               <a:rPr lang="bg-BG" dirty="0" smtClean="0"/>
-              <a:t>Описание на решението </a:t>
-            </a:r>
-            <a:r>
-              <a:rPr lang="bg-BG" dirty="0" smtClean="0"/>
-              <a:t>(3)</a:t>
-            </a:r>
-            <a:r>
-              <a:rPr lang="bg-BG" dirty="0" smtClean="0"/>
-              <a:t/>
+              <a:t>Описание на решението (3)</a:t>
             </a:r>
             <a:br>
               <a:rPr lang="bg-BG" dirty="0" smtClean="0"/>
@@ -11830,207 +12708,37 @@
           <a:chExt cx="0" cy="0"/>
         </a:xfrm>
       </p:grpSpPr>
+      <p:sp>
+        <p:nvSpPr>
+          <p:cNvPr id="2" name="Title 1"/>
+          <p:cNvSpPr>
+            <a:spLocks noGrp="1"/>
+          </p:cNvSpPr>
+          <p:nvPr>
+            <p:ph type="title"/>
+          </p:nvPr>
+        </p:nvSpPr>
+        <p:spPr/>
+        <p:txBody>
+          <a:bodyPr/>
+          <a:lstStyle/>
+          <a:p>
+            <a:endParaRPr lang="bg-BG" dirty="0"/>
+          </a:p>
+        </p:txBody>
+      </p:sp>
       <p:pic>
         <p:nvPicPr>
-          <p:cNvPr id="3" name="Picture Placeholder 2"/>
+          <p:cNvPr id="4" name="Content Placeholder 3"/>
           <p:cNvPicPr>
             <a:picLocks noGrp="1" noChangeAspect="1"/>
           </p:cNvPicPr>
           <p:nvPr>
-            <p:ph type="pic" idx="1"/>
+            <p:ph idx="1"/>
           </p:nvPr>
         </p:nvPicPr>
-        <p:blipFill rotWithShape="1">
+        <p:blipFill>
           <a:blip r:embed="rId2">
-            <a:extLst>
-              <a:ext uri="{28A0092B-C50C-407E-A947-70E740481C1C}">
-                <a14:useLocalDpi xmlns:a14="http://schemas.microsoft.com/office/drawing/2010/main" val="0"/>
-              </a:ext>
-            </a:extLst>
-          </a:blip>
-          <a:srcRect l="1897" t="20724" r="3399" b="26751"/>
-          <a:stretch/>
-        </p:blipFill>
-        <p:spPr>
-          <a:xfrm>
-            <a:off x="1632449" y="208651"/>
-            <a:ext cx="4821663" cy="1781561"/>
-          </a:xfrm>
-        </p:spPr>
-      </p:pic>
-      <p:sp>
-        <p:nvSpPr>
-          <p:cNvPr id="4" name="Text Placeholder 3"/>
-          <p:cNvSpPr>
-            <a:spLocks noGrp="1"/>
-          </p:cNvSpPr>
-          <p:nvPr>
-            <p:ph type="body" sz="half" idx="2"/>
-          </p:nvPr>
-        </p:nvSpPr>
-        <p:spPr>
-          <a:xfrm>
-            <a:off x="8146294" y="1619416"/>
-            <a:ext cx="3592860" cy="4164164"/>
-          </a:xfrm>
-        </p:spPr>
-        <p:txBody>
-          <a:bodyPr/>
-          <a:lstStyle/>
-          <a:p>
-            <a:pPr>
-              <a:lnSpc>
-                <a:spcPct val="100000"/>
-              </a:lnSpc>
-            </a:pPr>
-            <a:r>
-              <a:rPr lang="bg-BG" dirty="0"/>
-              <a:t>Проектът е реализиран с помощта на:</a:t>
-            </a:r>
-            <a:endParaRPr lang="en-US" dirty="0"/>
-          </a:p>
-          <a:p>
-            <a:pPr marL="342900" indent="-342900">
-              <a:lnSpc>
-                <a:spcPct val="100000"/>
-              </a:lnSpc>
-              <a:buFont typeface="+mj-lt"/>
-              <a:buAutoNum type="arabicPeriod"/>
-            </a:pPr>
-            <a:r>
-              <a:rPr lang="en-US" dirty="0"/>
-              <a:t>Microsoft Visual Studio 2015</a:t>
-            </a:r>
-            <a:endParaRPr lang="bg-BG" dirty="0"/>
-          </a:p>
-          <a:p>
-            <a:pPr marL="285750" indent="-285750">
-              <a:lnSpc>
-                <a:spcPct val="100000"/>
-              </a:lnSpc>
-              <a:buFont typeface="Arial" panose="020B0604020202020204" pitchFamily="34" charset="0"/>
-              <a:buChar char="•"/>
-            </a:pPr>
-            <a:r>
-              <a:rPr lang="en-US" dirty="0" smtClean="0"/>
-              <a:t>ASP.NET MVC 5</a:t>
-            </a:r>
-          </a:p>
-          <a:p>
-            <a:pPr marL="285750" indent="-285750">
-              <a:lnSpc>
-                <a:spcPct val="100000"/>
-              </a:lnSpc>
-              <a:buFont typeface="Arial" panose="020B0604020202020204" pitchFamily="34" charset="0"/>
-              <a:buChar char="•"/>
-            </a:pPr>
-            <a:r>
-              <a:rPr lang="en-US" dirty="0" err="1" smtClean="0"/>
-              <a:t>Telerik</a:t>
-            </a:r>
-            <a:r>
-              <a:rPr lang="en-US" dirty="0" smtClean="0"/>
-              <a:t> </a:t>
-            </a:r>
-            <a:r>
-              <a:rPr lang="en-US" dirty="0"/>
-              <a:t>Platform</a:t>
-            </a:r>
-          </a:p>
-          <a:p>
-            <a:pPr marL="285750" indent="-285750">
-              <a:lnSpc>
-                <a:spcPct val="100000"/>
-              </a:lnSpc>
-              <a:buFont typeface="Arial" panose="020B0604020202020204" pitchFamily="34" charset="0"/>
-              <a:buChar char="•"/>
-            </a:pPr>
-            <a:r>
-              <a:rPr lang="en-US" dirty="0"/>
-              <a:t>Google Console API </a:t>
-            </a:r>
-          </a:p>
-          <a:p>
-            <a:pPr marL="285750" indent="-285750">
-              <a:lnSpc>
-                <a:spcPct val="100000"/>
-              </a:lnSpc>
-              <a:buFont typeface="Arial" panose="020B0604020202020204" pitchFamily="34" charset="0"/>
-              <a:buChar char="•"/>
-            </a:pPr>
-            <a:r>
-              <a:rPr lang="en-US" dirty="0" smtClean="0"/>
-              <a:t>Entity Framework</a:t>
-            </a:r>
-          </a:p>
-          <a:p>
-            <a:endParaRPr lang="bg-BG" dirty="0"/>
-          </a:p>
-        </p:txBody>
-      </p:sp>
-      <p:pic>
-        <p:nvPicPr>
-          <p:cNvPr id="9" name="Picture 8"/>
-          <p:cNvPicPr>
-            <a:picLocks noChangeAspect="1"/>
-          </p:cNvPicPr>
-          <p:nvPr/>
-        </p:nvPicPr>
-        <p:blipFill>
-          <a:blip r:embed="rId3"/>
-          <a:stretch>
-            <a:fillRect/>
-          </a:stretch>
-        </p:blipFill>
-        <p:spPr>
-          <a:xfrm>
-            <a:off x="7639049" y="463260"/>
-            <a:ext cx="10479932" cy="1713124"/>
-          </a:xfrm>
-          <a:prstGeom prst="rect">
-            <a:avLst/>
-          </a:prstGeom>
-        </p:spPr>
-      </p:pic>
-      <p:pic>
-        <p:nvPicPr>
-          <p:cNvPr id="5" name="Picture 4"/>
-          <p:cNvPicPr>
-            <a:picLocks noChangeAspect="1"/>
-          </p:cNvPicPr>
-          <p:nvPr/>
-        </p:nvPicPr>
-        <p:blipFill rotWithShape="1">
-          <a:blip r:embed="rId4">
-            <a:extLst>
-              <a:ext uri="{28A0092B-C50C-407E-A947-70E740481C1C}">
-                <a14:useLocalDpi xmlns:a14="http://schemas.microsoft.com/office/drawing/2010/main" val="0"/>
-              </a:ext>
-            </a:extLst>
-          </a:blip>
-          <a:srcRect t="8786" r="259" b="15145"/>
-          <a:stretch/>
-        </p:blipFill>
-        <p:spPr>
-          <a:xfrm>
-            <a:off x="1632450" y="2482624"/>
-            <a:ext cx="4821663" cy="2002077"/>
-          </a:xfrm>
-          <a:prstGeom prst="rect">
-            <a:avLst/>
-          </a:prstGeom>
-        </p:spPr>
-      </p:pic>
-      <p:pic>
-        <p:nvPicPr>
-          <p:cNvPr id="6" name="Picture 5"/>
-          <p:cNvPicPr>
-            <a:picLocks noChangeAspect="1"/>
-          </p:cNvPicPr>
-          <p:nvPr/>
-        </p:nvPicPr>
-        <p:blipFill>
-          <a:blip r:embed="rId5">
             <a:extLst>
               <a:ext uri="{28A0092B-C50C-407E-A947-70E740481C1C}">
                 <a14:useLocalDpi xmlns:a14="http://schemas.microsoft.com/office/drawing/2010/main" val="0"/>
@@ -12043,18 +12751,15 @@
         </p:blipFill>
         <p:spPr>
           <a:xfrm>
-            <a:off x="572139" y="4977113"/>
-            <a:ext cx="6405623" cy="1174291"/>
+            <a:off x="3161489" y="925192"/>
+            <a:ext cx="6680819" cy="5207827"/>
           </a:xfrm>
-          <a:prstGeom prst="rect">
-            <a:avLst/>
-          </a:prstGeom>
         </p:spPr>
       </p:pic>
     </p:spTree>
     <p:extLst>
       <p:ext uri="{BB962C8B-B14F-4D97-AF65-F5344CB8AC3E}">
-        <p14:creationId xmlns:p14="http://schemas.microsoft.com/office/powerpoint/2010/main" val="4236305089"/>
+        <p14:creationId xmlns:p14="http://schemas.microsoft.com/office/powerpoint/2010/main" val="1836592583"/>
       </p:ext>
     </p:extLst>
   </p:cSld>
@@ -12076,632 +12781,9 @@
   <p:timing>
     <p:tnLst>
       <p:par>
-        <p:cTn id="1" dur="indefinite" restart="never" nodeType="tmRoot">
-          <p:childTnLst>
-            <p:seq concurrent="1" nextAc="seek">
-              <p:cTn id="2" dur="indefinite" nodeType="mainSeq">
-                <p:childTnLst>
-                  <p:par>
-                    <p:cTn id="3" fill="hold">
-                      <p:stCondLst>
-                        <p:cond delay="indefinite"/>
-                      </p:stCondLst>
-                      <p:childTnLst>
-                        <p:par>
-                          <p:cTn id="4" fill="hold">
-                            <p:stCondLst>
-                              <p:cond delay="0"/>
-                            </p:stCondLst>
-                            <p:childTnLst>
-                              <p:par>
-                                <p:cTn id="5" presetID="42" presetClass="entr" presetSubtype="0" fill="hold" nodeType="clickEffect">
-                                  <p:stCondLst>
-                                    <p:cond delay="0"/>
-                                  </p:stCondLst>
-                                  <p:childTnLst>
-                                    <p:set>
-                                      <p:cBhvr>
-                                        <p:cTn id="6" dur="1" fill="hold">
-                                          <p:stCondLst>
-                                            <p:cond delay="0"/>
-                                          </p:stCondLst>
-                                        </p:cTn>
-                                        <p:tgtEl>
-                                          <p:spTgt spid="9"/>
-                                        </p:tgtEl>
-                                        <p:attrNameLst>
-                                          <p:attrName>style.visibility</p:attrName>
-                                        </p:attrNameLst>
-                                      </p:cBhvr>
-                                      <p:to>
-                                        <p:strVal val="visible"/>
-                                      </p:to>
-                                    </p:set>
-                                    <p:animEffect transition="in" filter="fade">
-                                      <p:cBhvr>
-                                        <p:cTn id="7" dur="1000"/>
-                                        <p:tgtEl>
-                                          <p:spTgt spid="9"/>
-                                        </p:tgtEl>
-                                      </p:cBhvr>
-                                    </p:animEffect>
-                                    <p:anim calcmode="lin" valueType="num">
-                                      <p:cBhvr>
-                                        <p:cTn id="8" dur="1000" fill="hold"/>
-                                        <p:tgtEl>
-                                          <p:spTgt spid="9"/>
-                                        </p:tgtEl>
-                                        <p:attrNameLst>
-                                          <p:attrName>ppt_x</p:attrName>
-                                        </p:attrNameLst>
-                                      </p:cBhvr>
-                                      <p:tavLst>
-                                        <p:tav tm="0">
-                                          <p:val>
-                                            <p:strVal val="#ppt_x"/>
-                                          </p:val>
-                                        </p:tav>
-                                        <p:tav tm="100000">
-                                          <p:val>
-                                            <p:strVal val="#ppt_x"/>
-                                          </p:val>
-                                        </p:tav>
-                                      </p:tavLst>
-                                    </p:anim>
-                                    <p:anim calcmode="lin" valueType="num">
-                                      <p:cBhvr>
-                                        <p:cTn id="9" dur="1000" fill="hold"/>
-                                        <p:tgtEl>
-                                          <p:spTgt spid="9"/>
-                                        </p:tgtEl>
-                                        <p:attrNameLst>
-                                          <p:attrName>ppt_y</p:attrName>
-                                        </p:attrNameLst>
-                                      </p:cBhvr>
-                                      <p:tavLst>
-                                        <p:tav tm="0">
-                                          <p:val>
-                                            <p:strVal val="#ppt_y+.1"/>
-                                          </p:val>
-                                        </p:tav>
-                                        <p:tav tm="100000">
-                                          <p:val>
-                                            <p:strVal val="#ppt_y"/>
-                                          </p:val>
-                                        </p:tav>
-                                      </p:tavLst>
-                                    </p:anim>
-                                  </p:childTnLst>
-                                </p:cTn>
-                              </p:par>
-                            </p:childTnLst>
-                          </p:cTn>
-                        </p:par>
-                      </p:childTnLst>
-                    </p:cTn>
-                  </p:par>
-                  <p:par>
-                    <p:cTn id="10" fill="hold">
-                      <p:stCondLst>
-                        <p:cond delay="indefinite"/>
-                      </p:stCondLst>
-                      <p:childTnLst>
-                        <p:par>
-                          <p:cTn id="11" fill="hold">
-                            <p:stCondLst>
-                              <p:cond delay="0"/>
-                            </p:stCondLst>
-                            <p:childTnLst>
-                              <p:par>
-                                <p:cTn id="12" presetID="10" presetClass="entr" presetSubtype="0" fill="hold" grpId="0" nodeType="clickEffect">
-                                  <p:stCondLst>
-                                    <p:cond delay="0"/>
-                                  </p:stCondLst>
-                                  <p:childTnLst>
-                                    <p:set>
-                                      <p:cBhvr>
-                                        <p:cTn id="13" dur="1" fill="hold">
-                                          <p:stCondLst>
-                                            <p:cond delay="0"/>
-                                          </p:stCondLst>
-                                        </p:cTn>
-                                        <p:tgtEl>
-                                          <p:spTgt spid="4">
-                                            <p:txEl>
-                                              <p:pRg st="0" end="0"/>
-                                            </p:txEl>
-                                          </p:spTgt>
-                                        </p:tgtEl>
-                                        <p:attrNameLst>
-                                          <p:attrName>style.visibility</p:attrName>
-                                        </p:attrNameLst>
-                                      </p:cBhvr>
-                                      <p:to>
-                                        <p:strVal val="visible"/>
-                                      </p:to>
-                                    </p:set>
-                                    <p:animEffect transition="in" filter="fade">
-                                      <p:cBhvr>
-                                        <p:cTn id="14" dur="500"/>
-                                        <p:tgtEl>
-                                          <p:spTgt spid="4">
-                                            <p:txEl>
-                                              <p:pRg st="0" end="0"/>
-                                            </p:txEl>
-                                          </p:spTgt>
-                                        </p:tgtEl>
-                                      </p:cBhvr>
-                                    </p:animEffect>
-                                  </p:childTnLst>
-                                </p:cTn>
-                              </p:par>
-                            </p:childTnLst>
-                          </p:cTn>
-                        </p:par>
-                      </p:childTnLst>
-                    </p:cTn>
-                  </p:par>
-                  <p:par>
-                    <p:cTn id="15" fill="hold">
-                      <p:stCondLst>
-                        <p:cond delay="indefinite"/>
-                      </p:stCondLst>
-                      <p:childTnLst>
-                        <p:par>
-                          <p:cTn id="16" fill="hold">
-                            <p:stCondLst>
-                              <p:cond delay="0"/>
-                            </p:stCondLst>
-                            <p:childTnLst>
-                              <p:par>
-                                <p:cTn id="17" presetID="10" presetClass="entr" presetSubtype="0" fill="hold" grpId="0" nodeType="clickEffect">
-                                  <p:stCondLst>
-                                    <p:cond delay="0"/>
-                                  </p:stCondLst>
-                                  <p:childTnLst>
-                                    <p:set>
-                                      <p:cBhvr>
-                                        <p:cTn id="18" dur="1" fill="hold">
-                                          <p:stCondLst>
-                                            <p:cond delay="0"/>
-                                          </p:stCondLst>
-                                        </p:cTn>
-                                        <p:tgtEl>
-                                          <p:spTgt spid="4">
-                                            <p:txEl>
-                                              <p:pRg st="1" end="1"/>
-                                            </p:txEl>
-                                          </p:spTgt>
-                                        </p:tgtEl>
-                                        <p:attrNameLst>
-                                          <p:attrName>style.visibility</p:attrName>
-                                        </p:attrNameLst>
-                                      </p:cBhvr>
-                                      <p:to>
-                                        <p:strVal val="visible"/>
-                                      </p:to>
-                                    </p:set>
-                                    <p:animEffect transition="in" filter="fade">
-                                      <p:cBhvr>
-                                        <p:cTn id="19" dur="500"/>
-                                        <p:tgtEl>
-                                          <p:spTgt spid="4">
-                                            <p:txEl>
-                                              <p:pRg st="1" end="1"/>
-                                            </p:txEl>
-                                          </p:spTgt>
-                                        </p:tgtEl>
-                                      </p:cBhvr>
-                                    </p:animEffect>
-                                  </p:childTnLst>
-                                </p:cTn>
-                              </p:par>
-                            </p:childTnLst>
-                          </p:cTn>
-                        </p:par>
-                        <p:par>
-                          <p:cTn id="20" fill="hold">
-                            <p:stCondLst>
-                              <p:cond delay="500"/>
-                            </p:stCondLst>
-                            <p:childTnLst>
-                              <p:par>
-                                <p:cTn id="21" presetID="10" presetClass="entr" presetSubtype="0" fill="hold" nodeType="afterEffect">
-                                  <p:stCondLst>
-                                    <p:cond delay="0"/>
-                                  </p:stCondLst>
-                                  <p:childTnLst>
-                                    <p:set>
-                                      <p:cBhvr>
-                                        <p:cTn id="22" dur="1" fill="hold">
-                                          <p:stCondLst>
-                                            <p:cond delay="0"/>
-                                          </p:stCondLst>
-                                        </p:cTn>
-                                        <p:tgtEl>
-                                          <p:spTgt spid="3"/>
-                                        </p:tgtEl>
-                                        <p:attrNameLst>
-                                          <p:attrName>style.visibility</p:attrName>
-                                        </p:attrNameLst>
-                                      </p:cBhvr>
-                                      <p:to>
-                                        <p:strVal val="visible"/>
-                                      </p:to>
-                                    </p:set>
-                                    <p:animEffect transition="in" filter="fade">
-                                      <p:cBhvr>
-                                        <p:cTn id="23" dur="500"/>
-                                        <p:tgtEl>
-                                          <p:spTgt spid="3"/>
-                                        </p:tgtEl>
-                                      </p:cBhvr>
-                                    </p:animEffect>
-                                  </p:childTnLst>
-                                </p:cTn>
-                              </p:par>
-                            </p:childTnLst>
-                          </p:cTn>
-                        </p:par>
-                      </p:childTnLst>
-                    </p:cTn>
-                  </p:par>
-                  <p:par>
-                    <p:cTn id="24" fill="hold">
-                      <p:stCondLst>
-                        <p:cond delay="indefinite"/>
-                      </p:stCondLst>
-                      <p:childTnLst>
-                        <p:par>
-                          <p:cTn id="25" fill="hold">
-                            <p:stCondLst>
-                              <p:cond delay="0"/>
-                            </p:stCondLst>
-                            <p:childTnLst>
-                              <p:par>
-                                <p:cTn id="26" presetID="10" presetClass="entr" presetSubtype="0" fill="hold" grpId="0" nodeType="clickEffect">
-                                  <p:stCondLst>
-                                    <p:cond delay="0"/>
-                                  </p:stCondLst>
-                                  <p:childTnLst>
-                                    <p:set>
-                                      <p:cBhvr>
-                                        <p:cTn id="27" dur="1" fill="hold">
-                                          <p:stCondLst>
-                                            <p:cond delay="0"/>
-                                          </p:stCondLst>
-                                        </p:cTn>
-                                        <p:tgtEl>
-                                          <p:spTgt spid="4">
-                                            <p:txEl>
-                                              <p:pRg st="2" end="2"/>
-                                            </p:txEl>
-                                          </p:spTgt>
-                                        </p:tgtEl>
-                                        <p:attrNameLst>
-                                          <p:attrName>style.visibility</p:attrName>
-                                        </p:attrNameLst>
-                                      </p:cBhvr>
-                                      <p:to>
-                                        <p:strVal val="visible"/>
-                                      </p:to>
-                                    </p:set>
-                                    <p:animEffect transition="in" filter="fade">
-                                      <p:cBhvr>
-                                        <p:cTn id="28" dur="500"/>
-                                        <p:tgtEl>
-                                          <p:spTgt spid="4">
-                                            <p:txEl>
-                                              <p:pRg st="2" end="2"/>
-                                            </p:txEl>
-                                          </p:spTgt>
-                                        </p:tgtEl>
-                                      </p:cBhvr>
-                                    </p:animEffect>
-                                  </p:childTnLst>
-                                </p:cTn>
-                              </p:par>
-                            </p:childTnLst>
-                          </p:cTn>
-                        </p:par>
-                        <p:par>
-                          <p:cTn id="29" fill="hold">
-                            <p:stCondLst>
-                              <p:cond delay="500"/>
-                            </p:stCondLst>
-                            <p:childTnLst>
-                              <p:par>
-                                <p:cTn id="30" presetID="10" presetClass="entr" presetSubtype="0" fill="hold" nodeType="afterEffect">
-                                  <p:stCondLst>
-                                    <p:cond delay="0"/>
-                                  </p:stCondLst>
-                                  <p:childTnLst>
-                                    <p:set>
-                                      <p:cBhvr>
-                                        <p:cTn id="31" dur="1" fill="hold">
-                                          <p:stCondLst>
-                                            <p:cond delay="0"/>
-                                          </p:stCondLst>
-                                        </p:cTn>
-                                        <p:tgtEl>
-                                          <p:spTgt spid="5"/>
-                                        </p:tgtEl>
-                                        <p:attrNameLst>
-                                          <p:attrName>style.visibility</p:attrName>
-                                        </p:attrNameLst>
-                                      </p:cBhvr>
-                                      <p:to>
-                                        <p:strVal val="visible"/>
-                                      </p:to>
-                                    </p:set>
-                                    <p:animEffect transition="in" filter="fade">
-                                      <p:cBhvr>
-                                        <p:cTn id="32" dur="500"/>
-                                        <p:tgtEl>
-                                          <p:spTgt spid="5"/>
-                                        </p:tgtEl>
-                                      </p:cBhvr>
-                                    </p:animEffect>
-                                  </p:childTnLst>
-                                </p:cTn>
-                              </p:par>
-                            </p:childTnLst>
-                          </p:cTn>
-                        </p:par>
-                      </p:childTnLst>
-                    </p:cTn>
-                  </p:par>
-                  <p:par>
-                    <p:cTn id="33" fill="hold">
-                      <p:stCondLst>
-                        <p:cond delay="indefinite"/>
-                      </p:stCondLst>
-                      <p:childTnLst>
-                        <p:par>
-                          <p:cTn id="34" fill="hold">
-                            <p:stCondLst>
-                              <p:cond delay="0"/>
-                            </p:stCondLst>
-                            <p:childTnLst>
-                              <p:par>
-                                <p:cTn id="35" presetID="10" presetClass="entr" presetSubtype="0" fill="hold" grpId="0" nodeType="clickEffect">
-                                  <p:stCondLst>
-                                    <p:cond delay="0"/>
-                                  </p:stCondLst>
-                                  <p:childTnLst>
-                                    <p:set>
-                                      <p:cBhvr>
-                                        <p:cTn id="36" dur="1" fill="hold">
-                                          <p:stCondLst>
-                                            <p:cond delay="0"/>
-                                          </p:stCondLst>
-                                        </p:cTn>
-                                        <p:tgtEl>
-                                          <p:spTgt spid="4">
-                                            <p:txEl>
-                                              <p:pRg st="3" end="3"/>
-                                            </p:txEl>
-                                          </p:spTgt>
-                                        </p:tgtEl>
-                                        <p:attrNameLst>
-                                          <p:attrName>style.visibility</p:attrName>
-                                        </p:attrNameLst>
-                                      </p:cBhvr>
-                                      <p:to>
-                                        <p:strVal val="visible"/>
-                                      </p:to>
-                                    </p:set>
-                                    <p:animEffect transition="in" filter="fade">
-                                      <p:cBhvr>
-                                        <p:cTn id="37" dur="500"/>
-                                        <p:tgtEl>
-                                          <p:spTgt spid="4">
-                                            <p:txEl>
-                                              <p:pRg st="3" end="3"/>
-                                            </p:txEl>
-                                          </p:spTgt>
-                                        </p:tgtEl>
-                                      </p:cBhvr>
-                                    </p:animEffect>
-                                  </p:childTnLst>
-                                </p:cTn>
-                              </p:par>
-                            </p:childTnLst>
-                          </p:cTn>
-                        </p:par>
-                        <p:par>
-                          <p:cTn id="38" fill="hold">
-                            <p:stCondLst>
-                              <p:cond delay="500"/>
-                            </p:stCondLst>
-                            <p:childTnLst>
-                              <p:par>
-                                <p:cTn id="39" presetID="10" presetClass="entr" presetSubtype="0" fill="hold" nodeType="afterEffect">
-                                  <p:stCondLst>
-                                    <p:cond delay="0"/>
-                                  </p:stCondLst>
-                                  <p:childTnLst>
-                                    <p:set>
-                                      <p:cBhvr>
-                                        <p:cTn id="40" dur="1" fill="hold">
-                                          <p:stCondLst>
-                                            <p:cond delay="0"/>
-                                          </p:stCondLst>
-                                        </p:cTn>
-                                        <p:tgtEl>
-                                          <p:spTgt spid="6"/>
-                                        </p:tgtEl>
-                                        <p:attrNameLst>
-                                          <p:attrName>style.visibility</p:attrName>
-                                        </p:attrNameLst>
-                                      </p:cBhvr>
-                                      <p:to>
-                                        <p:strVal val="visible"/>
-                                      </p:to>
-                                    </p:set>
-                                    <p:animEffect transition="in" filter="fade">
-                                      <p:cBhvr>
-                                        <p:cTn id="41" dur="500"/>
-                                        <p:tgtEl>
-                                          <p:spTgt spid="6"/>
-                                        </p:tgtEl>
-                                      </p:cBhvr>
-                                    </p:animEffect>
-                                  </p:childTnLst>
-                                </p:cTn>
-                              </p:par>
-                            </p:childTnLst>
-                          </p:cTn>
-                        </p:par>
-                      </p:childTnLst>
-                    </p:cTn>
-                  </p:par>
-                  <p:par>
-                    <p:cTn id="42" fill="hold">
-                      <p:stCondLst>
-                        <p:cond delay="indefinite"/>
-                      </p:stCondLst>
-                      <p:childTnLst>
-                        <p:par>
-                          <p:cTn id="43" fill="hold">
-                            <p:stCondLst>
-                              <p:cond delay="0"/>
-                            </p:stCondLst>
-                            <p:childTnLst>
-                              <p:par>
-                                <p:cTn id="44" presetID="10" presetClass="entr" presetSubtype="0" fill="hold" grpId="0" nodeType="clickEffect">
-                                  <p:stCondLst>
-                                    <p:cond delay="0"/>
-                                  </p:stCondLst>
-                                  <p:childTnLst>
-                                    <p:set>
-                                      <p:cBhvr>
-                                        <p:cTn id="45" dur="1" fill="hold">
-                                          <p:stCondLst>
-                                            <p:cond delay="0"/>
-                                          </p:stCondLst>
-                                        </p:cTn>
-                                        <p:tgtEl>
-                                          <p:spTgt spid="4">
-                                            <p:txEl>
-                                              <p:pRg st="4" end="4"/>
-                                            </p:txEl>
-                                          </p:spTgt>
-                                        </p:tgtEl>
-                                        <p:attrNameLst>
-                                          <p:attrName>style.visibility</p:attrName>
-                                        </p:attrNameLst>
-                                      </p:cBhvr>
-                                      <p:to>
-                                        <p:strVal val="visible"/>
-                                      </p:to>
-                                    </p:set>
-                                    <p:animEffect transition="in" filter="fade">
-                                      <p:cBhvr>
-                                        <p:cTn id="46" dur="500"/>
-                                        <p:tgtEl>
-                                          <p:spTgt spid="4">
-                                            <p:txEl>
-                                              <p:pRg st="4" end="4"/>
-                                            </p:txEl>
-                                          </p:spTgt>
-                                        </p:tgtEl>
-                                      </p:cBhvr>
-                                    </p:animEffect>
-                                  </p:childTnLst>
-                                </p:cTn>
-                              </p:par>
-                            </p:childTnLst>
-                          </p:cTn>
-                        </p:par>
-                      </p:childTnLst>
-                    </p:cTn>
-                  </p:par>
-                  <p:par>
-                    <p:cTn id="47" fill="hold">
-                      <p:stCondLst>
-                        <p:cond delay="indefinite"/>
-                      </p:stCondLst>
-                      <p:childTnLst>
-                        <p:par>
-                          <p:cTn id="48" fill="hold">
-                            <p:stCondLst>
-                              <p:cond delay="0"/>
-                            </p:stCondLst>
-                            <p:childTnLst>
-                              <p:par>
-                                <p:cTn id="49" presetID="10" presetClass="entr" presetSubtype="0" fill="hold" grpId="0" nodeType="clickEffect">
-                                  <p:stCondLst>
-                                    <p:cond delay="0"/>
-                                  </p:stCondLst>
-                                  <p:childTnLst>
-                                    <p:set>
-                                      <p:cBhvr>
-                                        <p:cTn id="50" dur="1" fill="hold">
-                                          <p:stCondLst>
-                                            <p:cond delay="0"/>
-                                          </p:stCondLst>
-                                        </p:cTn>
-                                        <p:tgtEl>
-                                          <p:spTgt spid="4">
-                                            <p:txEl>
-                                              <p:pRg st="5" end="5"/>
-                                            </p:txEl>
-                                          </p:spTgt>
-                                        </p:tgtEl>
-                                        <p:attrNameLst>
-                                          <p:attrName>style.visibility</p:attrName>
-                                        </p:attrNameLst>
-                                      </p:cBhvr>
-                                      <p:to>
-                                        <p:strVal val="visible"/>
-                                      </p:to>
-                                    </p:set>
-                                    <p:animEffect transition="in" filter="fade">
-                                      <p:cBhvr>
-                                        <p:cTn id="51" dur="500"/>
-                                        <p:tgtEl>
-                                          <p:spTgt spid="4">
-                                            <p:txEl>
-                                              <p:pRg st="5" end="5"/>
-                                            </p:txEl>
-                                          </p:spTgt>
-                                        </p:tgtEl>
-                                      </p:cBhvr>
-                                    </p:animEffect>
-                                  </p:childTnLst>
-                                </p:cTn>
-                              </p:par>
-                            </p:childTnLst>
-                          </p:cTn>
-                        </p:par>
-                      </p:childTnLst>
-                    </p:cTn>
-                  </p:par>
-                </p:childTnLst>
-              </p:cTn>
-              <p:prevCondLst>
-                <p:cond evt="onPrev" delay="0">
-                  <p:tgtEl>
-                    <p:sldTgt/>
-                  </p:tgtEl>
-                </p:cond>
-              </p:prevCondLst>
-              <p:nextCondLst>
-                <p:cond evt="onNext" delay="0">
-                  <p:tgtEl>
-                    <p:sldTgt/>
-                  </p:tgtEl>
-                </p:cond>
-              </p:nextCondLst>
-            </p:seq>
-          </p:childTnLst>
-        </p:cTn>
+        <p:cTn id="1" dur="indefinite" restart="never" nodeType="tmRoot"/>
       </p:par>
     </p:tnLst>
-    <p:bldLst>
-      <p:bldP spid="4" grpId="0" uiExpand="1" build="p"/>
-    </p:bldLst>
   </p:timing>
 </p:sld>
 </file>

</xml_diff>

<commit_message>
Working version after the school presenation
</commit_message>
<xml_diff>
--- a/Presentation.pptx
+++ b/Presentation.pptx
@@ -1334,7 +1334,7 @@
             <a:fld id="{9334D819-9F07-4261-B09B-9E467E5D9002}" type="datetimeFigureOut">
               <a:rPr lang="en-US" dirty="0"/>
               <a:pPr/>
-              <a:t>5/12/2017</a:t>
+              <a:t>11/6/2017</a:t>
             </a:fld>
             <a:endParaRPr lang="en-US" dirty="0"/>
           </a:p>
@@ -1580,7 +1580,7 @@
           <a:p>
             <a:fld id="{9334D819-9F07-4261-B09B-9E467E5D9002}" type="datetimeFigureOut">
               <a:rPr lang="en-US" dirty="0"/>
-              <a:t>5/12/2017</a:t>
+              <a:t>11/6/2017</a:t>
             </a:fld>
             <a:endParaRPr lang="en-US" dirty="0"/>
           </a:p>
@@ -1767,7 +1767,7 @@
           <a:p>
             <a:fld id="{9334D819-9F07-4261-B09B-9E467E5D9002}" type="datetimeFigureOut">
               <a:rPr lang="en-US" dirty="0"/>
-              <a:t>5/12/2017</a:t>
+              <a:t>11/6/2017</a:t>
             </a:fld>
             <a:endParaRPr lang="en-US" dirty="0"/>
           </a:p>
@@ -1944,7 +1944,7 @@
           <a:p>
             <a:fld id="{9334D819-9F07-4261-B09B-9E467E5D9002}" type="datetimeFigureOut">
               <a:rPr lang="en-US" dirty="0"/>
-              <a:t>5/12/2017</a:t>
+              <a:t>11/6/2017</a:t>
             </a:fld>
             <a:endParaRPr lang="en-US" dirty="0"/>
           </a:p>
@@ -2228,7 +2228,7 @@
             <a:fld id="{9334D819-9F07-4261-B09B-9E467E5D9002}" type="datetimeFigureOut">
               <a:rPr lang="en-US" dirty="0"/>
               <a:pPr/>
-              <a:t>5/12/2017</a:t>
+              <a:t>11/6/2017</a:t>
             </a:fld>
             <a:endParaRPr lang="en-US" dirty="0"/>
           </a:p>
@@ -3437,7 +3437,7 @@
           <a:p>
             <a:fld id="{9334D819-9F07-4261-B09B-9E467E5D9002}" type="datetimeFigureOut">
               <a:rPr lang="en-US" dirty="0"/>
-              <a:t>5/12/2017</a:t>
+              <a:t>11/6/2017</a:t>
             </a:fld>
             <a:endParaRPr lang="en-US" dirty="0"/>
           </a:p>
@@ -3834,7 +3834,7 @@
           <a:p>
             <a:fld id="{9334D819-9F07-4261-B09B-9E467E5D9002}" type="datetimeFigureOut">
               <a:rPr lang="en-US" dirty="0"/>
-              <a:t>5/12/2017</a:t>
+              <a:t>11/6/2017</a:t>
             </a:fld>
             <a:endParaRPr lang="en-US" dirty="0"/>
           </a:p>
@@ -3964,7 +3964,7 @@
           <a:p>
             <a:fld id="{9334D819-9F07-4261-B09B-9E467E5D9002}" type="datetimeFigureOut">
               <a:rPr lang="en-US" dirty="0"/>
-              <a:t>5/12/2017</a:t>
+              <a:t>11/6/2017</a:t>
             </a:fld>
             <a:endParaRPr lang="en-US" dirty="0"/>
           </a:p>
@@ -4066,7 +4066,7 @@
           <a:p>
             <a:fld id="{9334D819-9F07-4261-B09B-9E467E5D9002}" type="datetimeFigureOut">
               <a:rPr lang="en-US" dirty="0"/>
-              <a:t>5/12/2017</a:t>
+              <a:t>11/6/2017</a:t>
             </a:fld>
             <a:endParaRPr lang="en-US" dirty="0"/>
           </a:p>
@@ -4836,7 +4836,7 @@
           <a:p>
             <a:fld id="{9334D819-9F07-4261-B09B-9E467E5D9002}" type="datetimeFigureOut">
               <a:rPr lang="en-US" dirty="0"/>
-              <a:t>5/12/2017</a:t>
+              <a:t>11/6/2017</a:t>
             </a:fld>
             <a:endParaRPr lang="en-US" dirty="0"/>
           </a:p>
@@ -5683,7 +5683,7 @@
           <a:p>
             <a:fld id="{9334D819-9F07-4261-B09B-9E467E5D9002}" type="datetimeFigureOut">
               <a:rPr lang="en-US" dirty="0"/>
-              <a:t>5/12/2017</a:t>
+              <a:t>11/6/2017</a:t>
             </a:fld>
             <a:endParaRPr lang="en-US" dirty="0"/>
           </a:p>
@@ -5918,7 +5918,7 @@
             <a:fld id="{9334D819-9F07-4261-B09B-9E467E5D9002}" type="datetimeFigureOut">
               <a:rPr lang="en-US" dirty="0"/>
               <a:pPr/>
-              <a:t>5/12/2017</a:t>
+              <a:t>11/6/2017</a:t>
             </a:fld>
             <a:endParaRPr lang="en-US" dirty="0"/>
           </a:p>
@@ -9829,6 +9829,34 @@
               <a:rPr lang="bg-BG" dirty="0"/>
               <a:t>на сървърната част </a:t>
             </a:r>
+            <a:endParaRPr lang="bg-BG" dirty="0" smtClean="0"/>
+          </a:p>
+          <a:p>
+            <a:pPr lvl="0"/>
+            <a:r>
+              <a:rPr lang="bg-BG" dirty="0"/>
+              <a:t>Създаване на трите основни потребителски роли в </a:t>
+            </a:r>
+            <a:r>
+              <a:rPr lang="bg-BG" dirty="0" smtClean="0"/>
+              <a:t>проекта</a:t>
+            </a:r>
+          </a:p>
+          <a:p>
+            <a:pPr lvl="0"/>
+            <a:r>
+              <a:rPr lang="bg-BG" dirty="0" smtClean="0"/>
+              <a:t>Имплементиране </a:t>
+            </a:r>
+            <a:r>
+              <a:rPr lang="bg-BG" dirty="0"/>
+              <a:t>на администраторската част – уеб </a:t>
+            </a:r>
+            <a:r>
+              <a:rPr lang="bg-BG" dirty="0" smtClean="0"/>
+              <a:t>приложението</a:t>
+            </a:r>
+            <a:endParaRPr lang="bg-BG" dirty="0"/>
           </a:p>
           <a:p>
             <a:pPr lvl="0"/>
@@ -9845,42 +9873,12 @@
           <a:p>
             <a:pPr lvl="0"/>
             <a:r>
-              <a:rPr lang="bg-BG" dirty="0"/>
-              <a:t>Имплементиране на администраторската част – уеб </a:t>
+              <a:rPr lang="bg-BG" dirty="0" smtClean="0"/>
+              <a:t>Проверка </a:t>
             </a:r>
             <a:r>
               <a:rPr lang="bg-BG" dirty="0" smtClean="0"/>
-              <a:t>приложението</a:t>
-            </a:r>
-          </a:p>
-          <a:p>
-            <a:pPr lvl="0"/>
-            <a:r>
-              <a:rPr lang="bg-BG" dirty="0" smtClean="0"/>
-              <a:t>Създаване </a:t>
-            </a:r>
-            <a:r>
-              <a:rPr lang="bg-BG" dirty="0"/>
-              <a:t>на трите </a:t>
-            </a:r>
-            <a:r>
-              <a:rPr lang="bg-BG" dirty="0" smtClean="0"/>
-              <a:t>основни потребителски </a:t>
-            </a:r>
-            <a:r>
-              <a:rPr lang="bg-BG" dirty="0"/>
-              <a:t>роли в </a:t>
-            </a:r>
-            <a:r>
-              <a:rPr lang="bg-BG" dirty="0" smtClean="0"/>
-              <a:t>проекта</a:t>
-            </a:r>
-          </a:p>
-          <a:p>
-            <a:pPr lvl="0"/>
-            <a:r>
-              <a:rPr lang="bg-BG" dirty="0" smtClean="0"/>
-              <a:t>Проверка и отстраняване на грешките</a:t>
+              <a:t>и отстраняване на грешките</a:t>
             </a:r>
             <a:endParaRPr lang="bg-BG" dirty="0"/>
           </a:p>

</xml_diff>

<commit_message>
Client Requests added fully working client app
</commit_message>
<xml_diff>
--- a/Presentation.pptx
+++ b/Presentation.pptx
@@ -13,7 +13,7 @@
     <p:sldId id="265" r:id="rId7"/>
     <p:sldId id="270" r:id="rId8"/>
     <p:sldId id="263" r:id="rId9"/>
-    <p:sldId id="272" r:id="rId10"/>
+    <p:sldId id="273" r:id="rId10"/>
     <p:sldId id="267" r:id="rId11"/>
     <p:sldId id="269" r:id="rId12"/>
   </p:sldIdLst>
@@ -1334,7 +1334,7 @@
             <a:fld id="{9334D819-9F07-4261-B09B-9E467E5D9002}" type="datetimeFigureOut">
               <a:rPr lang="en-US" dirty="0"/>
               <a:pPr/>
-              <a:t>11/6/2017</a:t>
+              <a:t>12/1/2017</a:t>
             </a:fld>
             <a:endParaRPr lang="en-US" dirty="0"/>
           </a:p>
@@ -1580,7 +1580,7 @@
           <a:p>
             <a:fld id="{9334D819-9F07-4261-B09B-9E467E5D9002}" type="datetimeFigureOut">
               <a:rPr lang="en-US" dirty="0"/>
-              <a:t>11/6/2017</a:t>
+              <a:t>12/1/2017</a:t>
             </a:fld>
             <a:endParaRPr lang="en-US" dirty="0"/>
           </a:p>
@@ -1767,7 +1767,7 @@
           <a:p>
             <a:fld id="{9334D819-9F07-4261-B09B-9E467E5D9002}" type="datetimeFigureOut">
               <a:rPr lang="en-US" dirty="0"/>
-              <a:t>11/6/2017</a:t>
+              <a:t>12/1/2017</a:t>
             </a:fld>
             <a:endParaRPr lang="en-US" dirty="0"/>
           </a:p>
@@ -1944,7 +1944,7 @@
           <a:p>
             <a:fld id="{9334D819-9F07-4261-B09B-9E467E5D9002}" type="datetimeFigureOut">
               <a:rPr lang="en-US" dirty="0"/>
-              <a:t>11/6/2017</a:t>
+              <a:t>12/1/2017</a:t>
             </a:fld>
             <a:endParaRPr lang="en-US" dirty="0"/>
           </a:p>
@@ -2228,7 +2228,7 @@
             <a:fld id="{9334D819-9F07-4261-B09B-9E467E5D9002}" type="datetimeFigureOut">
               <a:rPr lang="en-US" dirty="0"/>
               <a:pPr/>
-              <a:t>11/6/2017</a:t>
+              <a:t>12/1/2017</a:t>
             </a:fld>
             <a:endParaRPr lang="en-US" dirty="0"/>
           </a:p>
@@ -3437,7 +3437,7 @@
           <a:p>
             <a:fld id="{9334D819-9F07-4261-B09B-9E467E5D9002}" type="datetimeFigureOut">
               <a:rPr lang="en-US" dirty="0"/>
-              <a:t>11/6/2017</a:t>
+              <a:t>12/1/2017</a:t>
             </a:fld>
             <a:endParaRPr lang="en-US" dirty="0"/>
           </a:p>
@@ -3834,7 +3834,7 @@
           <a:p>
             <a:fld id="{9334D819-9F07-4261-B09B-9E467E5D9002}" type="datetimeFigureOut">
               <a:rPr lang="en-US" dirty="0"/>
-              <a:t>11/6/2017</a:t>
+              <a:t>12/1/2017</a:t>
             </a:fld>
             <a:endParaRPr lang="en-US" dirty="0"/>
           </a:p>
@@ -3964,7 +3964,7 @@
           <a:p>
             <a:fld id="{9334D819-9F07-4261-B09B-9E467E5D9002}" type="datetimeFigureOut">
               <a:rPr lang="en-US" dirty="0"/>
-              <a:t>11/6/2017</a:t>
+              <a:t>12/1/2017</a:t>
             </a:fld>
             <a:endParaRPr lang="en-US" dirty="0"/>
           </a:p>
@@ -4066,7 +4066,7 @@
           <a:p>
             <a:fld id="{9334D819-9F07-4261-B09B-9E467E5D9002}" type="datetimeFigureOut">
               <a:rPr lang="en-US" dirty="0"/>
-              <a:t>11/6/2017</a:t>
+              <a:t>12/1/2017</a:t>
             </a:fld>
             <a:endParaRPr lang="en-US" dirty="0"/>
           </a:p>
@@ -4836,7 +4836,7 @@
           <a:p>
             <a:fld id="{9334D819-9F07-4261-B09B-9E467E5D9002}" type="datetimeFigureOut">
               <a:rPr lang="en-US" dirty="0"/>
-              <a:t>11/6/2017</a:t>
+              <a:t>12/1/2017</a:t>
             </a:fld>
             <a:endParaRPr lang="en-US" dirty="0"/>
           </a:p>
@@ -5683,7 +5683,7 @@
           <a:p>
             <a:fld id="{9334D819-9F07-4261-B09B-9E467E5D9002}" type="datetimeFigureOut">
               <a:rPr lang="en-US" dirty="0"/>
-              <a:t>11/6/2017</a:t>
+              <a:t>12/1/2017</a:t>
             </a:fld>
             <a:endParaRPr lang="en-US" dirty="0"/>
           </a:p>
@@ -5918,7 +5918,7 @@
             <a:fld id="{9334D819-9F07-4261-B09B-9E467E5D9002}" type="datetimeFigureOut">
               <a:rPr lang="en-US" dirty="0"/>
               <a:pPr/>
-              <a:t>11/6/2017</a:t>
+              <a:t>12/1/2017</a:t>
             </a:fld>
             <a:endParaRPr lang="en-US" dirty="0"/>
           </a:p>
@@ -8970,8 +8970,19 @@
           <a:p>
             <a:r>
               <a:rPr lang="bg-BG" dirty="0" smtClean="0"/>
-              <a:t>Заявките се пращат автоматично винаги на най-близките шофьори.</a:t>
+              <a:t>Заявките се пращат автоматично винаги на най-близките шофьори</a:t>
             </a:r>
+            <a:r>
+              <a:rPr lang="bg-BG" dirty="0" smtClean="0"/>
+              <a:t>.</a:t>
+            </a:r>
+          </a:p>
+          <a:p>
+            <a:r>
+              <a:rPr lang="bg-BG" dirty="0" smtClean="0"/>
+              <a:t>Клиентите ще могат да си повикат такси директно през апликацията за смартфон или таблет за секунди</a:t>
+            </a:r>
+            <a:endParaRPr lang="bg-BG" dirty="0"/>
           </a:p>
         </p:txBody>
       </p:sp>
@@ -9113,6 +9124,36 @@
           </a:prstGeom>
         </p:spPr>
       </p:pic>
+      <p:pic>
+        <p:nvPicPr>
+          <p:cNvPr id="5" name="Picture 4"/>
+          <p:cNvPicPr>
+            <a:picLocks noChangeAspect="1"/>
+          </p:cNvPicPr>
+          <p:nvPr/>
+        </p:nvPicPr>
+        <p:blipFill>
+          <a:blip r:embed="rId5">
+            <a:extLst>
+              <a:ext uri="{28A0092B-C50C-407E-A947-70E740481C1C}">
+                <a14:useLocalDpi xmlns:a14="http://schemas.microsoft.com/office/drawing/2010/main" val="0"/>
+              </a:ext>
+            </a:extLst>
+          </a:blip>
+          <a:stretch>
+            <a:fillRect/>
+          </a:stretch>
+        </p:blipFill>
+        <p:spPr>
+          <a:xfrm>
+            <a:off x="9073765" y="4874217"/>
+            <a:ext cx="1471019" cy="1471019"/>
+          </a:xfrm>
+          <a:prstGeom prst="rect">
+            <a:avLst/>
+          </a:prstGeom>
+        </p:spPr>
+      </p:pic>
     </p:spTree>
     <p:extLst>
       <p:ext uri="{BB962C8B-B14F-4D97-AF65-F5344CB8AC3E}">
@@ -9722,6 +9763,102 @@
                       </p:childTnLst>
                     </p:cTn>
                   </p:par>
+                  <p:par>
+                    <p:cTn id="49" fill="hold">
+                      <p:stCondLst>
+                        <p:cond delay="indefinite"/>
+                      </p:stCondLst>
+                      <p:childTnLst>
+                        <p:par>
+                          <p:cTn id="50" fill="hold">
+                            <p:stCondLst>
+                              <p:cond delay="0"/>
+                            </p:stCondLst>
+                            <p:childTnLst>
+                              <p:par>
+                                <p:cTn id="51" presetID="10" presetClass="entr" presetSubtype="0" fill="hold" grpId="0" nodeType="clickEffect">
+                                  <p:stCondLst>
+                                    <p:cond delay="0"/>
+                                  </p:stCondLst>
+                                  <p:childTnLst>
+                                    <p:set>
+                                      <p:cBhvr>
+                                        <p:cTn id="52" dur="1" fill="hold">
+                                          <p:stCondLst>
+                                            <p:cond delay="0"/>
+                                          </p:stCondLst>
+                                        </p:cTn>
+                                        <p:tgtEl>
+                                          <p:spTgt spid="3">
+                                            <p:txEl>
+                                              <p:pRg st="4" end="4"/>
+                                            </p:txEl>
+                                          </p:spTgt>
+                                        </p:tgtEl>
+                                        <p:attrNameLst>
+                                          <p:attrName>style.visibility</p:attrName>
+                                        </p:attrNameLst>
+                                      </p:cBhvr>
+                                      <p:to>
+                                        <p:strVal val="visible"/>
+                                      </p:to>
+                                    </p:set>
+                                    <p:animEffect transition="in" filter="fade">
+                                      <p:cBhvr>
+                                        <p:cTn id="53" dur="500"/>
+                                        <p:tgtEl>
+                                          <p:spTgt spid="3">
+                                            <p:txEl>
+                                              <p:pRg st="4" end="4"/>
+                                            </p:txEl>
+                                          </p:spTgt>
+                                        </p:tgtEl>
+                                      </p:cBhvr>
+                                    </p:animEffect>
+                                  </p:childTnLst>
+                                </p:cTn>
+                              </p:par>
+                              <p:par>
+                                <p:cTn id="54" presetID="10" presetClass="entr" presetSubtype="0" fill="hold" nodeType="withEffect">
+                                  <p:stCondLst>
+                                    <p:cond delay="0"/>
+                                  </p:stCondLst>
+                                  <p:childTnLst>
+                                    <p:set>
+                                      <p:cBhvr>
+                                        <p:cTn id="55" dur="1" fill="hold">
+                                          <p:stCondLst>
+                                            <p:cond delay="0"/>
+                                          </p:stCondLst>
+                                        </p:cTn>
+                                        <p:tgtEl>
+                                          <p:spTgt spid="5"/>
+                                        </p:tgtEl>
+                                        <p:attrNameLst>
+                                          <p:attrName>style.visibility</p:attrName>
+                                        </p:attrNameLst>
+                                      </p:cBhvr>
+                                      <p:to>
+                                        <p:strVal val="visible"/>
+                                      </p:to>
+                                    </p:set>
+                                    <p:animEffect transition="in" filter="fade">
+                                      <p:cBhvr>
+                                        <p:cTn id="56" dur="500"/>
+                                        <p:tgtEl>
+                                          <p:spTgt spid="5"/>
+                                        </p:tgtEl>
+                                      </p:cBhvr>
+                                    </p:animEffect>
+                                  </p:childTnLst>
+                                </p:cTn>
+                              </p:par>
+                            </p:childTnLst>
+                          </p:cTn>
+                        </p:par>
+                      </p:childTnLst>
+                    </p:cTn>
+                  </p:par>
                 </p:childTnLst>
               </p:cTn>
               <p:prevCondLst>
@@ -9746,7 +9883,7 @@
     <p:bldLst>
       <p:bldP spid="2" grpId="0"/>
       <p:bldP spid="3" grpId="0" uiExpand="1" build="p"/>
-      <p:bldP spid="13" grpId="0" animBg="1"/>
+      <p:bldP spid="13" grpId="0" uiExpand="1" animBg="1"/>
     </p:bldLst>
   </p:timing>
 </p:sld>
@@ -9835,7 +9972,15 @@
             <a:pPr lvl="0"/>
             <a:r>
               <a:rPr lang="bg-BG" dirty="0"/>
-              <a:t>Създаване на трите основни потребителски роли в </a:t>
+              <a:t>Създаване на </a:t>
+            </a:r>
+            <a:r>
+              <a:rPr lang="bg-BG" dirty="0" smtClean="0"/>
+              <a:t>четирите основни </a:t>
+            </a:r>
+            <a:r>
+              <a:rPr lang="bg-BG" dirty="0"/>
+              <a:t>потребителски роли в </a:t>
             </a:r>
             <a:r>
               <a:rPr lang="bg-BG" dirty="0" smtClean="0"/>
@@ -9866,19 +10011,26 @@
             </a:r>
             <a:r>
               <a:rPr lang="bg-BG" dirty="0" smtClean="0"/>
-              <a:t>мобилното приложение</a:t>
+              <a:t>мобилното </a:t>
             </a:r>
-            <a:endParaRPr lang="bg-BG" dirty="0"/>
+            <a:r>
+              <a:rPr lang="bg-BG" dirty="0" smtClean="0"/>
+              <a:t>приложение за шофьори</a:t>
+            </a:r>
           </a:p>
           <a:p>
             <a:pPr lvl="0"/>
             <a:r>
               <a:rPr lang="bg-BG" dirty="0" smtClean="0"/>
-              <a:t>Проверка </a:t>
+              <a:t>Създаване на мобилното приложение за клиенти</a:t>
             </a:r>
+            <a:endParaRPr lang="bg-BG" dirty="0"/>
+          </a:p>
+          <a:p>
+            <a:pPr lvl="0"/>
             <a:r>
               <a:rPr lang="bg-BG" dirty="0" smtClean="0"/>
-              <a:t>и отстраняване на грешките</a:t>
+              <a:t>Проверка и отстраняване на грешките</a:t>
             </a:r>
             <a:endParaRPr lang="bg-BG" dirty="0"/>
           </a:p>
@@ -10260,6 +10412,67 @@
                                           <p:spTgt spid="3">
                                             <p:txEl>
                                               <p:pRg st="5" end="5"/>
+                                            </p:txEl>
+                                          </p:spTgt>
+                                        </p:tgtEl>
+                                      </p:cBhvr>
+                                    </p:animEffect>
+                                  </p:childTnLst>
+                                </p:cTn>
+                              </p:par>
+                            </p:childTnLst>
+                          </p:cTn>
+                        </p:par>
+                      </p:childTnLst>
+                    </p:cTn>
+                  </p:par>
+                  <p:par>
+                    <p:cTn id="33" fill="hold">
+                      <p:stCondLst>
+                        <p:cond delay="indefinite"/>
+                      </p:stCondLst>
+                      <p:childTnLst>
+                        <p:par>
+                          <p:cTn id="34" fill="hold">
+                            <p:stCondLst>
+                              <p:cond delay="0"/>
+                            </p:stCondLst>
+                            <p:childTnLst>
+                              <p:par>
+                                <p:cTn id="35" presetID="10" presetClass="entr" presetSubtype="0" fill="hold" grpId="0" nodeType="clickEffect">
+                                  <p:stCondLst>
+                                    <p:cond delay="0"/>
+                                  </p:stCondLst>
+                                  <p:childTnLst>
+                                    <p:set>
+                                      <p:cBhvr>
+                                        <p:cTn id="36" dur="1" fill="hold">
+                                          <p:stCondLst>
+                                            <p:cond delay="0"/>
+                                          </p:stCondLst>
+                                        </p:cTn>
+                                        <p:tgtEl>
+                                          <p:spTgt spid="3">
+                                            <p:txEl>
+                                              <p:pRg st="6" end="6"/>
+                                            </p:txEl>
+                                          </p:spTgt>
+                                        </p:tgtEl>
+                                        <p:attrNameLst>
+                                          <p:attrName>style.visibility</p:attrName>
+                                        </p:attrNameLst>
+                                      </p:cBhvr>
+                                      <p:to>
+                                        <p:strVal val="visible"/>
+                                      </p:to>
+                                    </p:set>
+                                    <p:animEffect transition="in" filter="fade">
+                                      <p:cBhvr>
+                                        <p:cTn id="37" dur="500"/>
+                                        <p:tgtEl>
+                                          <p:spTgt spid="3">
+                                            <p:txEl>
+                                              <p:pRg st="6" end="6"/>
                                             </p:txEl>
                                           </p:spTgt>
                                         </p:tgtEl>
@@ -10439,7 +10652,15 @@
           <a:p>
             <a:r>
               <a:rPr lang="bg-BG" dirty="0" smtClean="0"/>
-              <a:t>При регистрация фирмата получава униклен код.</a:t>
+              <a:t>При регистрация фирмата получава </a:t>
+            </a:r>
+            <a:r>
+              <a:rPr lang="bg-BG" dirty="0" smtClean="0"/>
+              <a:t>уникален </a:t>
+            </a:r>
+            <a:r>
+              <a:rPr lang="bg-BG" dirty="0" smtClean="0"/>
+              <a:t>код.</a:t>
             </a:r>
           </a:p>
           <a:p>
@@ -12716,24 +12937,139 @@
             <p:ph type="title"/>
           </p:nvPr>
         </p:nvSpPr>
-        <p:spPr/>
+        <p:spPr>
+          <a:xfrm>
+            <a:off x="1419497" y="406561"/>
+            <a:ext cx="10178322" cy="1492132"/>
+          </a:xfrm>
+        </p:spPr>
         <p:txBody>
           <a:bodyPr/>
           <a:lstStyle/>
           <a:p>
+            <a:r>
+              <a:rPr lang="bg-BG" dirty="0" smtClean="0"/>
+              <a:t>Описание на решението </a:t>
+            </a:r>
+            <a:r>
+              <a:rPr lang="bg-BG" dirty="0" smtClean="0"/>
+              <a:t>(4)</a:t>
+            </a:r>
+            <a:r>
+              <a:rPr lang="bg-BG" dirty="0" smtClean="0"/>
+              <a:t/>
+            </a:r>
+            <a:br>
+              <a:rPr lang="bg-BG" dirty="0" smtClean="0"/>
+            </a:br>
+            <a:endParaRPr lang="bg-BG" sz="4800" dirty="0"/>
+          </a:p>
+        </p:txBody>
+      </p:sp>
+      <p:sp>
+        <p:nvSpPr>
+          <p:cNvPr id="3" name="Content Placeholder 2"/>
+          <p:cNvSpPr>
+            <a:spLocks noGrp="1"/>
+          </p:cNvSpPr>
+          <p:nvPr>
+            <p:ph idx="1"/>
+          </p:nvPr>
+        </p:nvSpPr>
+        <p:spPr>
+          <a:xfrm>
+            <a:off x="1347601" y="2064212"/>
+            <a:ext cx="5776139" cy="3593591"/>
+          </a:xfrm>
+        </p:spPr>
+        <p:txBody>
+          <a:bodyPr>
+            <a:normAutofit/>
+          </a:bodyPr>
+          <a:lstStyle/>
+          <a:p>
+            <a:r>
+              <a:rPr lang="bg-BG" dirty="0" smtClean="0"/>
+              <a:t>Регистрацията е бърза и лесна и не се изисква потвърждение</a:t>
+            </a:r>
+            <a:endParaRPr lang="bg-BG" dirty="0" smtClean="0"/>
+          </a:p>
+          <a:p>
+            <a:r>
+              <a:rPr lang="bg-BG" dirty="0" smtClean="0"/>
+              <a:t>Автоматично се засича текущото местоположение</a:t>
+            </a:r>
+            <a:endParaRPr lang="bg-BG" dirty="0" smtClean="0"/>
+          </a:p>
+          <a:p>
+            <a:r>
+              <a:rPr lang="bg-BG" dirty="0" smtClean="0"/>
+              <a:t>Дава възможност за задаване на обект </a:t>
+            </a:r>
+            <a:r>
+              <a:rPr lang="en-US" dirty="0" smtClean="0"/>
+              <a:t>(</a:t>
+            </a:r>
+            <a:r>
+              <a:rPr lang="bg-BG" dirty="0" smtClean="0"/>
+              <a:t>заведение, хотел, магазин</a:t>
+            </a:r>
+            <a:r>
+              <a:rPr lang="en-US" dirty="0" smtClean="0"/>
+              <a:t>)</a:t>
+            </a:r>
+            <a:endParaRPr lang="bg-BG" dirty="0" smtClean="0"/>
+          </a:p>
+          <a:p>
+            <a:r>
+              <a:rPr lang="bg-BG" dirty="0" smtClean="0"/>
+              <a:t>Позволява проследяване в реално време на автомобила, приел заявката </a:t>
+            </a:r>
             <a:endParaRPr lang="bg-BG" dirty="0"/>
+          </a:p>
+        </p:txBody>
+      </p:sp>
+      <p:sp>
+        <p:nvSpPr>
+          <p:cNvPr id="4" name="TextBox 3"/>
+          <p:cNvSpPr txBox="1"/>
+          <p:nvPr/>
+        </p:nvSpPr>
+        <p:spPr>
+          <a:xfrm>
+            <a:off x="1419497" y="1062446"/>
+            <a:ext cx="2895793" cy="400110"/>
+          </a:xfrm>
+          <a:prstGeom prst="rect">
+            <a:avLst/>
+          </a:prstGeom>
+          <a:noFill/>
+        </p:spPr>
+        <p:txBody>
+          <a:bodyPr wrap="none" rtlCol="0">
+            <a:spAutoFit/>
+          </a:bodyPr>
+          <a:lstStyle/>
+          <a:p>
+            <a:r>
+              <a:rPr lang="bg-BG" sz="2000" i="1" dirty="0" smtClean="0"/>
+              <a:t>Приложение за </a:t>
+            </a:r>
+            <a:r>
+              <a:rPr lang="bg-BG" sz="2000" i="1" dirty="0" smtClean="0"/>
+              <a:t>клиенти</a:t>
+            </a:r>
+            <a:endParaRPr lang="bg-BG" sz="2000" i="1" dirty="0"/>
           </a:p>
         </p:txBody>
       </p:sp>
       <p:pic>
         <p:nvPicPr>
-          <p:cNvPr id="4" name="Content Placeholder 3"/>
+          <p:cNvPr id="9" name="Picture 8"/>
           <p:cNvPicPr>
-            <a:picLocks noGrp="1" noChangeAspect="1"/>
+            <a:picLocks noChangeAspect="1"/>
           </p:cNvPicPr>
-          <p:nvPr>
-            <p:ph idx="1"/>
-          </p:nvPr>
+          <p:nvPr/>
         </p:nvPicPr>
         <p:blipFill>
           <a:blip r:embed="rId2">
@@ -12749,39 +13085,840 @@
         </p:blipFill>
         <p:spPr>
           <a:xfrm>
-            <a:off x="3161489" y="925192"/>
-            <a:ext cx="6680819" cy="5207827"/>
+            <a:off x="7510756" y="2064212"/>
+            <a:ext cx="2887167" cy="2887167"/>
           </a:xfrm>
+          <a:prstGeom prst="rect">
+            <a:avLst/>
+          </a:prstGeom>
+        </p:spPr>
+      </p:pic>
+      <p:pic>
+        <p:nvPicPr>
+          <p:cNvPr id="10" name="Picture 9"/>
+          <p:cNvPicPr>
+            <a:picLocks noChangeAspect="1"/>
+          </p:cNvPicPr>
+          <p:nvPr/>
+        </p:nvPicPr>
+        <p:blipFill>
+          <a:blip r:embed="rId3">
+            <a:extLst>
+              <a:ext uri="{28A0092B-C50C-407E-A947-70E740481C1C}">
+                <a14:useLocalDpi xmlns:a14="http://schemas.microsoft.com/office/drawing/2010/main" val="0"/>
+              </a:ext>
+            </a:extLst>
+          </a:blip>
+          <a:stretch>
+            <a:fillRect/>
+          </a:stretch>
+        </p:blipFill>
+        <p:spPr>
+          <a:xfrm>
+            <a:off x="7718328" y="1260901"/>
+            <a:ext cx="2472021" cy="4396902"/>
+          </a:xfrm>
+          <a:prstGeom prst="rect">
+            <a:avLst/>
+          </a:prstGeom>
+        </p:spPr>
+      </p:pic>
+      <p:pic>
+        <p:nvPicPr>
+          <p:cNvPr id="11" name="Picture 10"/>
+          <p:cNvPicPr>
+            <a:picLocks noChangeAspect="1"/>
+          </p:cNvPicPr>
+          <p:nvPr/>
+        </p:nvPicPr>
+        <p:blipFill>
+          <a:blip r:embed="rId4">
+            <a:extLst>
+              <a:ext uri="{28A0092B-C50C-407E-A947-70E740481C1C}">
+                <a14:useLocalDpi xmlns:a14="http://schemas.microsoft.com/office/drawing/2010/main" val="0"/>
+              </a:ext>
+            </a:extLst>
+          </a:blip>
+          <a:stretch>
+            <a:fillRect/>
+          </a:stretch>
+        </p:blipFill>
+        <p:spPr>
+          <a:xfrm>
+            <a:off x="7718328" y="1152627"/>
+            <a:ext cx="2461083" cy="4377447"/>
+          </a:xfrm>
+          <a:prstGeom prst="rect">
+            <a:avLst/>
+          </a:prstGeom>
+        </p:spPr>
+      </p:pic>
+      <p:pic>
+        <p:nvPicPr>
+          <p:cNvPr id="13" name="Picture 12"/>
+          <p:cNvPicPr>
+            <a:picLocks noChangeAspect="1"/>
+          </p:cNvPicPr>
+          <p:nvPr/>
+        </p:nvPicPr>
+        <p:blipFill>
+          <a:blip r:embed="rId5">
+            <a:extLst>
+              <a:ext uri="{28A0092B-C50C-407E-A947-70E740481C1C}">
+                <a14:useLocalDpi xmlns:a14="http://schemas.microsoft.com/office/drawing/2010/main" val="0"/>
+              </a:ext>
+            </a:extLst>
+          </a:blip>
+          <a:stretch>
+            <a:fillRect/>
+          </a:stretch>
+        </p:blipFill>
+        <p:spPr>
+          <a:xfrm>
+            <a:off x="7718328" y="1152627"/>
+            <a:ext cx="2532895" cy="4505176"/>
+          </a:xfrm>
+          <a:prstGeom prst="rect">
+            <a:avLst/>
+          </a:prstGeom>
+        </p:spPr>
+      </p:pic>
+      <p:pic>
+        <p:nvPicPr>
+          <p:cNvPr id="15" name="Picture 14"/>
+          <p:cNvPicPr>
+            <a:picLocks noChangeAspect="1"/>
+          </p:cNvPicPr>
+          <p:nvPr/>
+        </p:nvPicPr>
+        <p:blipFill rotWithShape="1">
+          <a:blip r:embed="rId6"/>
+          <a:srcRect l="37348" t="14444" r="41288" b="17071"/>
+          <a:stretch/>
+        </p:blipFill>
+        <p:spPr>
+          <a:xfrm>
+            <a:off x="7718328" y="1152627"/>
+            <a:ext cx="2532895" cy="4567295"/>
+          </a:xfrm>
+          <a:prstGeom prst="rect">
+            <a:avLst/>
+          </a:prstGeom>
         </p:spPr>
       </p:pic>
     </p:spTree>
     <p:extLst>
       <p:ext uri="{BB962C8B-B14F-4D97-AF65-F5344CB8AC3E}">
-        <p14:creationId xmlns:p14="http://schemas.microsoft.com/office/powerpoint/2010/main" val="1836592583"/>
+        <p14:creationId xmlns:p14="http://schemas.microsoft.com/office/powerpoint/2010/main" val="288557522"/>
       </p:ext>
     </p:extLst>
   </p:cSld>
   <p:clrMapOvr>
     <a:masterClrMapping/>
   </p:clrMapOvr>
-  <mc:AlternateContent xmlns:mc="http://schemas.openxmlformats.org/markup-compatibility/2006" xmlns:p14="http://schemas.microsoft.com/office/powerpoint/2010/main">
-    <mc:Choice Requires="p14">
-      <p:transition spd="slow" p14:dur="2750">
-        <p:fade/>
-      </p:transition>
-    </mc:Choice>
-    <mc:Fallback xmlns="">
-      <p:transition spd="slow">
-        <p:fade/>
-      </p:transition>
-    </mc:Fallback>
-  </mc:AlternateContent>
+  <p:transition spd="slow">
+    <p:push dir="u"/>
+  </p:transition>
   <p:timing>
     <p:tnLst>
       <p:par>
-        <p:cTn id="1" dur="indefinite" restart="never" nodeType="tmRoot"/>
+        <p:cTn id="1" dur="indefinite" restart="never" nodeType="tmRoot">
+          <p:childTnLst>
+            <p:seq concurrent="1" nextAc="seek">
+              <p:cTn id="2" dur="indefinite" nodeType="mainSeq">
+                <p:childTnLst>
+                  <p:par>
+                    <p:cTn id="3" fill="hold">
+                      <p:stCondLst>
+                        <p:cond delay="indefinite"/>
+                      </p:stCondLst>
+                      <p:childTnLst>
+                        <p:par>
+                          <p:cTn id="4" fill="hold">
+                            <p:stCondLst>
+                              <p:cond delay="0"/>
+                            </p:stCondLst>
+                            <p:childTnLst>
+                              <p:par>
+                                <p:cTn id="5" presetID="42" presetClass="entr" presetSubtype="0" fill="hold" grpId="0" nodeType="clickEffect">
+                                  <p:stCondLst>
+                                    <p:cond delay="0"/>
+                                  </p:stCondLst>
+                                  <p:childTnLst>
+                                    <p:set>
+                                      <p:cBhvr>
+                                        <p:cTn id="6" dur="1" fill="hold">
+                                          <p:stCondLst>
+                                            <p:cond delay="0"/>
+                                          </p:stCondLst>
+                                        </p:cTn>
+                                        <p:tgtEl>
+                                          <p:spTgt spid="2"/>
+                                        </p:tgtEl>
+                                        <p:attrNameLst>
+                                          <p:attrName>style.visibility</p:attrName>
+                                        </p:attrNameLst>
+                                      </p:cBhvr>
+                                      <p:to>
+                                        <p:strVal val="visible"/>
+                                      </p:to>
+                                    </p:set>
+                                    <p:animEffect transition="in" filter="fade">
+                                      <p:cBhvr>
+                                        <p:cTn id="7" dur="1000"/>
+                                        <p:tgtEl>
+                                          <p:spTgt spid="2"/>
+                                        </p:tgtEl>
+                                      </p:cBhvr>
+                                    </p:animEffect>
+                                    <p:anim calcmode="lin" valueType="num">
+                                      <p:cBhvr>
+                                        <p:cTn id="8" dur="1000" fill="hold"/>
+                                        <p:tgtEl>
+                                          <p:spTgt spid="2"/>
+                                        </p:tgtEl>
+                                        <p:attrNameLst>
+                                          <p:attrName>ppt_x</p:attrName>
+                                        </p:attrNameLst>
+                                      </p:cBhvr>
+                                      <p:tavLst>
+                                        <p:tav tm="0">
+                                          <p:val>
+                                            <p:strVal val="#ppt_x"/>
+                                          </p:val>
+                                        </p:tav>
+                                        <p:tav tm="100000">
+                                          <p:val>
+                                            <p:strVal val="#ppt_x"/>
+                                          </p:val>
+                                        </p:tav>
+                                      </p:tavLst>
+                                    </p:anim>
+                                    <p:anim calcmode="lin" valueType="num">
+                                      <p:cBhvr>
+                                        <p:cTn id="9" dur="1000" fill="hold"/>
+                                        <p:tgtEl>
+                                          <p:spTgt spid="2"/>
+                                        </p:tgtEl>
+                                        <p:attrNameLst>
+                                          <p:attrName>ppt_y</p:attrName>
+                                        </p:attrNameLst>
+                                      </p:cBhvr>
+                                      <p:tavLst>
+                                        <p:tav tm="0">
+                                          <p:val>
+                                            <p:strVal val="#ppt_y+.1"/>
+                                          </p:val>
+                                        </p:tav>
+                                        <p:tav tm="100000">
+                                          <p:val>
+                                            <p:strVal val="#ppt_y"/>
+                                          </p:val>
+                                        </p:tav>
+                                      </p:tavLst>
+                                    </p:anim>
+                                  </p:childTnLst>
+                                </p:cTn>
+                              </p:par>
+                            </p:childTnLst>
+                          </p:cTn>
+                        </p:par>
+                        <p:par>
+                          <p:cTn id="10" fill="hold">
+                            <p:stCondLst>
+                              <p:cond delay="1000"/>
+                            </p:stCondLst>
+                            <p:childTnLst>
+                              <p:par>
+                                <p:cTn id="11" presetID="22" presetClass="entr" presetSubtype="8" fill="hold" grpId="0" nodeType="afterEffect">
+                                  <p:stCondLst>
+                                    <p:cond delay="0"/>
+                                  </p:stCondLst>
+                                  <p:childTnLst>
+                                    <p:set>
+                                      <p:cBhvr>
+                                        <p:cTn id="12" dur="1" fill="hold">
+                                          <p:stCondLst>
+                                            <p:cond delay="0"/>
+                                          </p:stCondLst>
+                                        </p:cTn>
+                                        <p:tgtEl>
+                                          <p:spTgt spid="4"/>
+                                        </p:tgtEl>
+                                        <p:attrNameLst>
+                                          <p:attrName>style.visibility</p:attrName>
+                                        </p:attrNameLst>
+                                      </p:cBhvr>
+                                      <p:to>
+                                        <p:strVal val="visible"/>
+                                      </p:to>
+                                    </p:set>
+                                    <p:animEffect transition="in" filter="wipe(left)">
+                                      <p:cBhvr>
+                                        <p:cTn id="13" dur="500"/>
+                                        <p:tgtEl>
+                                          <p:spTgt spid="4"/>
+                                        </p:tgtEl>
+                                      </p:cBhvr>
+                                    </p:animEffect>
+                                  </p:childTnLst>
+                                </p:cTn>
+                              </p:par>
+                              <p:par>
+                                <p:cTn id="14" presetID="31" presetClass="entr" presetSubtype="0" fill="hold" nodeType="withEffect">
+                                  <p:stCondLst>
+                                    <p:cond delay="0"/>
+                                  </p:stCondLst>
+                                  <p:childTnLst>
+                                    <p:set>
+                                      <p:cBhvr>
+                                        <p:cTn id="15" dur="1" fill="hold">
+                                          <p:stCondLst>
+                                            <p:cond delay="0"/>
+                                          </p:stCondLst>
+                                        </p:cTn>
+                                        <p:tgtEl>
+                                          <p:spTgt spid="9"/>
+                                        </p:tgtEl>
+                                        <p:attrNameLst>
+                                          <p:attrName>style.visibility</p:attrName>
+                                        </p:attrNameLst>
+                                      </p:cBhvr>
+                                      <p:to>
+                                        <p:strVal val="visible"/>
+                                      </p:to>
+                                    </p:set>
+                                    <p:anim calcmode="lin" valueType="num">
+                                      <p:cBhvr>
+                                        <p:cTn id="16" dur="1000" fill="hold"/>
+                                        <p:tgtEl>
+                                          <p:spTgt spid="9"/>
+                                        </p:tgtEl>
+                                        <p:attrNameLst>
+                                          <p:attrName>ppt_w</p:attrName>
+                                        </p:attrNameLst>
+                                      </p:cBhvr>
+                                      <p:tavLst>
+                                        <p:tav tm="0">
+                                          <p:val>
+                                            <p:fltVal val="0"/>
+                                          </p:val>
+                                        </p:tav>
+                                        <p:tav tm="100000">
+                                          <p:val>
+                                            <p:strVal val="#ppt_w"/>
+                                          </p:val>
+                                        </p:tav>
+                                      </p:tavLst>
+                                    </p:anim>
+                                    <p:anim calcmode="lin" valueType="num">
+                                      <p:cBhvr>
+                                        <p:cTn id="17" dur="1000" fill="hold"/>
+                                        <p:tgtEl>
+                                          <p:spTgt spid="9"/>
+                                        </p:tgtEl>
+                                        <p:attrNameLst>
+                                          <p:attrName>ppt_h</p:attrName>
+                                        </p:attrNameLst>
+                                      </p:cBhvr>
+                                      <p:tavLst>
+                                        <p:tav tm="0">
+                                          <p:val>
+                                            <p:fltVal val="0"/>
+                                          </p:val>
+                                        </p:tav>
+                                        <p:tav tm="100000">
+                                          <p:val>
+                                            <p:strVal val="#ppt_h"/>
+                                          </p:val>
+                                        </p:tav>
+                                      </p:tavLst>
+                                    </p:anim>
+                                    <p:anim calcmode="lin" valueType="num">
+                                      <p:cBhvr>
+                                        <p:cTn id="18" dur="1000" fill="hold"/>
+                                        <p:tgtEl>
+                                          <p:spTgt spid="9"/>
+                                        </p:tgtEl>
+                                        <p:attrNameLst>
+                                          <p:attrName>style.rotation</p:attrName>
+                                        </p:attrNameLst>
+                                      </p:cBhvr>
+                                      <p:tavLst>
+                                        <p:tav tm="0">
+                                          <p:val>
+                                            <p:fltVal val="90"/>
+                                          </p:val>
+                                        </p:tav>
+                                        <p:tav tm="100000">
+                                          <p:val>
+                                            <p:fltVal val="0"/>
+                                          </p:val>
+                                        </p:tav>
+                                      </p:tavLst>
+                                    </p:anim>
+                                    <p:animEffect transition="in" filter="fade">
+                                      <p:cBhvr>
+                                        <p:cTn id="19" dur="1000"/>
+                                        <p:tgtEl>
+                                          <p:spTgt spid="9"/>
+                                        </p:tgtEl>
+                                      </p:cBhvr>
+                                    </p:animEffect>
+                                  </p:childTnLst>
+                                </p:cTn>
+                              </p:par>
+                            </p:childTnLst>
+                          </p:cTn>
+                        </p:par>
+                      </p:childTnLst>
+                    </p:cTn>
+                  </p:par>
+                  <p:par>
+                    <p:cTn id="20" fill="hold">
+                      <p:stCondLst>
+                        <p:cond delay="indefinite"/>
+                      </p:stCondLst>
+                      <p:childTnLst>
+                        <p:par>
+                          <p:cTn id="21" fill="hold">
+                            <p:stCondLst>
+                              <p:cond delay="0"/>
+                            </p:stCondLst>
+                            <p:childTnLst>
+                              <p:par>
+                                <p:cTn id="22" presetID="10" presetClass="entr" presetSubtype="0" fill="hold" grpId="0" nodeType="clickEffect">
+                                  <p:stCondLst>
+                                    <p:cond delay="0"/>
+                                  </p:stCondLst>
+                                  <p:childTnLst>
+                                    <p:set>
+                                      <p:cBhvr>
+                                        <p:cTn id="23" dur="1" fill="hold">
+                                          <p:stCondLst>
+                                            <p:cond delay="0"/>
+                                          </p:stCondLst>
+                                        </p:cTn>
+                                        <p:tgtEl>
+                                          <p:spTgt spid="3">
+                                            <p:txEl>
+                                              <p:pRg st="0" end="0"/>
+                                            </p:txEl>
+                                          </p:spTgt>
+                                        </p:tgtEl>
+                                        <p:attrNameLst>
+                                          <p:attrName>style.visibility</p:attrName>
+                                        </p:attrNameLst>
+                                      </p:cBhvr>
+                                      <p:to>
+                                        <p:strVal val="visible"/>
+                                      </p:to>
+                                    </p:set>
+                                    <p:animEffect transition="in" filter="fade">
+                                      <p:cBhvr>
+                                        <p:cTn id="24" dur="500"/>
+                                        <p:tgtEl>
+                                          <p:spTgt spid="3">
+                                            <p:txEl>
+                                              <p:pRg st="0" end="0"/>
+                                            </p:txEl>
+                                          </p:spTgt>
+                                        </p:tgtEl>
+                                      </p:cBhvr>
+                                    </p:animEffect>
+                                  </p:childTnLst>
+                                </p:cTn>
+                              </p:par>
+                              <p:par>
+                                <p:cTn id="25" presetID="10" presetClass="entr" presetSubtype="0" fill="hold" nodeType="withEffect">
+                                  <p:stCondLst>
+                                    <p:cond delay="0"/>
+                                  </p:stCondLst>
+                                  <p:childTnLst>
+                                    <p:set>
+                                      <p:cBhvr>
+                                        <p:cTn id="26" dur="1" fill="hold">
+                                          <p:stCondLst>
+                                            <p:cond delay="0"/>
+                                          </p:stCondLst>
+                                        </p:cTn>
+                                        <p:tgtEl>
+                                          <p:spTgt spid="10"/>
+                                        </p:tgtEl>
+                                        <p:attrNameLst>
+                                          <p:attrName>style.visibility</p:attrName>
+                                        </p:attrNameLst>
+                                      </p:cBhvr>
+                                      <p:to>
+                                        <p:strVal val="visible"/>
+                                      </p:to>
+                                    </p:set>
+                                    <p:animEffect transition="in" filter="fade">
+                                      <p:cBhvr>
+                                        <p:cTn id="27" dur="500"/>
+                                        <p:tgtEl>
+                                          <p:spTgt spid="10"/>
+                                        </p:tgtEl>
+                                      </p:cBhvr>
+                                    </p:animEffect>
+                                  </p:childTnLst>
+                                </p:cTn>
+                              </p:par>
+                              <p:par>
+                                <p:cTn id="28" presetID="16" presetClass="exit" presetSubtype="21" fill="hold" nodeType="withEffect">
+                                  <p:stCondLst>
+                                    <p:cond delay="0"/>
+                                  </p:stCondLst>
+                                  <p:childTnLst>
+                                    <p:animEffect transition="out" filter="barn(inVertical)">
+                                      <p:cBhvr>
+                                        <p:cTn id="29" dur="500"/>
+                                        <p:tgtEl>
+                                          <p:spTgt spid="9"/>
+                                        </p:tgtEl>
+                                      </p:cBhvr>
+                                    </p:animEffect>
+                                    <p:set>
+                                      <p:cBhvr>
+                                        <p:cTn id="30" dur="1" fill="hold">
+                                          <p:stCondLst>
+                                            <p:cond delay="499"/>
+                                          </p:stCondLst>
+                                        </p:cTn>
+                                        <p:tgtEl>
+                                          <p:spTgt spid="9"/>
+                                        </p:tgtEl>
+                                        <p:attrNameLst>
+                                          <p:attrName>style.visibility</p:attrName>
+                                        </p:attrNameLst>
+                                      </p:cBhvr>
+                                      <p:to>
+                                        <p:strVal val="hidden"/>
+                                      </p:to>
+                                    </p:set>
+                                  </p:childTnLst>
+                                </p:cTn>
+                              </p:par>
+                            </p:childTnLst>
+                          </p:cTn>
+                        </p:par>
+                      </p:childTnLst>
+                    </p:cTn>
+                  </p:par>
+                  <p:par>
+                    <p:cTn id="31" fill="hold">
+                      <p:stCondLst>
+                        <p:cond delay="indefinite"/>
+                      </p:stCondLst>
+                      <p:childTnLst>
+                        <p:par>
+                          <p:cTn id="32" fill="hold">
+                            <p:stCondLst>
+                              <p:cond delay="0"/>
+                            </p:stCondLst>
+                            <p:childTnLst>
+                              <p:par>
+                                <p:cTn id="33" presetID="10" presetClass="entr" presetSubtype="0" fill="hold" grpId="0" nodeType="clickEffect">
+                                  <p:stCondLst>
+                                    <p:cond delay="0"/>
+                                  </p:stCondLst>
+                                  <p:childTnLst>
+                                    <p:set>
+                                      <p:cBhvr>
+                                        <p:cTn id="34" dur="1" fill="hold">
+                                          <p:stCondLst>
+                                            <p:cond delay="0"/>
+                                          </p:stCondLst>
+                                        </p:cTn>
+                                        <p:tgtEl>
+                                          <p:spTgt spid="3">
+                                            <p:txEl>
+                                              <p:pRg st="1" end="1"/>
+                                            </p:txEl>
+                                          </p:spTgt>
+                                        </p:tgtEl>
+                                        <p:attrNameLst>
+                                          <p:attrName>style.visibility</p:attrName>
+                                        </p:attrNameLst>
+                                      </p:cBhvr>
+                                      <p:to>
+                                        <p:strVal val="visible"/>
+                                      </p:to>
+                                    </p:set>
+                                    <p:animEffect transition="in" filter="fade">
+                                      <p:cBhvr>
+                                        <p:cTn id="35" dur="500"/>
+                                        <p:tgtEl>
+                                          <p:spTgt spid="3">
+                                            <p:txEl>
+                                              <p:pRg st="1" end="1"/>
+                                            </p:txEl>
+                                          </p:spTgt>
+                                        </p:tgtEl>
+                                      </p:cBhvr>
+                                    </p:animEffect>
+                                  </p:childTnLst>
+                                </p:cTn>
+                              </p:par>
+                              <p:par>
+                                <p:cTn id="36" presetID="10" presetClass="entr" presetSubtype="0" fill="hold" nodeType="withEffect">
+                                  <p:stCondLst>
+                                    <p:cond delay="0"/>
+                                  </p:stCondLst>
+                                  <p:childTnLst>
+                                    <p:set>
+                                      <p:cBhvr>
+                                        <p:cTn id="37" dur="1" fill="hold">
+                                          <p:stCondLst>
+                                            <p:cond delay="0"/>
+                                          </p:stCondLst>
+                                        </p:cTn>
+                                        <p:tgtEl>
+                                          <p:spTgt spid="11"/>
+                                        </p:tgtEl>
+                                        <p:attrNameLst>
+                                          <p:attrName>style.visibility</p:attrName>
+                                        </p:attrNameLst>
+                                      </p:cBhvr>
+                                      <p:to>
+                                        <p:strVal val="visible"/>
+                                      </p:to>
+                                    </p:set>
+                                    <p:animEffect transition="in" filter="fade">
+                                      <p:cBhvr>
+                                        <p:cTn id="38" dur="500"/>
+                                        <p:tgtEl>
+                                          <p:spTgt spid="11"/>
+                                        </p:tgtEl>
+                                      </p:cBhvr>
+                                    </p:animEffect>
+                                  </p:childTnLst>
+                                </p:cTn>
+                              </p:par>
+                            </p:childTnLst>
+                          </p:cTn>
+                        </p:par>
+                      </p:childTnLst>
+                    </p:cTn>
+                  </p:par>
+                  <p:par>
+                    <p:cTn id="39" fill="hold">
+                      <p:stCondLst>
+                        <p:cond delay="indefinite"/>
+                      </p:stCondLst>
+                      <p:childTnLst>
+                        <p:par>
+                          <p:cTn id="40" fill="hold">
+                            <p:stCondLst>
+                              <p:cond delay="0"/>
+                            </p:stCondLst>
+                            <p:childTnLst>
+                              <p:par>
+                                <p:cTn id="41" presetID="10" presetClass="entr" presetSubtype="0" fill="hold" grpId="0" nodeType="clickEffect">
+                                  <p:stCondLst>
+                                    <p:cond delay="0"/>
+                                  </p:stCondLst>
+                                  <p:childTnLst>
+                                    <p:set>
+                                      <p:cBhvr>
+                                        <p:cTn id="42" dur="1" fill="hold">
+                                          <p:stCondLst>
+                                            <p:cond delay="0"/>
+                                          </p:stCondLst>
+                                        </p:cTn>
+                                        <p:tgtEl>
+                                          <p:spTgt spid="3">
+                                            <p:txEl>
+                                              <p:pRg st="2" end="2"/>
+                                            </p:txEl>
+                                          </p:spTgt>
+                                        </p:tgtEl>
+                                        <p:attrNameLst>
+                                          <p:attrName>style.visibility</p:attrName>
+                                        </p:attrNameLst>
+                                      </p:cBhvr>
+                                      <p:to>
+                                        <p:strVal val="visible"/>
+                                      </p:to>
+                                    </p:set>
+                                    <p:animEffect transition="in" filter="fade">
+                                      <p:cBhvr>
+                                        <p:cTn id="43" dur="500"/>
+                                        <p:tgtEl>
+                                          <p:spTgt spid="3">
+                                            <p:txEl>
+                                              <p:pRg st="2" end="2"/>
+                                            </p:txEl>
+                                          </p:spTgt>
+                                        </p:tgtEl>
+                                      </p:cBhvr>
+                                    </p:animEffect>
+                                  </p:childTnLst>
+                                </p:cTn>
+                              </p:par>
+                              <p:par>
+                                <p:cTn id="44" presetID="10" presetClass="entr" presetSubtype="0" fill="hold" nodeType="withEffect">
+                                  <p:stCondLst>
+                                    <p:cond delay="0"/>
+                                  </p:stCondLst>
+                                  <p:childTnLst>
+                                    <p:set>
+                                      <p:cBhvr>
+                                        <p:cTn id="45" dur="1" fill="hold">
+                                          <p:stCondLst>
+                                            <p:cond delay="0"/>
+                                          </p:stCondLst>
+                                        </p:cTn>
+                                        <p:tgtEl>
+                                          <p:spTgt spid="13"/>
+                                        </p:tgtEl>
+                                        <p:attrNameLst>
+                                          <p:attrName>style.visibility</p:attrName>
+                                        </p:attrNameLst>
+                                      </p:cBhvr>
+                                      <p:to>
+                                        <p:strVal val="visible"/>
+                                      </p:to>
+                                    </p:set>
+                                    <p:animEffect transition="in" filter="fade">
+                                      <p:cBhvr>
+                                        <p:cTn id="46" dur="500"/>
+                                        <p:tgtEl>
+                                          <p:spTgt spid="13"/>
+                                        </p:tgtEl>
+                                      </p:cBhvr>
+                                    </p:animEffect>
+                                  </p:childTnLst>
+                                </p:cTn>
+                              </p:par>
+                            </p:childTnLst>
+                          </p:cTn>
+                        </p:par>
+                      </p:childTnLst>
+                    </p:cTn>
+                  </p:par>
+                  <p:par>
+                    <p:cTn id="47" fill="hold">
+                      <p:stCondLst>
+                        <p:cond delay="indefinite"/>
+                      </p:stCondLst>
+                      <p:childTnLst>
+                        <p:par>
+                          <p:cTn id="48" fill="hold">
+                            <p:stCondLst>
+                              <p:cond delay="0"/>
+                            </p:stCondLst>
+                            <p:childTnLst>
+                              <p:par>
+                                <p:cTn id="49" presetID="10" presetClass="entr" presetSubtype="0" fill="hold" grpId="0" nodeType="clickEffect">
+                                  <p:stCondLst>
+                                    <p:cond delay="0"/>
+                                  </p:stCondLst>
+                                  <p:childTnLst>
+                                    <p:set>
+                                      <p:cBhvr>
+                                        <p:cTn id="50" dur="1" fill="hold">
+                                          <p:stCondLst>
+                                            <p:cond delay="0"/>
+                                          </p:stCondLst>
+                                        </p:cTn>
+                                        <p:tgtEl>
+                                          <p:spTgt spid="3">
+                                            <p:txEl>
+                                              <p:pRg st="3" end="3"/>
+                                            </p:txEl>
+                                          </p:spTgt>
+                                        </p:tgtEl>
+                                        <p:attrNameLst>
+                                          <p:attrName>style.visibility</p:attrName>
+                                        </p:attrNameLst>
+                                      </p:cBhvr>
+                                      <p:to>
+                                        <p:strVal val="visible"/>
+                                      </p:to>
+                                    </p:set>
+                                    <p:animEffect transition="in" filter="fade">
+                                      <p:cBhvr>
+                                        <p:cTn id="51" dur="500"/>
+                                        <p:tgtEl>
+                                          <p:spTgt spid="3">
+                                            <p:txEl>
+                                              <p:pRg st="3" end="3"/>
+                                            </p:txEl>
+                                          </p:spTgt>
+                                        </p:tgtEl>
+                                      </p:cBhvr>
+                                    </p:animEffect>
+                                  </p:childTnLst>
+                                </p:cTn>
+                              </p:par>
+                              <p:par>
+                                <p:cTn id="52" presetID="10" presetClass="entr" presetSubtype="0" fill="hold" nodeType="withEffect">
+                                  <p:stCondLst>
+                                    <p:cond delay="0"/>
+                                  </p:stCondLst>
+                                  <p:childTnLst>
+                                    <p:set>
+                                      <p:cBhvr>
+                                        <p:cTn id="53" dur="1" fill="hold">
+                                          <p:stCondLst>
+                                            <p:cond delay="0"/>
+                                          </p:stCondLst>
+                                        </p:cTn>
+                                        <p:tgtEl>
+                                          <p:spTgt spid="15"/>
+                                        </p:tgtEl>
+                                        <p:attrNameLst>
+                                          <p:attrName>style.visibility</p:attrName>
+                                        </p:attrNameLst>
+                                      </p:cBhvr>
+                                      <p:to>
+                                        <p:strVal val="visible"/>
+                                      </p:to>
+                                    </p:set>
+                                    <p:animEffect transition="in" filter="fade">
+                                      <p:cBhvr>
+                                        <p:cTn id="54" dur="500"/>
+                                        <p:tgtEl>
+                                          <p:spTgt spid="15"/>
+                                        </p:tgtEl>
+                                      </p:cBhvr>
+                                    </p:animEffect>
+                                  </p:childTnLst>
+                                </p:cTn>
+                              </p:par>
+                            </p:childTnLst>
+                          </p:cTn>
+                        </p:par>
+                      </p:childTnLst>
+                    </p:cTn>
+                  </p:par>
+                </p:childTnLst>
+              </p:cTn>
+              <p:prevCondLst>
+                <p:cond evt="onPrev" delay="0">
+                  <p:tgtEl>
+                    <p:sldTgt/>
+                  </p:tgtEl>
+                </p:cond>
+              </p:prevCondLst>
+              <p:nextCondLst>
+                <p:cond evt="onNext" delay="0">
+                  <p:tgtEl>
+                    <p:sldTgt/>
+                  </p:tgtEl>
+                </p:cond>
+              </p:nextCondLst>
+            </p:seq>
+          </p:childTnLst>
+        </p:cTn>
       </p:par>
     </p:tnLst>
+    <p:bldLst>
+      <p:bldP spid="2" grpId="0"/>
+      <p:bldP spid="3" grpId="0" uiExpand="1" build="p"/>
+      <p:bldP spid="4" grpId="0"/>
+    </p:bldLst>
   </p:timing>
 </p:sld>
 </file>

</xml_diff>